<commit_message>
some minor updates, readme.md is written
</commit_message>
<xml_diff>
--- a/doc/Solution architecture.pptx
+++ b/doc/Solution architecture.pptx
@@ -104,6 +104,11 @@
       </a:defRPr>
     </a:lvl9pPr>
   </p:defaultTextStyle>
+  <p:extLst>
+    <p:ext uri="{EFAFB233-063F-42B5-8137-9DF3F51BA10A}">
+      <p15:sldGuideLst xmlns:p15="http://schemas.microsoft.com/office/powerpoint/2012/main"/>
+    </p:ext>
+  </p:extLst>
 </p:presentation>
 </file>
 
@@ -256,7 +261,7 @@
           <a:p>
             <a:fld id="{A21C695A-9BC1-497F-9CE7-EC4209D5B22F}" type="datetimeFigureOut">
               <a:rPr lang="ru-RU" smtClean="0"/>
-              <a:t>25.04.2022</a:t>
+              <a:t>28.04.2022</a:t>
             </a:fld>
             <a:endParaRPr lang="ru-RU"/>
           </a:p>
@@ -456,7 +461,7 @@
           <a:p>
             <a:fld id="{A21C695A-9BC1-497F-9CE7-EC4209D5B22F}" type="datetimeFigureOut">
               <a:rPr lang="ru-RU" smtClean="0"/>
-              <a:t>25.04.2022</a:t>
+              <a:t>28.04.2022</a:t>
             </a:fld>
             <a:endParaRPr lang="ru-RU"/>
           </a:p>
@@ -666,7 +671,7 @@
           <a:p>
             <a:fld id="{A21C695A-9BC1-497F-9CE7-EC4209D5B22F}" type="datetimeFigureOut">
               <a:rPr lang="ru-RU" smtClean="0"/>
-              <a:t>25.04.2022</a:t>
+              <a:t>28.04.2022</a:t>
             </a:fld>
             <a:endParaRPr lang="ru-RU"/>
           </a:p>
@@ -866,7 +871,7 @@
           <a:p>
             <a:fld id="{A21C695A-9BC1-497F-9CE7-EC4209D5B22F}" type="datetimeFigureOut">
               <a:rPr lang="ru-RU" smtClean="0"/>
-              <a:t>25.04.2022</a:t>
+              <a:t>28.04.2022</a:t>
             </a:fld>
             <a:endParaRPr lang="ru-RU"/>
           </a:p>
@@ -1142,7 +1147,7 @@
           <a:p>
             <a:fld id="{A21C695A-9BC1-497F-9CE7-EC4209D5B22F}" type="datetimeFigureOut">
               <a:rPr lang="ru-RU" smtClean="0"/>
-              <a:t>25.04.2022</a:t>
+              <a:t>28.04.2022</a:t>
             </a:fld>
             <a:endParaRPr lang="ru-RU"/>
           </a:p>
@@ -1410,7 +1415,7 @@
           <a:p>
             <a:fld id="{A21C695A-9BC1-497F-9CE7-EC4209D5B22F}" type="datetimeFigureOut">
               <a:rPr lang="ru-RU" smtClean="0"/>
-              <a:t>25.04.2022</a:t>
+              <a:t>28.04.2022</a:t>
             </a:fld>
             <a:endParaRPr lang="ru-RU"/>
           </a:p>
@@ -1825,7 +1830,7 @@
           <a:p>
             <a:fld id="{A21C695A-9BC1-497F-9CE7-EC4209D5B22F}" type="datetimeFigureOut">
               <a:rPr lang="ru-RU" smtClean="0"/>
-              <a:t>25.04.2022</a:t>
+              <a:t>28.04.2022</a:t>
             </a:fld>
             <a:endParaRPr lang="ru-RU"/>
           </a:p>
@@ -1967,7 +1972,7 @@
           <a:p>
             <a:fld id="{A21C695A-9BC1-497F-9CE7-EC4209D5B22F}" type="datetimeFigureOut">
               <a:rPr lang="ru-RU" smtClean="0"/>
-              <a:t>25.04.2022</a:t>
+              <a:t>28.04.2022</a:t>
             </a:fld>
             <a:endParaRPr lang="ru-RU"/>
           </a:p>
@@ -2080,7 +2085,7 @@
           <a:p>
             <a:fld id="{A21C695A-9BC1-497F-9CE7-EC4209D5B22F}" type="datetimeFigureOut">
               <a:rPr lang="ru-RU" smtClean="0"/>
-              <a:t>25.04.2022</a:t>
+              <a:t>28.04.2022</a:t>
             </a:fld>
             <a:endParaRPr lang="ru-RU"/>
           </a:p>
@@ -2393,7 +2398,7 @@
           <a:p>
             <a:fld id="{A21C695A-9BC1-497F-9CE7-EC4209D5B22F}" type="datetimeFigureOut">
               <a:rPr lang="ru-RU" smtClean="0"/>
-              <a:t>25.04.2022</a:t>
+              <a:t>28.04.2022</a:t>
             </a:fld>
             <a:endParaRPr lang="ru-RU"/>
           </a:p>
@@ -2682,7 +2687,7 @@
           <a:p>
             <a:fld id="{A21C695A-9BC1-497F-9CE7-EC4209D5B22F}" type="datetimeFigureOut">
               <a:rPr lang="ru-RU" smtClean="0"/>
-              <a:t>25.04.2022</a:t>
+              <a:t>28.04.2022</a:t>
             </a:fld>
             <a:endParaRPr lang="ru-RU"/>
           </a:p>
@@ -2925,7 +2930,7 @@
           <a:p>
             <a:fld id="{A21C695A-9BC1-497F-9CE7-EC4209D5B22F}" type="datetimeFigureOut">
               <a:rPr lang="ru-RU" smtClean="0"/>
-              <a:t>25.04.2022</a:t>
+              <a:t>28.04.2022</a:t>
             </a:fld>
             <a:endParaRPr lang="ru-RU"/>
           </a:p>
@@ -3378,12 +3383,875 @@
           </a:p>
         </p:txBody>
       </p:sp>
+      <p:sp>
+        <p:nvSpPr>
+          <p:cNvPr id="24" name="Rectangle 23">
+            <a:extLst>
+              <a:ext uri="{FF2B5EF4-FFF2-40B4-BE49-F238E27FC236}">
+                <a16:creationId xmlns:a16="http://schemas.microsoft.com/office/drawing/2014/main" id="{7EC5625D-3204-465D-BCC2-3BEF694BBCC8}"/>
+              </a:ext>
+            </a:extLst>
+          </p:cNvPr>
+          <p:cNvSpPr/>
+          <p:nvPr/>
+        </p:nvSpPr>
+        <p:spPr>
+          <a:xfrm>
+            <a:off x="2122414" y="1007706"/>
+            <a:ext cx="3113244" cy="5317593"/>
+          </a:xfrm>
+          <a:prstGeom prst="rect">
+            <a:avLst/>
+          </a:prstGeom>
+          <a:solidFill>
+            <a:schemeClr val="accent1">
+              <a:lumMod val="40000"/>
+              <a:lumOff val="60000"/>
+            </a:schemeClr>
+          </a:solidFill>
+        </p:spPr>
+        <p:style>
+          <a:lnRef idx="2">
+            <a:schemeClr val="accent1">
+              <a:shade val="50000"/>
+            </a:schemeClr>
+          </a:lnRef>
+          <a:fillRef idx="1">
+            <a:schemeClr val="accent1"/>
+          </a:fillRef>
+          <a:effectRef idx="0">
+            <a:schemeClr val="accent1"/>
+          </a:effectRef>
+          <a:fontRef idx="minor">
+            <a:schemeClr val="lt1"/>
+          </a:fontRef>
+        </p:style>
+        <p:txBody>
+          <a:bodyPr rtlCol="0" anchor="t"/>
+          <a:lstStyle/>
+          <a:p>
+            <a:pPr algn="ctr"/>
+            <a:r>
+              <a:rPr lang="en-US" dirty="0">
+                <a:solidFill>
+                  <a:schemeClr val="tx1"/>
+                </a:solidFill>
+              </a:rPr>
+              <a:t>External network</a:t>
+            </a:r>
+          </a:p>
+        </p:txBody>
+      </p:sp>
+      <p:sp>
+        <p:nvSpPr>
+          <p:cNvPr id="11" name="Rectangle 10">
+            <a:extLst>
+              <a:ext uri="{FF2B5EF4-FFF2-40B4-BE49-F238E27FC236}">
+                <a16:creationId xmlns:a16="http://schemas.microsoft.com/office/drawing/2014/main" id="{8E8C853E-C18C-4C7E-AA3A-424B23F9B2CE}"/>
+              </a:ext>
+            </a:extLst>
+          </p:cNvPr>
+          <p:cNvSpPr/>
+          <p:nvPr/>
+        </p:nvSpPr>
+        <p:spPr>
+          <a:xfrm>
+            <a:off x="5232732" y="1007707"/>
+            <a:ext cx="4640768" cy="5317593"/>
+          </a:xfrm>
+          <a:prstGeom prst="rect">
+            <a:avLst/>
+          </a:prstGeom>
+          <a:solidFill>
+            <a:schemeClr val="accent2">
+              <a:lumMod val="20000"/>
+              <a:lumOff val="80000"/>
+            </a:schemeClr>
+          </a:solidFill>
+        </p:spPr>
+        <p:style>
+          <a:lnRef idx="2">
+            <a:schemeClr val="accent1">
+              <a:shade val="50000"/>
+            </a:schemeClr>
+          </a:lnRef>
+          <a:fillRef idx="1">
+            <a:schemeClr val="accent1"/>
+          </a:fillRef>
+          <a:effectRef idx="0">
+            <a:schemeClr val="accent1"/>
+          </a:effectRef>
+          <a:fontRef idx="minor">
+            <a:schemeClr val="lt1"/>
+          </a:fontRef>
+        </p:style>
+        <p:txBody>
+          <a:bodyPr rtlCol="0" anchor="t"/>
+          <a:lstStyle/>
+          <a:p>
+            <a:pPr algn="ctr"/>
+            <a:r>
+              <a:rPr lang="en-US" dirty="0">
+                <a:solidFill>
+                  <a:schemeClr val="tx1"/>
+                </a:solidFill>
+              </a:rPr>
+              <a:t>Internal network</a:t>
+            </a:r>
+          </a:p>
+        </p:txBody>
+      </p:sp>
+      <p:sp>
+        <p:nvSpPr>
+          <p:cNvPr id="4" name="Rectangle 3">
+            <a:extLst>
+              <a:ext uri="{FF2B5EF4-FFF2-40B4-BE49-F238E27FC236}">
+                <a16:creationId xmlns:a16="http://schemas.microsoft.com/office/drawing/2014/main" id="{2414CB02-95C6-44AA-9AED-06C0A6E570B1}"/>
+              </a:ext>
+            </a:extLst>
+          </p:cNvPr>
+          <p:cNvSpPr/>
+          <p:nvPr/>
+        </p:nvSpPr>
+        <p:spPr>
+          <a:xfrm>
+            <a:off x="4969293" y="1486671"/>
+            <a:ext cx="430235" cy="4437776"/>
+          </a:xfrm>
+          <a:prstGeom prst="rect">
+            <a:avLst/>
+          </a:prstGeom>
+        </p:spPr>
+        <p:style>
+          <a:lnRef idx="2">
+            <a:schemeClr val="accent1">
+              <a:shade val="50000"/>
+            </a:schemeClr>
+          </a:lnRef>
+          <a:fillRef idx="1">
+            <a:schemeClr val="accent1"/>
+          </a:fillRef>
+          <a:effectRef idx="0">
+            <a:schemeClr val="accent1"/>
+          </a:effectRef>
+          <a:fontRef idx="minor">
+            <a:schemeClr val="lt1"/>
+          </a:fontRef>
+        </p:style>
+        <p:txBody>
+          <a:bodyPr vert="vert270" rtlCol="0" anchor="ctr"/>
+          <a:lstStyle/>
+          <a:p>
+            <a:pPr algn="ctr"/>
+            <a:r>
+              <a:rPr lang="en-US" dirty="0"/>
+              <a:t>Public API, Auth service</a:t>
+            </a:r>
+          </a:p>
+        </p:txBody>
+      </p:sp>
+      <p:sp>
+        <p:nvSpPr>
+          <p:cNvPr id="5" name="Rectangle 4">
+            <a:extLst>
+              <a:ext uri="{FF2B5EF4-FFF2-40B4-BE49-F238E27FC236}">
+                <a16:creationId xmlns:a16="http://schemas.microsoft.com/office/drawing/2014/main" id="{59FD6055-7E13-41FC-BA7A-25AFB4A1BB7D}"/>
+              </a:ext>
+            </a:extLst>
+          </p:cNvPr>
+          <p:cNvSpPr/>
+          <p:nvPr/>
+        </p:nvSpPr>
+        <p:spPr>
+          <a:xfrm>
+            <a:off x="6073629" y="1730744"/>
+            <a:ext cx="1048624" cy="557147"/>
+          </a:xfrm>
+          <a:prstGeom prst="rect">
+            <a:avLst/>
+          </a:prstGeom>
+        </p:spPr>
+        <p:style>
+          <a:lnRef idx="2">
+            <a:schemeClr val="accent1">
+              <a:shade val="50000"/>
+            </a:schemeClr>
+          </a:lnRef>
+          <a:fillRef idx="1">
+            <a:schemeClr val="accent1"/>
+          </a:fillRef>
+          <a:effectRef idx="0">
+            <a:schemeClr val="accent1"/>
+          </a:effectRef>
+          <a:fontRef idx="minor">
+            <a:schemeClr val="lt1"/>
+          </a:fontRef>
+        </p:style>
+        <p:txBody>
+          <a:bodyPr rtlCol="0" anchor="ctr"/>
+          <a:lstStyle/>
+          <a:p>
+            <a:pPr algn="ctr"/>
+            <a:r>
+              <a:rPr lang="en-US" dirty="0"/>
+              <a:t>User Service</a:t>
+            </a:r>
+          </a:p>
+        </p:txBody>
+      </p:sp>
+      <p:sp>
+        <p:nvSpPr>
+          <p:cNvPr id="6" name="Rectangle 5">
+            <a:extLst>
+              <a:ext uri="{FF2B5EF4-FFF2-40B4-BE49-F238E27FC236}">
+                <a16:creationId xmlns:a16="http://schemas.microsoft.com/office/drawing/2014/main" id="{6A8BD9CB-D79C-41AF-B736-6C8567B4B5F1}"/>
+              </a:ext>
+            </a:extLst>
+          </p:cNvPr>
+          <p:cNvSpPr/>
+          <p:nvPr/>
+        </p:nvSpPr>
+        <p:spPr>
+          <a:xfrm>
+            <a:off x="6073629" y="2758045"/>
+            <a:ext cx="1048624" cy="557147"/>
+          </a:xfrm>
+          <a:prstGeom prst="rect">
+            <a:avLst/>
+          </a:prstGeom>
+        </p:spPr>
+        <p:style>
+          <a:lnRef idx="2">
+            <a:schemeClr val="accent1">
+              <a:shade val="50000"/>
+            </a:schemeClr>
+          </a:lnRef>
+          <a:fillRef idx="1">
+            <a:schemeClr val="accent1"/>
+          </a:fillRef>
+          <a:effectRef idx="0">
+            <a:schemeClr val="accent1"/>
+          </a:effectRef>
+          <a:fontRef idx="minor">
+            <a:schemeClr val="lt1"/>
+          </a:fontRef>
+        </p:style>
+        <p:txBody>
+          <a:bodyPr rtlCol="0" anchor="ctr"/>
+          <a:lstStyle/>
+          <a:p>
+            <a:pPr algn="ctr"/>
+            <a:r>
+              <a:rPr lang="en-US" dirty="0"/>
+              <a:t>Admin Service</a:t>
+            </a:r>
+          </a:p>
+        </p:txBody>
+      </p:sp>
+      <p:sp>
+        <p:nvSpPr>
+          <p:cNvPr id="7" name="Rectangle 6">
+            <a:extLst>
+              <a:ext uri="{FF2B5EF4-FFF2-40B4-BE49-F238E27FC236}">
+                <a16:creationId xmlns:a16="http://schemas.microsoft.com/office/drawing/2014/main" id="{03D4D084-FD32-4658-A24C-4EA4AEFA4F0F}"/>
+              </a:ext>
+            </a:extLst>
+          </p:cNvPr>
+          <p:cNvSpPr/>
+          <p:nvPr/>
+        </p:nvSpPr>
+        <p:spPr>
+          <a:xfrm>
+            <a:off x="6073629" y="3858401"/>
+            <a:ext cx="1048624" cy="557147"/>
+          </a:xfrm>
+          <a:prstGeom prst="rect">
+            <a:avLst/>
+          </a:prstGeom>
+        </p:spPr>
+        <p:style>
+          <a:lnRef idx="2">
+            <a:schemeClr val="accent1">
+              <a:shade val="50000"/>
+            </a:schemeClr>
+          </a:lnRef>
+          <a:fillRef idx="1">
+            <a:schemeClr val="accent1"/>
+          </a:fillRef>
+          <a:effectRef idx="0">
+            <a:schemeClr val="accent1"/>
+          </a:effectRef>
+          <a:fontRef idx="minor">
+            <a:schemeClr val="lt1"/>
+          </a:fontRef>
+        </p:style>
+        <p:txBody>
+          <a:bodyPr rtlCol="0" anchor="ctr"/>
+          <a:lstStyle/>
+          <a:p>
+            <a:pPr algn="ctr"/>
+            <a:r>
+              <a:rPr lang="en-US" dirty="0"/>
+              <a:t>Courier Service</a:t>
+            </a:r>
+          </a:p>
+        </p:txBody>
+      </p:sp>
+      <p:sp>
+        <p:nvSpPr>
+          <p:cNvPr id="8" name="Rectangle 7">
+            <a:extLst>
+              <a:ext uri="{FF2B5EF4-FFF2-40B4-BE49-F238E27FC236}">
+                <a16:creationId xmlns:a16="http://schemas.microsoft.com/office/drawing/2014/main" id="{73D09D61-F6A2-487E-B19F-267B075A2358}"/>
+              </a:ext>
+            </a:extLst>
+          </p:cNvPr>
+          <p:cNvSpPr/>
+          <p:nvPr/>
+        </p:nvSpPr>
+        <p:spPr>
+          <a:xfrm>
+            <a:off x="6073629" y="4958757"/>
+            <a:ext cx="1048624" cy="557147"/>
+          </a:xfrm>
+          <a:prstGeom prst="rect">
+            <a:avLst/>
+          </a:prstGeom>
+        </p:spPr>
+        <p:style>
+          <a:lnRef idx="2">
+            <a:schemeClr val="accent1">
+              <a:shade val="50000"/>
+            </a:schemeClr>
+          </a:lnRef>
+          <a:fillRef idx="1">
+            <a:schemeClr val="accent1"/>
+          </a:fillRef>
+          <a:effectRef idx="0">
+            <a:schemeClr val="accent1"/>
+          </a:effectRef>
+          <a:fontRef idx="minor">
+            <a:schemeClr val="lt1"/>
+          </a:fontRef>
+        </p:style>
+        <p:txBody>
+          <a:bodyPr rtlCol="0" anchor="ctr"/>
+          <a:lstStyle/>
+          <a:p>
+            <a:pPr algn="ctr"/>
+            <a:r>
+              <a:rPr lang="en-US" dirty="0"/>
+              <a:t>Client Service</a:t>
+            </a:r>
+          </a:p>
+        </p:txBody>
+      </p:sp>
+      <p:sp>
+        <p:nvSpPr>
+          <p:cNvPr id="10" name="Rectangle 9">
+            <a:extLst>
+              <a:ext uri="{FF2B5EF4-FFF2-40B4-BE49-F238E27FC236}">
+                <a16:creationId xmlns:a16="http://schemas.microsoft.com/office/drawing/2014/main" id="{37381378-587F-4DF9-9F62-33930987FC23}"/>
+              </a:ext>
+            </a:extLst>
+          </p:cNvPr>
+          <p:cNvSpPr/>
+          <p:nvPr/>
+        </p:nvSpPr>
+        <p:spPr>
+          <a:xfrm>
+            <a:off x="8948627" y="1447616"/>
+            <a:ext cx="298579" cy="4437776"/>
+          </a:xfrm>
+          <a:prstGeom prst="rect">
+            <a:avLst/>
+          </a:prstGeom>
+          <a:solidFill>
+            <a:schemeClr val="accent6">
+              <a:lumMod val="60000"/>
+              <a:lumOff val="40000"/>
+            </a:schemeClr>
+          </a:solidFill>
+        </p:spPr>
+        <p:style>
+          <a:lnRef idx="2">
+            <a:schemeClr val="accent1">
+              <a:shade val="50000"/>
+            </a:schemeClr>
+          </a:lnRef>
+          <a:fillRef idx="1">
+            <a:schemeClr val="accent1"/>
+          </a:fillRef>
+          <a:effectRef idx="0">
+            <a:schemeClr val="accent1"/>
+          </a:effectRef>
+          <a:fontRef idx="minor">
+            <a:schemeClr val="lt1"/>
+          </a:fontRef>
+        </p:style>
+        <p:txBody>
+          <a:bodyPr vert="vert270" rtlCol="0" anchor="ctr"/>
+          <a:lstStyle/>
+          <a:p>
+            <a:pPr algn="ctr"/>
+            <a:r>
+              <a:rPr lang="en-US" dirty="0"/>
+              <a:t>AMQP</a:t>
+            </a:r>
+            <a:endParaRPr lang="ru-RU" dirty="0"/>
+          </a:p>
+        </p:txBody>
+      </p:sp>
+      <p:sp>
+        <p:nvSpPr>
+          <p:cNvPr id="19" name="Arrow: Left-Right 18">
+            <a:extLst>
+              <a:ext uri="{FF2B5EF4-FFF2-40B4-BE49-F238E27FC236}">
+                <a16:creationId xmlns:a16="http://schemas.microsoft.com/office/drawing/2014/main" id="{98DB5C20-1B09-4695-88B4-1873AF2947F1}"/>
+              </a:ext>
+            </a:extLst>
+          </p:cNvPr>
+          <p:cNvSpPr/>
+          <p:nvPr/>
+        </p:nvSpPr>
+        <p:spPr>
+          <a:xfrm>
+            <a:off x="7121810" y="1891377"/>
+            <a:ext cx="1825931" cy="174771"/>
+          </a:xfrm>
+          <a:prstGeom prst="leftRightArrow">
+            <a:avLst/>
+          </a:prstGeom>
+          <a:solidFill>
+            <a:schemeClr val="accent6">
+              <a:lumMod val="60000"/>
+              <a:lumOff val="40000"/>
+            </a:schemeClr>
+          </a:solidFill>
+        </p:spPr>
+        <p:style>
+          <a:lnRef idx="2">
+            <a:schemeClr val="accent1">
+              <a:shade val="50000"/>
+            </a:schemeClr>
+          </a:lnRef>
+          <a:fillRef idx="1">
+            <a:schemeClr val="accent1"/>
+          </a:fillRef>
+          <a:effectRef idx="0">
+            <a:schemeClr val="accent1"/>
+          </a:effectRef>
+          <a:fontRef idx="minor">
+            <a:schemeClr val="lt1"/>
+          </a:fontRef>
+        </p:style>
+        <p:txBody>
+          <a:bodyPr rtlCol="0" anchor="ctr"/>
+          <a:lstStyle/>
+          <a:p>
+            <a:pPr algn="ctr"/>
+            <a:endParaRPr lang="ru-RU"/>
+          </a:p>
+        </p:txBody>
+      </p:sp>
+      <p:sp>
+        <p:nvSpPr>
+          <p:cNvPr id="20" name="Arrow: Left-Right 19">
+            <a:extLst>
+              <a:ext uri="{FF2B5EF4-FFF2-40B4-BE49-F238E27FC236}">
+                <a16:creationId xmlns:a16="http://schemas.microsoft.com/office/drawing/2014/main" id="{F1A3DA78-D4B2-4C9A-8756-538A8CB3EEAA}"/>
+              </a:ext>
+            </a:extLst>
+          </p:cNvPr>
+          <p:cNvSpPr/>
+          <p:nvPr/>
+        </p:nvSpPr>
+        <p:spPr>
+          <a:xfrm>
+            <a:off x="7121810" y="2934902"/>
+            <a:ext cx="1825931" cy="174771"/>
+          </a:xfrm>
+          <a:prstGeom prst="leftRightArrow">
+            <a:avLst/>
+          </a:prstGeom>
+          <a:solidFill>
+            <a:schemeClr val="accent6">
+              <a:lumMod val="60000"/>
+              <a:lumOff val="40000"/>
+            </a:schemeClr>
+          </a:solidFill>
+        </p:spPr>
+        <p:style>
+          <a:lnRef idx="2">
+            <a:schemeClr val="accent1">
+              <a:shade val="50000"/>
+            </a:schemeClr>
+          </a:lnRef>
+          <a:fillRef idx="1">
+            <a:schemeClr val="accent1"/>
+          </a:fillRef>
+          <a:effectRef idx="0">
+            <a:schemeClr val="accent1"/>
+          </a:effectRef>
+          <a:fontRef idx="minor">
+            <a:schemeClr val="lt1"/>
+          </a:fontRef>
+        </p:style>
+        <p:txBody>
+          <a:bodyPr rtlCol="0" anchor="ctr"/>
+          <a:lstStyle/>
+          <a:p>
+            <a:pPr algn="ctr"/>
+            <a:endParaRPr lang="ru-RU"/>
+          </a:p>
+        </p:txBody>
+      </p:sp>
+      <p:sp>
+        <p:nvSpPr>
+          <p:cNvPr id="21" name="Arrow: Left-Right 20">
+            <a:extLst>
+              <a:ext uri="{FF2B5EF4-FFF2-40B4-BE49-F238E27FC236}">
+                <a16:creationId xmlns:a16="http://schemas.microsoft.com/office/drawing/2014/main" id="{48AAC031-F9ED-4602-8441-0D2CA73F84A0}"/>
+              </a:ext>
+            </a:extLst>
+          </p:cNvPr>
+          <p:cNvSpPr/>
+          <p:nvPr/>
+        </p:nvSpPr>
+        <p:spPr>
+          <a:xfrm>
+            <a:off x="7121809" y="4065924"/>
+            <a:ext cx="1825931" cy="174771"/>
+          </a:xfrm>
+          <a:prstGeom prst="leftRightArrow">
+            <a:avLst/>
+          </a:prstGeom>
+          <a:solidFill>
+            <a:schemeClr val="accent6">
+              <a:lumMod val="60000"/>
+              <a:lumOff val="40000"/>
+            </a:schemeClr>
+          </a:solidFill>
+        </p:spPr>
+        <p:style>
+          <a:lnRef idx="2">
+            <a:schemeClr val="accent1">
+              <a:shade val="50000"/>
+            </a:schemeClr>
+          </a:lnRef>
+          <a:fillRef idx="1">
+            <a:schemeClr val="accent1"/>
+          </a:fillRef>
+          <a:effectRef idx="0">
+            <a:schemeClr val="accent1"/>
+          </a:effectRef>
+          <a:fontRef idx="minor">
+            <a:schemeClr val="lt1"/>
+          </a:fontRef>
+        </p:style>
+        <p:txBody>
+          <a:bodyPr rtlCol="0" anchor="ctr"/>
+          <a:lstStyle/>
+          <a:p>
+            <a:pPr algn="ctr"/>
+            <a:endParaRPr lang="ru-RU"/>
+          </a:p>
+        </p:txBody>
+      </p:sp>
+      <p:sp>
+        <p:nvSpPr>
+          <p:cNvPr id="22" name="Arrow: Left-Right 21">
+            <a:extLst>
+              <a:ext uri="{FF2B5EF4-FFF2-40B4-BE49-F238E27FC236}">
+                <a16:creationId xmlns:a16="http://schemas.microsoft.com/office/drawing/2014/main" id="{B2F72A7A-03F1-4E7C-89C3-6E7AE64B88F2}"/>
+              </a:ext>
+            </a:extLst>
+          </p:cNvPr>
+          <p:cNvSpPr/>
+          <p:nvPr/>
+        </p:nvSpPr>
+        <p:spPr>
+          <a:xfrm>
+            <a:off x="7121809" y="5117176"/>
+            <a:ext cx="1825931" cy="174771"/>
+          </a:xfrm>
+          <a:prstGeom prst="leftRightArrow">
+            <a:avLst/>
+          </a:prstGeom>
+          <a:solidFill>
+            <a:schemeClr val="accent6">
+              <a:lumMod val="60000"/>
+              <a:lumOff val="40000"/>
+            </a:schemeClr>
+          </a:solidFill>
+        </p:spPr>
+        <p:style>
+          <a:lnRef idx="2">
+            <a:schemeClr val="accent1">
+              <a:shade val="50000"/>
+            </a:schemeClr>
+          </a:lnRef>
+          <a:fillRef idx="1">
+            <a:schemeClr val="accent1"/>
+          </a:fillRef>
+          <a:effectRef idx="0">
+            <a:schemeClr val="accent1"/>
+          </a:effectRef>
+          <a:fontRef idx="minor">
+            <a:schemeClr val="lt1"/>
+          </a:fontRef>
+        </p:style>
+        <p:txBody>
+          <a:bodyPr rtlCol="0" anchor="ctr"/>
+          <a:lstStyle/>
+          <a:p>
+            <a:pPr algn="ctr"/>
+            <a:endParaRPr lang="ru-RU"/>
+          </a:p>
+        </p:txBody>
+      </p:sp>
+      <p:sp>
+        <p:nvSpPr>
+          <p:cNvPr id="23" name="Arrow: Up-Down 22">
+            <a:extLst>
+              <a:ext uri="{FF2B5EF4-FFF2-40B4-BE49-F238E27FC236}">
+                <a16:creationId xmlns:a16="http://schemas.microsoft.com/office/drawing/2014/main" id="{AFB8F4A7-2D10-4EB6-9CEF-A8CBD4641B49}"/>
+              </a:ext>
+            </a:extLst>
+          </p:cNvPr>
+          <p:cNvSpPr/>
+          <p:nvPr/>
+        </p:nvSpPr>
+        <p:spPr>
+          <a:xfrm>
+            <a:off x="6547607" y="2287891"/>
+            <a:ext cx="104863" cy="470154"/>
+          </a:xfrm>
+          <a:prstGeom prst="upDownArrow">
+            <a:avLst/>
+          </a:prstGeom>
+          <a:solidFill>
+            <a:schemeClr val="accent5">
+              <a:lumMod val="60000"/>
+              <a:lumOff val="40000"/>
+            </a:schemeClr>
+          </a:solidFill>
+        </p:spPr>
+        <p:style>
+          <a:lnRef idx="2">
+            <a:schemeClr val="accent1">
+              <a:shade val="50000"/>
+            </a:schemeClr>
+          </a:lnRef>
+          <a:fillRef idx="1">
+            <a:schemeClr val="accent1"/>
+          </a:fillRef>
+          <a:effectRef idx="0">
+            <a:schemeClr val="accent1"/>
+          </a:effectRef>
+          <a:fontRef idx="minor">
+            <a:schemeClr val="lt1"/>
+          </a:fontRef>
+        </p:style>
+        <p:txBody>
+          <a:bodyPr rtlCol="0" anchor="ctr"/>
+          <a:lstStyle/>
+          <a:p>
+            <a:pPr algn="ctr"/>
+            <a:endParaRPr lang="ru-RU"/>
+          </a:p>
+        </p:txBody>
+      </p:sp>
+      <p:sp>
+        <p:nvSpPr>
+          <p:cNvPr id="25" name="Arrow: Left-Right 24">
+            <a:extLst>
+              <a:ext uri="{FF2B5EF4-FFF2-40B4-BE49-F238E27FC236}">
+                <a16:creationId xmlns:a16="http://schemas.microsoft.com/office/drawing/2014/main" id="{3F65F36E-CD7F-4858-ADF1-7C93539AA381}"/>
+              </a:ext>
+            </a:extLst>
+          </p:cNvPr>
+          <p:cNvSpPr/>
+          <p:nvPr/>
+        </p:nvSpPr>
+        <p:spPr>
+          <a:xfrm>
+            <a:off x="5399528" y="1924311"/>
+            <a:ext cx="673215" cy="108901"/>
+          </a:xfrm>
+          <a:prstGeom prst="leftRightArrow">
+            <a:avLst/>
+          </a:prstGeom>
+        </p:spPr>
+        <p:style>
+          <a:lnRef idx="2">
+            <a:schemeClr val="accent1">
+              <a:shade val="50000"/>
+            </a:schemeClr>
+          </a:lnRef>
+          <a:fillRef idx="1">
+            <a:schemeClr val="accent1"/>
+          </a:fillRef>
+          <a:effectRef idx="0">
+            <a:schemeClr val="accent1"/>
+          </a:effectRef>
+          <a:fontRef idx="minor">
+            <a:schemeClr val="lt1"/>
+          </a:fontRef>
+        </p:style>
+        <p:txBody>
+          <a:bodyPr rtlCol="0" anchor="ctr"/>
+          <a:lstStyle/>
+          <a:p>
+            <a:pPr algn="ctr"/>
+            <a:endParaRPr lang="ru-RU"/>
+          </a:p>
+        </p:txBody>
+      </p:sp>
+      <p:sp>
+        <p:nvSpPr>
+          <p:cNvPr id="26" name="Arrow: Left-Right 25">
+            <a:extLst>
+              <a:ext uri="{FF2B5EF4-FFF2-40B4-BE49-F238E27FC236}">
+                <a16:creationId xmlns:a16="http://schemas.microsoft.com/office/drawing/2014/main" id="{6EEF3ABD-19EF-4E60-997B-F7A1A4915AF9}"/>
+              </a:ext>
+            </a:extLst>
+          </p:cNvPr>
+          <p:cNvSpPr/>
+          <p:nvPr/>
+        </p:nvSpPr>
+        <p:spPr>
+          <a:xfrm>
+            <a:off x="5399528" y="2976986"/>
+            <a:ext cx="673215" cy="108901"/>
+          </a:xfrm>
+          <a:prstGeom prst="leftRightArrow">
+            <a:avLst/>
+          </a:prstGeom>
+        </p:spPr>
+        <p:style>
+          <a:lnRef idx="2">
+            <a:schemeClr val="accent1">
+              <a:shade val="50000"/>
+            </a:schemeClr>
+          </a:lnRef>
+          <a:fillRef idx="1">
+            <a:schemeClr val="accent1"/>
+          </a:fillRef>
+          <a:effectRef idx="0">
+            <a:schemeClr val="accent1"/>
+          </a:effectRef>
+          <a:fontRef idx="minor">
+            <a:schemeClr val="lt1"/>
+          </a:fontRef>
+        </p:style>
+        <p:txBody>
+          <a:bodyPr rtlCol="0" anchor="ctr"/>
+          <a:lstStyle/>
+          <a:p>
+            <a:pPr algn="ctr"/>
+            <a:endParaRPr lang="ru-RU"/>
+          </a:p>
+        </p:txBody>
+      </p:sp>
+      <p:sp>
+        <p:nvSpPr>
+          <p:cNvPr id="27" name="Arrow: Left-Right 26">
+            <a:extLst>
+              <a:ext uri="{FF2B5EF4-FFF2-40B4-BE49-F238E27FC236}">
+                <a16:creationId xmlns:a16="http://schemas.microsoft.com/office/drawing/2014/main" id="{3BF5FB62-933D-4DCD-A229-A235D9F84C53}"/>
+              </a:ext>
+            </a:extLst>
+          </p:cNvPr>
+          <p:cNvSpPr/>
+          <p:nvPr/>
+        </p:nvSpPr>
+        <p:spPr>
+          <a:xfrm>
+            <a:off x="5399528" y="4094910"/>
+            <a:ext cx="673215" cy="108901"/>
+          </a:xfrm>
+          <a:prstGeom prst="leftRightArrow">
+            <a:avLst/>
+          </a:prstGeom>
+        </p:spPr>
+        <p:style>
+          <a:lnRef idx="2">
+            <a:schemeClr val="accent1">
+              <a:shade val="50000"/>
+            </a:schemeClr>
+          </a:lnRef>
+          <a:fillRef idx="1">
+            <a:schemeClr val="accent1"/>
+          </a:fillRef>
+          <a:effectRef idx="0">
+            <a:schemeClr val="accent1"/>
+          </a:effectRef>
+          <a:fontRef idx="minor">
+            <a:schemeClr val="lt1"/>
+          </a:fontRef>
+        </p:style>
+        <p:txBody>
+          <a:bodyPr rtlCol="0" anchor="ctr"/>
+          <a:lstStyle/>
+          <a:p>
+            <a:pPr algn="ctr"/>
+            <a:endParaRPr lang="ru-RU"/>
+          </a:p>
+        </p:txBody>
+      </p:sp>
+      <p:sp>
+        <p:nvSpPr>
+          <p:cNvPr id="28" name="Arrow: Left-Right 27">
+            <a:extLst>
+              <a:ext uri="{FF2B5EF4-FFF2-40B4-BE49-F238E27FC236}">
+                <a16:creationId xmlns:a16="http://schemas.microsoft.com/office/drawing/2014/main" id="{24673765-F87A-41FD-AAA7-047886AC2EF9}"/>
+              </a:ext>
+            </a:extLst>
+          </p:cNvPr>
+          <p:cNvSpPr/>
+          <p:nvPr/>
+        </p:nvSpPr>
+        <p:spPr>
+          <a:xfrm>
+            <a:off x="5391960" y="5196248"/>
+            <a:ext cx="673215" cy="108901"/>
+          </a:xfrm>
+          <a:prstGeom prst="leftRightArrow">
+            <a:avLst/>
+          </a:prstGeom>
+        </p:spPr>
+        <p:style>
+          <a:lnRef idx="2">
+            <a:schemeClr val="accent1">
+              <a:shade val="50000"/>
+            </a:schemeClr>
+          </a:lnRef>
+          <a:fillRef idx="1">
+            <a:schemeClr val="accent1"/>
+          </a:fillRef>
+          <a:effectRef idx="0">
+            <a:schemeClr val="accent1"/>
+          </a:effectRef>
+          <a:fontRef idx="minor">
+            <a:schemeClr val="lt1"/>
+          </a:fontRef>
+        </p:style>
+        <p:txBody>
+          <a:bodyPr rtlCol="0" anchor="ctr"/>
+          <a:lstStyle/>
+          <a:p>
+            <a:pPr algn="ctr"/>
+            <a:endParaRPr lang="ru-RU"/>
+          </a:p>
+        </p:txBody>
+      </p:sp>
       <p:grpSp>
         <p:nvGrpSpPr>
-          <p:cNvPr id="63" name="Group 62">
-            <a:extLst>
-              <a:ext uri="{FF2B5EF4-FFF2-40B4-BE49-F238E27FC236}">
-                <a16:creationId xmlns:a16="http://schemas.microsoft.com/office/drawing/2014/main" id="{DB194831-B612-4990-988B-55CF25A87E2E}"/>
+          <p:cNvPr id="39" name="Group 38">
+            <a:extLst>
+              <a:ext uri="{FF2B5EF4-FFF2-40B4-BE49-F238E27FC236}">
+                <a16:creationId xmlns:a16="http://schemas.microsoft.com/office/drawing/2014/main" id="{36FA3D66-196C-4EA2-A6E9-81097D336D74}"/>
               </a:ext>
             </a:extLst>
           </p:cNvPr>
@@ -3392,18 +4260,18 @@
         </p:nvGrpSpPr>
         <p:grpSpPr>
           <a:xfrm>
-            <a:off x="2122414" y="1007706"/>
-            <a:ext cx="7751086" cy="5317594"/>
-            <a:chOff x="2122414" y="1007706"/>
-            <a:chExt cx="7751086" cy="5317594"/>
+            <a:off x="2720613" y="2257172"/>
+            <a:ext cx="543739" cy="531592"/>
+            <a:chOff x="1224836" y="2672895"/>
+            <a:chExt cx="543739" cy="531592"/>
           </a:xfrm>
         </p:grpSpPr>
         <p:sp>
           <p:nvSpPr>
-            <p:cNvPr id="24" name="Rectangle 23">
+            <p:cNvPr id="31" name="Smiley Face 30">
               <a:extLst>
                 <a:ext uri="{FF2B5EF4-FFF2-40B4-BE49-F238E27FC236}">
-                  <a16:creationId xmlns:a16="http://schemas.microsoft.com/office/drawing/2014/main" id="{7EC5625D-3204-465D-BCC2-3BEF694BBCC8}"/>
+                  <a16:creationId xmlns:a16="http://schemas.microsoft.com/office/drawing/2014/main" id="{9AB33322-F2A5-4D30-BA30-C2230184A64D}"/>
                 </a:ext>
               </a:extLst>
             </p:cNvPr>
@@ -3412,435 +4280,14 @@
           </p:nvSpPr>
           <p:spPr>
             <a:xfrm>
-              <a:off x="2122414" y="1007706"/>
-              <a:ext cx="3113244" cy="5317593"/>
+              <a:off x="1359018" y="2672895"/>
+              <a:ext cx="293614" cy="287695"/>
             </a:xfrm>
-            <a:prstGeom prst="rect">
+            <a:prstGeom prst="smileyFace">
               <a:avLst/>
             </a:prstGeom>
             <a:solidFill>
-              <a:schemeClr val="accent1">
-                <a:lumMod val="40000"/>
-                <a:lumOff val="60000"/>
-              </a:schemeClr>
-            </a:solidFill>
-          </p:spPr>
-          <p:style>
-            <a:lnRef idx="2">
-              <a:schemeClr val="accent1">
-                <a:shade val="50000"/>
-              </a:schemeClr>
-            </a:lnRef>
-            <a:fillRef idx="1">
-              <a:schemeClr val="accent1"/>
-            </a:fillRef>
-            <a:effectRef idx="0">
-              <a:schemeClr val="accent1"/>
-            </a:effectRef>
-            <a:fontRef idx="minor">
-              <a:schemeClr val="lt1"/>
-            </a:fontRef>
-          </p:style>
-          <p:txBody>
-            <a:bodyPr rtlCol="0" anchor="t"/>
-            <a:lstStyle/>
-            <a:p>
-              <a:pPr algn="ctr"/>
-              <a:r>
-                <a:rPr lang="en-US" dirty="0">
-                  <a:solidFill>
-                    <a:schemeClr val="tx1"/>
-                  </a:solidFill>
-                </a:rPr>
-                <a:t>External network</a:t>
-              </a:r>
-            </a:p>
-          </p:txBody>
-        </p:sp>
-        <p:sp>
-          <p:nvSpPr>
-            <p:cNvPr id="11" name="Rectangle 10">
-              <a:extLst>
-                <a:ext uri="{FF2B5EF4-FFF2-40B4-BE49-F238E27FC236}">
-                  <a16:creationId xmlns:a16="http://schemas.microsoft.com/office/drawing/2014/main" id="{8E8C853E-C18C-4C7E-AA3A-424B23F9B2CE}"/>
-                </a:ext>
-              </a:extLst>
-            </p:cNvPr>
-            <p:cNvSpPr/>
-            <p:nvPr/>
-          </p:nvSpPr>
-          <p:spPr>
-            <a:xfrm>
-              <a:off x="5232732" y="1007707"/>
-              <a:ext cx="4640768" cy="5317593"/>
-            </a:xfrm>
-            <a:prstGeom prst="rect">
-              <a:avLst/>
-            </a:prstGeom>
-            <a:solidFill>
-              <a:schemeClr val="accent2">
-                <a:lumMod val="20000"/>
-                <a:lumOff val="80000"/>
-              </a:schemeClr>
-            </a:solidFill>
-          </p:spPr>
-          <p:style>
-            <a:lnRef idx="2">
-              <a:schemeClr val="accent1">
-                <a:shade val="50000"/>
-              </a:schemeClr>
-            </a:lnRef>
-            <a:fillRef idx="1">
-              <a:schemeClr val="accent1"/>
-            </a:fillRef>
-            <a:effectRef idx="0">
-              <a:schemeClr val="accent1"/>
-            </a:effectRef>
-            <a:fontRef idx="minor">
-              <a:schemeClr val="lt1"/>
-            </a:fontRef>
-          </p:style>
-          <p:txBody>
-            <a:bodyPr rtlCol="0" anchor="t"/>
-            <a:lstStyle/>
-            <a:p>
-              <a:pPr algn="ctr"/>
-              <a:r>
-                <a:rPr lang="en-US" dirty="0">
-                  <a:solidFill>
-                    <a:schemeClr val="tx1"/>
-                  </a:solidFill>
-                </a:rPr>
-                <a:t>Internal network</a:t>
-              </a:r>
-            </a:p>
-          </p:txBody>
-        </p:sp>
-        <p:sp>
-          <p:nvSpPr>
-            <p:cNvPr id="4" name="Rectangle 3">
-              <a:extLst>
-                <a:ext uri="{FF2B5EF4-FFF2-40B4-BE49-F238E27FC236}">
-                  <a16:creationId xmlns:a16="http://schemas.microsoft.com/office/drawing/2014/main" id="{2414CB02-95C6-44AA-9AED-06C0A6E570B1}"/>
-                </a:ext>
-              </a:extLst>
-            </p:cNvPr>
-            <p:cNvSpPr/>
-            <p:nvPr/>
-          </p:nvSpPr>
-          <p:spPr>
-            <a:xfrm>
-              <a:off x="4969293" y="1486671"/>
-              <a:ext cx="430235" cy="4437776"/>
-            </a:xfrm>
-            <a:prstGeom prst="rect">
-              <a:avLst/>
-            </a:prstGeom>
-          </p:spPr>
-          <p:style>
-            <a:lnRef idx="2">
-              <a:schemeClr val="accent1">
-                <a:shade val="50000"/>
-              </a:schemeClr>
-            </a:lnRef>
-            <a:fillRef idx="1">
-              <a:schemeClr val="accent1"/>
-            </a:fillRef>
-            <a:effectRef idx="0">
-              <a:schemeClr val="accent1"/>
-            </a:effectRef>
-            <a:fontRef idx="minor">
-              <a:schemeClr val="lt1"/>
-            </a:fontRef>
-          </p:style>
-          <p:txBody>
-            <a:bodyPr vert="vert270" rtlCol="0" anchor="ctr"/>
-            <a:lstStyle/>
-            <a:p>
-              <a:pPr algn="ctr"/>
-              <a:r>
-                <a:rPr lang="en-US" dirty="0"/>
-                <a:t>Public API, Auth service</a:t>
-              </a:r>
-            </a:p>
-          </p:txBody>
-        </p:sp>
-        <p:sp>
-          <p:nvSpPr>
-            <p:cNvPr id="5" name="Rectangle 4">
-              <a:extLst>
-                <a:ext uri="{FF2B5EF4-FFF2-40B4-BE49-F238E27FC236}">
-                  <a16:creationId xmlns:a16="http://schemas.microsoft.com/office/drawing/2014/main" id="{59FD6055-7E13-41FC-BA7A-25AFB4A1BB7D}"/>
-                </a:ext>
-              </a:extLst>
-            </p:cNvPr>
-            <p:cNvSpPr/>
-            <p:nvPr/>
-          </p:nvSpPr>
-          <p:spPr>
-            <a:xfrm>
-              <a:off x="6073629" y="1730744"/>
-              <a:ext cx="1048624" cy="557147"/>
-            </a:xfrm>
-            <a:prstGeom prst="rect">
-              <a:avLst/>
-            </a:prstGeom>
-          </p:spPr>
-          <p:style>
-            <a:lnRef idx="2">
-              <a:schemeClr val="accent1">
-                <a:shade val="50000"/>
-              </a:schemeClr>
-            </a:lnRef>
-            <a:fillRef idx="1">
-              <a:schemeClr val="accent1"/>
-            </a:fillRef>
-            <a:effectRef idx="0">
-              <a:schemeClr val="accent1"/>
-            </a:effectRef>
-            <a:fontRef idx="minor">
-              <a:schemeClr val="lt1"/>
-            </a:fontRef>
-          </p:style>
-          <p:txBody>
-            <a:bodyPr rtlCol="0" anchor="ctr"/>
-            <a:lstStyle/>
-            <a:p>
-              <a:pPr algn="ctr"/>
-              <a:r>
-                <a:rPr lang="en-US" dirty="0"/>
-                <a:t>User Service</a:t>
-              </a:r>
-            </a:p>
-          </p:txBody>
-        </p:sp>
-        <p:sp>
-          <p:nvSpPr>
-            <p:cNvPr id="6" name="Rectangle 5">
-              <a:extLst>
-                <a:ext uri="{FF2B5EF4-FFF2-40B4-BE49-F238E27FC236}">
-                  <a16:creationId xmlns:a16="http://schemas.microsoft.com/office/drawing/2014/main" id="{6A8BD9CB-D79C-41AF-B736-6C8567B4B5F1}"/>
-                </a:ext>
-              </a:extLst>
-            </p:cNvPr>
-            <p:cNvSpPr/>
-            <p:nvPr/>
-          </p:nvSpPr>
-          <p:spPr>
-            <a:xfrm>
-              <a:off x="6073629" y="2758045"/>
-              <a:ext cx="1048624" cy="557147"/>
-            </a:xfrm>
-            <a:prstGeom prst="rect">
-              <a:avLst/>
-            </a:prstGeom>
-          </p:spPr>
-          <p:style>
-            <a:lnRef idx="2">
-              <a:schemeClr val="accent1">
-                <a:shade val="50000"/>
-              </a:schemeClr>
-            </a:lnRef>
-            <a:fillRef idx="1">
-              <a:schemeClr val="accent1"/>
-            </a:fillRef>
-            <a:effectRef idx="0">
-              <a:schemeClr val="accent1"/>
-            </a:effectRef>
-            <a:fontRef idx="minor">
-              <a:schemeClr val="lt1"/>
-            </a:fontRef>
-          </p:style>
-          <p:txBody>
-            <a:bodyPr rtlCol="0" anchor="ctr"/>
-            <a:lstStyle/>
-            <a:p>
-              <a:pPr algn="ctr"/>
-              <a:r>
-                <a:rPr lang="en-US" dirty="0"/>
-                <a:t>Admin Service</a:t>
-              </a:r>
-            </a:p>
-          </p:txBody>
-        </p:sp>
-        <p:sp>
-          <p:nvSpPr>
-            <p:cNvPr id="7" name="Rectangle 6">
-              <a:extLst>
-                <a:ext uri="{FF2B5EF4-FFF2-40B4-BE49-F238E27FC236}">
-                  <a16:creationId xmlns:a16="http://schemas.microsoft.com/office/drawing/2014/main" id="{03D4D084-FD32-4658-A24C-4EA4AEFA4F0F}"/>
-                </a:ext>
-              </a:extLst>
-            </p:cNvPr>
-            <p:cNvSpPr/>
-            <p:nvPr/>
-          </p:nvSpPr>
-          <p:spPr>
-            <a:xfrm>
-              <a:off x="6073629" y="3858401"/>
-              <a:ext cx="1048624" cy="557147"/>
-            </a:xfrm>
-            <a:prstGeom prst="rect">
-              <a:avLst/>
-            </a:prstGeom>
-          </p:spPr>
-          <p:style>
-            <a:lnRef idx="2">
-              <a:schemeClr val="accent1">
-                <a:shade val="50000"/>
-              </a:schemeClr>
-            </a:lnRef>
-            <a:fillRef idx="1">
-              <a:schemeClr val="accent1"/>
-            </a:fillRef>
-            <a:effectRef idx="0">
-              <a:schemeClr val="accent1"/>
-            </a:effectRef>
-            <a:fontRef idx="minor">
-              <a:schemeClr val="lt1"/>
-            </a:fontRef>
-          </p:style>
-          <p:txBody>
-            <a:bodyPr rtlCol="0" anchor="ctr"/>
-            <a:lstStyle/>
-            <a:p>
-              <a:pPr algn="ctr"/>
-              <a:r>
-                <a:rPr lang="en-US" dirty="0"/>
-                <a:t>Courier Service</a:t>
-              </a:r>
-            </a:p>
-          </p:txBody>
-        </p:sp>
-        <p:sp>
-          <p:nvSpPr>
-            <p:cNvPr id="8" name="Rectangle 7">
-              <a:extLst>
-                <a:ext uri="{FF2B5EF4-FFF2-40B4-BE49-F238E27FC236}">
-                  <a16:creationId xmlns:a16="http://schemas.microsoft.com/office/drawing/2014/main" id="{73D09D61-F6A2-487E-B19F-267B075A2358}"/>
-                </a:ext>
-              </a:extLst>
-            </p:cNvPr>
-            <p:cNvSpPr/>
-            <p:nvPr/>
-          </p:nvSpPr>
-          <p:spPr>
-            <a:xfrm>
-              <a:off x="6073629" y="4958757"/>
-              <a:ext cx="1048624" cy="557147"/>
-            </a:xfrm>
-            <a:prstGeom prst="rect">
-              <a:avLst/>
-            </a:prstGeom>
-          </p:spPr>
-          <p:style>
-            <a:lnRef idx="2">
-              <a:schemeClr val="accent1">
-                <a:shade val="50000"/>
-              </a:schemeClr>
-            </a:lnRef>
-            <a:fillRef idx="1">
-              <a:schemeClr val="accent1"/>
-            </a:fillRef>
-            <a:effectRef idx="0">
-              <a:schemeClr val="accent1"/>
-            </a:effectRef>
-            <a:fontRef idx="minor">
-              <a:schemeClr val="lt1"/>
-            </a:fontRef>
-          </p:style>
-          <p:txBody>
-            <a:bodyPr rtlCol="0" anchor="ctr"/>
-            <a:lstStyle/>
-            <a:p>
-              <a:pPr algn="ctr"/>
-              <a:r>
-                <a:rPr lang="en-US" dirty="0"/>
-                <a:t>Client Service</a:t>
-              </a:r>
-            </a:p>
-          </p:txBody>
-        </p:sp>
-        <p:sp>
-          <p:nvSpPr>
-            <p:cNvPr id="10" name="Rectangle 9">
-              <a:extLst>
-                <a:ext uri="{FF2B5EF4-FFF2-40B4-BE49-F238E27FC236}">
-                  <a16:creationId xmlns:a16="http://schemas.microsoft.com/office/drawing/2014/main" id="{37381378-587F-4DF9-9F62-33930987FC23}"/>
-                </a:ext>
-              </a:extLst>
-            </p:cNvPr>
-            <p:cNvSpPr/>
-            <p:nvPr/>
-          </p:nvSpPr>
-          <p:spPr>
-            <a:xfrm>
-              <a:off x="8948627" y="1447616"/>
-              <a:ext cx="298579" cy="4437776"/>
-            </a:xfrm>
-            <a:prstGeom prst="rect">
-              <a:avLst/>
-            </a:prstGeom>
-            <a:solidFill>
-              <a:schemeClr val="accent6">
-                <a:lumMod val="60000"/>
-                <a:lumOff val="40000"/>
-              </a:schemeClr>
-            </a:solidFill>
-          </p:spPr>
-          <p:style>
-            <a:lnRef idx="2">
-              <a:schemeClr val="accent1">
-                <a:shade val="50000"/>
-              </a:schemeClr>
-            </a:lnRef>
-            <a:fillRef idx="1">
-              <a:schemeClr val="accent1"/>
-            </a:fillRef>
-            <a:effectRef idx="0">
-              <a:schemeClr val="accent1"/>
-            </a:effectRef>
-            <a:fontRef idx="minor">
-              <a:schemeClr val="lt1"/>
-            </a:fontRef>
-          </p:style>
-          <p:txBody>
-            <a:bodyPr vert="vert270" rtlCol="0" anchor="ctr"/>
-            <a:lstStyle/>
-            <a:p>
-              <a:pPr algn="ctr"/>
-              <a:r>
-                <a:rPr lang="en-US" dirty="0"/>
-                <a:t>AMQP</a:t>
-              </a:r>
-              <a:endParaRPr lang="ru-RU" dirty="0"/>
-            </a:p>
-          </p:txBody>
-        </p:sp>
-        <p:sp>
-          <p:nvSpPr>
-            <p:cNvPr id="12" name="Cylinder 11">
-              <a:extLst>
-                <a:ext uri="{FF2B5EF4-FFF2-40B4-BE49-F238E27FC236}">
-                  <a16:creationId xmlns:a16="http://schemas.microsoft.com/office/drawing/2014/main" id="{FD826414-1850-41E8-8E5F-862D193DFB8F}"/>
-                </a:ext>
-              </a:extLst>
-            </p:cNvPr>
-            <p:cNvSpPr/>
-            <p:nvPr/>
-          </p:nvSpPr>
-          <p:spPr>
-            <a:xfrm>
-              <a:off x="7027549" y="2116714"/>
-              <a:ext cx="298579" cy="342354"/>
-            </a:xfrm>
-            <a:prstGeom prst="can">
-              <a:avLst/>
-            </a:prstGeom>
-            <a:solidFill>
-              <a:schemeClr val="accent2">
-                <a:lumMod val="75000"/>
-              </a:schemeClr>
+              <a:srgbClr val="FFFF00"/>
             </a:solidFill>
           </p:spPr>
           <p:style>
@@ -3864,16 +4311,73 @@
             <a:lstStyle/>
             <a:p>
               <a:pPr algn="ctr"/>
-              <a:endParaRPr lang="ru-RU"/>
+              <a:endParaRPr lang="ru-RU" dirty="0"/>
             </a:p>
           </p:txBody>
         </p:sp>
         <p:sp>
           <p:nvSpPr>
-            <p:cNvPr id="16" name="Cylinder 15">
+            <p:cNvPr id="33" name="TextBox 32">
               <a:extLst>
                 <a:ext uri="{FF2B5EF4-FFF2-40B4-BE49-F238E27FC236}">
-                  <a16:creationId xmlns:a16="http://schemas.microsoft.com/office/drawing/2014/main" id="{3EB51B1F-23FD-45E0-A6CB-13275B762522}"/>
+                  <a16:creationId xmlns:a16="http://schemas.microsoft.com/office/drawing/2014/main" id="{61575CCB-F257-4AFF-BFD2-C5402BD1CE86}"/>
+                </a:ext>
+              </a:extLst>
+            </p:cNvPr>
+            <p:cNvSpPr txBox="1"/>
+            <p:nvPr/>
+          </p:nvSpPr>
+          <p:spPr>
+            <a:xfrm>
+              <a:off x="1224836" y="2942877"/>
+              <a:ext cx="543739" cy="261610"/>
+            </a:xfrm>
+            <a:prstGeom prst="rect">
+              <a:avLst/>
+            </a:prstGeom>
+            <a:noFill/>
+          </p:spPr>
+          <p:txBody>
+            <a:bodyPr wrap="none" rtlCol="0">
+              <a:spAutoFit/>
+            </a:bodyPr>
+            <a:lstStyle/>
+            <a:p>
+              <a:r>
+                <a:rPr lang="en-US" sz="1100" dirty="0"/>
+                <a:t>admin</a:t>
+              </a:r>
+              <a:endParaRPr lang="ru-RU" sz="1100" dirty="0"/>
+            </a:p>
+          </p:txBody>
+        </p:sp>
+      </p:grpSp>
+      <p:grpSp>
+        <p:nvGrpSpPr>
+          <p:cNvPr id="35" name="Group 34">
+            <a:extLst>
+              <a:ext uri="{FF2B5EF4-FFF2-40B4-BE49-F238E27FC236}">
+                <a16:creationId xmlns:a16="http://schemas.microsoft.com/office/drawing/2014/main" id="{3FA2F11C-4917-441D-BD02-E4580E6B1C0D}"/>
+              </a:ext>
+            </a:extLst>
+          </p:cNvPr>
+          <p:cNvGrpSpPr/>
+          <p:nvPr/>
+        </p:nvGrpSpPr>
+        <p:grpSpPr>
+          <a:xfrm>
+            <a:off x="2670920" y="3296315"/>
+            <a:ext cx="593432" cy="506485"/>
+            <a:chOff x="1199989" y="3411850"/>
+            <a:chExt cx="593432" cy="506485"/>
+          </a:xfrm>
+        </p:grpSpPr>
+        <p:sp>
+          <p:nvSpPr>
+            <p:cNvPr id="29" name="Smiley Face 28">
+              <a:extLst>
+                <a:ext uri="{FF2B5EF4-FFF2-40B4-BE49-F238E27FC236}">
+                  <a16:creationId xmlns:a16="http://schemas.microsoft.com/office/drawing/2014/main" id="{E5E3BD20-A4B3-462D-A3A5-88B57B1F6B6A}"/>
                 </a:ext>
               </a:extLst>
             </p:cNvPr>
@@ -3882,16 +4386,14 @@
           </p:nvSpPr>
           <p:spPr>
             <a:xfrm>
-              <a:off x="7027992" y="3147609"/>
-              <a:ext cx="298579" cy="342354"/>
+              <a:off x="1359018" y="3411850"/>
+              <a:ext cx="293614" cy="287695"/>
             </a:xfrm>
-            <a:prstGeom prst="can">
+            <a:prstGeom prst="smileyFace">
               <a:avLst/>
             </a:prstGeom>
             <a:solidFill>
-              <a:schemeClr val="accent2">
-                <a:lumMod val="75000"/>
-              </a:schemeClr>
+              <a:srgbClr val="FFFF00"/>
             </a:solidFill>
           </p:spPr>
           <p:style>
@@ -3915,16 +4417,73 @@
             <a:lstStyle/>
             <a:p>
               <a:pPr algn="ctr"/>
-              <a:endParaRPr lang="ru-RU"/>
+              <a:endParaRPr lang="ru-RU" dirty="0"/>
             </a:p>
           </p:txBody>
         </p:sp>
         <p:sp>
           <p:nvSpPr>
-            <p:cNvPr id="17" name="Cylinder 16">
+            <p:cNvPr id="34" name="TextBox 33">
               <a:extLst>
                 <a:ext uri="{FF2B5EF4-FFF2-40B4-BE49-F238E27FC236}">
-                  <a16:creationId xmlns:a16="http://schemas.microsoft.com/office/drawing/2014/main" id="{920F3F06-CBA2-4CA5-9B24-C662382A45A5}"/>
+                  <a16:creationId xmlns:a16="http://schemas.microsoft.com/office/drawing/2014/main" id="{D5F420B2-0E81-4510-BC94-7FA214C19169}"/>
+                </a:ext>
+              </a:extLst>
+            </p:cNvPr>
+            <p:cNvSpPr txBox="1"/>
+            <p:nvPr/>
+          </p:nvSpPr>
+          <p:spPr>
+            <a:xfrm>
+              <a:off x="1199989" y="3656725"/>
+              <a:ext cx="593432" cy="261610"/>
+            </a:xfrm>
+            <a:prstGeom prst="rect">
+              <a:avLst/>
+            </a:prstGeom>
+            <a:noFill/>
+          </p:spPr>
+          <p:txBody>
+            <a:bodyPr wrap="none" rtlCol="0">
+              <a:spAutoFit/>
+            </a:bodyPr>
+            <a:lstStyle/>
+            <a:p>
+              <a:r>
+                <a:rPr lang="en-US" sz="1100" dirty="0"/>
+                <a:t>courier</a:t>
+              </a:r>
+              <a:endParaRPr lang="ru-RU" sz="1100" dirty="0"/>
+            </a:p>
+          </p:txBody>
+        </p:sp>
+      </p:grpSp>
+      <p:grpSp>
+        <p:nvGrpSpPr>
+          <p:cNvPr id="36" name="Group 35">
+            <a:extLst>
+              <a:ext uri="{FF2B5EF4-FFF2-40B4-BE49-F238E27FC236}">
+                <a16:creationId xmlns:a16="http://schemas.microsoft.com/office/drawing/2014/main" id="{208EAC00-F930-44D6-A637-BF7F6EFA4A3C}"/>
+              </a:ext>
+            </a:extLst>
+          </p:cNvPr>
+          <p:cNvGrpSpPr/>
+          <p:nvPr/>
+        </p:nvGrpSpPr>
+        <p:grpSpPr>
+          <a:xfrm>
+            <a:off x="2662980" y="4347496"/>
+            <a:ext cx="530915" cy="506485"/>
+            <a:chOff x="1199989" y="3411850"/>
+            <a:chExt cx="530915" cy="506485"/>
+          </a:xfrm>
+        </p:grpSpPr>
+        <p:sp>
+          <p:nvSpPr>
+            <p:cNvPr id="37" name="Smiley Face 36">
+              <a:extLst>
+                <a:ext uri="{FF2B5EF4-FFF2-40B4-BE49-F238E27FC236}">
+                  <a16:creationId xmlns:a16="http://schemas.microsoft.com/office/drawing/2014/main" id="{29DF5B8A-FA15-444C-A868-581205AA5242}"/>
                 </a:ext>
               </a:extLst>
             </p:cNvPr>
@@ -3933,16 +4492,14 @@
           </p:nvSpPr>
           <p:spPr>
             <a:xfrm>
-              <a:off x="7017064" y="4258385"/>
-              <a:ext cx="298579" cy="342354"/>
+              <a:off x="1359018" y="3411850"/>
+              <a:ext cx="293614" cy="287695"/>
             </a:xfrm>
-            <a:prstGeom prst="can">
+            <a:prstGeom prst="smileyFace">
               <a:avLst/>
             </a:prstGeom>
             <a:solidFill>
-              <a:schemeClr val="accent2">
-                <a:lumMod val="75000"/>
-              </a:schemeClr>
+              <a:srgbClr val="FFFF00"/>
             </a:solidFill>
           </p:spPr>
           <p:style>
@@ -3966,1225 +4523,1044 @@
             <a:lstStyle/>
             <a:p>
               <a:pPr algn="ctr"/>
-              <a:endParaRPr lang="ru-RU"/>
+              <a:endParaRPr lang="ru-RU" dirty="0"/>
             </a:p>
           </p:txBody>
         </p:sp>
         <p:sp>
           <p:nvSpPr>
-            <p:cNvPr id="18" name="Cylinder 17">
+            <p:cNvPr id="38" name="TextBox 37">
               <a:extLst>
                 <a:ext uri="{FF2B5EF4-FFF2-40B4-BE49-F238E27FC236}">
-                  <a16:creationId xmlns:a16="http://schemas.microsoft.com/office/drawing/2014/main" id="{C4C76896-2F99-4F5B-B4F2-B0ACCEAC8A5C}"/>
+                  <a16:creationId xmlns:a16="http://schemas.microsoft.com/office/drawing/2014/main" id="{F3BA2DC2-F3DD-419F-ABE3-85DB2691E8B0}"/>
                 </a:ext>
               </a:extLst>
             </p:cNvPr>
-            <p:cNvSpPr/>
+            <p:cNvSpPr txBox="1"/>
             <p:nvPr/>
           </p:nvSpPr>
           <p:spPr>
             <a:xfrm>
-              <a:off x="7059106" y="5369161"/>
-              <a:ext cx="298579" cy="342354"/>
-            </a:xfrm>
-            <a:prstGeom prst="can">
-              <a:avLst/>
-            </a:prstGeom>
-            <a:solidFill>
-              <a:schemeClr val="accent2">
-                <a:lumMod val="75000"/>
-              </a:schemeClr>
-            </a:solidFill>
-          </p:spPr>
-          <p:style>
-            <a:lnRef idx="2">
-              <a:schemeClr val="accent1">
-                <a:shade val="50000"/>
-              </a:schemeClr>
-            </a:lnRef>
-            <a:fillRef idx="1">
-              <a:schemeClr val="accent1"/>
-            </a:fillRef>
-            <a:effectRef idx="0">
-              <a:schemeClr val="accent1"/>
-            </a:effectRef>
-            <a:fontRef idx="minor">
-              <a:schemeClr val="lt1"/>
-            </a:fontRef>
-          </p:style>
-          <p:txBody>
-            <a:bodyPr rtlCol="0" anchor="ctr"/>
-            <a:lstStyle/>
-            <a:p>
-              <a:pPr algn="ctr"/>
-              <a:endParaRPr lang="ru-RU"/>
-            </a:p>
-          </p:txBody>
-        </p:sp>
-        <p:sp>
-          <p:nvSpPr>
-            <p:cNvPr id="19" name="Arrow: Left-Right 18">
-              <a:extLst>
-                <a:ext uri="{FF2B5EF4-FFF2-40B4-BE49-F238E27FC236}">
-                  <a16:creationId xmlns:a16="http://schemas.microsoft.com/office/drawing/2014/main" id="{98DB5C20-1B09-4695-88B4-1873AF2947F1}"/>
-                </a:ext>
-              </a:extLst>
-            </p:cNvPr>
-            <p:cNvSpPr/>
-            <p:nvPr/>
-          </p:nvSpPr>
-          <p:spPr>
-            <a:xfrm>
-              <a:off x="7121810" y="1891377"/>
-              <a:ext cx="1825931" cy="174771"/>
-            </a:xfrm>
-            <a:prstGeom prst="leftRightArrow">
-              <a:avLst/>
-            </a:prstGeom>
-            <a:solidFill>
-              <a:schemeClr val="accent6">
-                <a:lumMod val="60000"/>
-                <a:lumOff val="40000"/>
-              </a:schemeClr>
-            </a:solidFill>
-          </p:spPr>
-          <p:style>
-            <a:lnRef idx="2">
-              <a:schemeClr val="accent1">
-                <a:shade val="50000"/>
-              </a:schemeClr>
-            </a:lnRef>
-            <a:fillRef idx="1">
-              <a:schemeClr val="accent1"/>
-            </a:fillRef>
-            <a:effectRef idx="0">
-              <a:schemeClr val="accent1"/>
-            </a:effectRef>
-            <a:fontRef idx="minor">
-              <a:schemeClr val="lt1"/>
-            </a:fontRef>
-          </p:style>
-          <p:txBody>
-            <a:bodyPr rtlCol="0" anchor="ctr"/>
-            <a:lstStyle/>
-            <a:p>
-              <a:pPr algn="ctr"/>
-              <a:endParaRPr lang="ru-RU"/>
-            </a:p>
-          </p:txBody>
-        </p:sp>
-        <p:sp>
-          <p:nvSpPr>
-            <p:cNvPr id="20" name="Arrow: Left-Right 19">
-              <a:extLst>
-                <a:ext uri="{FF2B5EF4-FFF2-40B4-BE49-F238E27FC236}">
-                  <a16:creationId xmlns:a16="http://schemas.microsoft.com/office/drawing/2014/main" id="{F1A3DA78-D4B2-4C9A-8756-538A8CB3EEAA}"/>
-                </a:ext>
-              </a:extLst>
-            </p:cNvPr>
-            <p:cNvSpPr/>
-            <p:nvPr/>
-          </p:nvSpPr>
-          <p:spPr>
-            <a:xfrm>
-              <a:off x="7121810" y="2934902"/>
-              <a:ext cx="1825931" cy="174771"/>
-            </a:xfrm>
-            <a:prstGeom prst="leftRightArrow">
-              <a:avLst/>
-            </a:prstGeom>
-            <a:solidFill>
-              <a:schemeClr val="accent6">
-                <a:lumMod val="60000"/>
-                <a:lumOff val="40000"/>
-              </a:schemeClr>
-            </a:solidFill>
-          </p:spPr>
-          <p:style>
-            <a:lnRef idx="2">
-              <a:schemeClr val="accent1">
-                <a:shade val="50000"/>
-              </a:schemeClr>
-            </a:lnRef>
-            <a:fillRef idx="1">
-              <a:schemeClr val="accent1"/>
-            </a:fillRef>
-            <a:effectRef idx="0">
-              <a:schemeClr val="accent1"/>
-            </a:effectRef>
-            <a:fontRef idx="minor">
-              <a:schemeClr val="lt1"/>
-            </a:fontRef>
-          </p:style>
-          <p:txBody>
-            <a:bodyPr rtlCol="0" anchor="ctr"/>
-            <a:lstStyle/>
-            <a:p>
-              <a:pPr algn="ctr"/>
-              <a:endParaRPr lang="ru-RU"/>
-            </a:p>
-          </p:txBody>
-        </p:sp>
-        <p:sp>
-          <p:nvSpPr>
-            <p:cNvPr id="21" name="Arrow: Left-Right 20">
-              <a:extLst>
-                <a:ext uri="{FF2B5EF4-FFF2-40B4-BE49-F238E27FC236}">
-                  <a16:creationId xmlns:a16="http://schemas.microsoft.com/office/drawing/2014/main" id="{48AAC031-F9ED-4602-8441-0D2CA73F84A0}"/>
-                </a:ext>
-              </a:extLst>
-            </p:cNvPr>
-            <p:cNvSpPr/>
-            <p:nvPr/>
-          </p:nvSpPr>
-          <p:spPr>
-            <a:xfrm>
-              <a:off x="7121809" y="4065924"/>
-              <a:ext cx="1825931" cy="174771"/>
-            </a:xfrm>
-            <a:prstGeom prst="leftRightArrow">
-              <a:avLst/>
-            </a:prstGeom>
-            <a:solidFill>
-              <a:schemeClr val="accent6">
-                <a:lumMod val="60000"/>
-                <a:lumOff val="40000"/>
-              </a:schemeClr>
-            </a:solidFill>
-          </p:spPr>
-          <p:style>
-            <a:lnRef idx="2">
-              <a:schemeClr val="accent1">
-                <a:shade val="50000"/>
-              </a:schemeClr>
-            </a:lnRef>
-            <a:fillRef idx="1">
-              <a:schemeClr val="accent1"/>
-            </a:fillRef>
-            <a:effectRef idx="0">
-              <a:schemeClr val="accent1"/>
-            </a:effectRef>
-            <a:fontRef idx="minor">
-              <a:schemeClr val="lt1"/>
-            </a:fontRef>
-          </p:style>
-          <p:txBody>
-            <a:bodyPr rtlCol="0" anchor="ctr"/>
-            <a:lstStyle/>
-            <a:p>
-              <a:pPr algn="ctr"/>
-              <a:endParaRPr lang="ru-RU"/>
-            </a:p>
-          </p:txBody>
-        </p:sp>
-        <p:sp>
-          <p:nvSpPr>
-            <p:cNvPr id="22" name="Arrow: Left-Right 21">
-              <a:extLst>
-                <a:ext uri="{FF2B5EF4-FFF2-40B4-BE49-F238E27FC236}">
-                  <a16:creationId xmlns:a16="http://schemas.microsoft.com/office/drawing/2014/main" id="{B2F72A7A-03F1-4E7C-89C3-6E7AE64B88F2}"/>
-                </a:ext>
-              </a:extLst>
-            </p:cNvPr>
-            <p:cNvSpPr/>
-            <p:nvPr/>
-          </p:nvSpPr>
-          <p:spPr>
-            <a:xfrm>
-              <a:off x="7121809" y="5117176"/>
-              <a:ext cx="1825931" cy="174771"/>
-            </a:xfrm>
-            <a:prstGeom prst="leftRightArrow">
-              <a:avLst/>
-            </a:prstGeom>
-            <a:solidFill>
-              <a:schemeClr val="accent6">
-                <a:lumMod val="60000"/>
-                <a:lumOff val="40000"/>
-              </a:schemeClr>
-            </a:solidFill>
-          </p:spPr>
-          <p:style>
-            <a:lnRef idx="2">
-              <a:schemeClr val="accent1">
-                <a:shade val="50000"/>
-              </a:schemeClr>
-            </a:lnRef>
-            <a:fillRef idx="1">
-              <a:schemeClr val="accent1"/>
-            </a:fillRef>
-            <a:effectRef idx="0">
-              <a:schemeClr val="accent1"/>
-            </a:effectRef>
-            <a:fontRef idx="minor">
-              <a:schemeClr val="lt1"/>
-            </a:fontRef>
-          </p:style>
-          <p:txBody>
-            <a:bodyPr rtlCol="0" anchor="ctr"/>
-            <a:lstStyle/>
-            <a:p>
-              <a:pPr algn="ctr"/>
-              <a:endParaRPr lang="ru-RU"/>
-            </a:p>
-          </p:txBody>
-        </p:sp>
-        <p:sp>
-          <p:nvSpPr>
-            <p:cNvPr id="23" name="Arrow: Up-Down 22">
-              <a:extLst>
-                <a:ext uri="{FF2B5EF4-FFF2-40B4-BE49-F238E27FC236}">
-                  <a16:creationId xmlns:a16="http://schemas.microsoft.com/office/drawing/2014/main" id="{AFB8F4A7-2D10-4EB6-9CEF-A8CBD4641B49}"/>
-                </a:ext>
-              </a:extLst>
-            </p:cNvPr>
-            <p:cNvSpPr/>
-            <p:nvPr/>
-          </p:nvSpPr>
-          <p:spPr>
-            <a:xfrm>
-              <a:off x="6547607" y="2287891"/>
-              <a:ext cx="104863" cy="470154"/>
-            </a:xfrm>
-            <a:prstGeom prst="upDownArrow">
-              <a:avLst/>
-            </a:prstGeom>
-            <a:solidFill>
-              <a:schemeClr val="accent5">
-                <a:lumMod val="60000"/>
-                <a:lumOff val="40000"/>
-              </a:schemeClr>
-            </a:solidFill>
-          </p:spPr>
-          <p:style>
-            <a:lnRef idx="2">
-              <a:schemeClr val="accent1">
-                <a:shade val="50000"/>
-              </a:schemeClr>
-            </a:lnRef>
-            <a:fillRef idx="1">
-              <a:schemeClr val="accent1"/>
-            </a:fillRef>
-            <a:effectRef idx="0">
-              <a:schemeClr val="accent1"/>
-            </a:effectRef>
-            <a:fontRef idx="minor">
-              <a:schemeClr val="lt1"/>
-            </a:fontRef>
-          </p:style>
-          <p:txBody>
-            <a:bodyPr rtlCol="0" anchor="ctr"/>
-            <a:lstStyle/>
-            <a:p>
-              <a:pPr algn="ctr"/>
-              <a:endParaRPr lang="ru-RU"/>
-            </a:p>
-          </p:txBody>
-        </p:sp>
-        <p:sp>
-          <p:nvSpPr>
-            <p:cNvPr id="25" name="Arrow: Left-Right 24">
-              <a:extLst>
-                <a:ext uri="{FF2B5EF4-FFF2-40B4-BE49-F238E27FC236}">
-                  <a16:creationId xmlns:a16="http://schemas.microsoft.com/office/drawing/2014/main" id="{3F65F36E-CD7F-4858-ADF1-7C93539AA381}"/>
-                </a:ext>
-              </a:extLst>
-            </p:cNvPr>
-            <p:cNvSpPr/>
-            <p:nvPr/>
-          </p:nvSpPr>
-          <p:spPr>
-            <a:xfrm>
-              <a:off x="5399528" y="1924311"/>
-              <a:ext cx="673215" cy="108901"/>
-            </a:xfrm>
-            <a:prstGeom prst="leftRightArrow">
-              <a:avLst/>
-            </a:prstGeom>
-          </p:spPr>
-          <p:style>
-            <a:lnRef idx="2">
-              <a:schemeClr val="accent1">
-                <a:shade val="50000"/>
-              </a:schemeClr>
-            </a:lnRef>
-            <a:fillRef idx="1">
-              <a:schemeClr val="accent1"/>
-            </a:fillRef>
-            <a:effectRef idx="0">
-              <a:schemeClr val="accent1"/>
-            </a:effectRef>
-            <a:fontRef idx="minor">
-              <a:schemeClr val="lt1"/>
-            </a:fontRef>
-          </p:style>
-          <p:txBody>
-            <a:bodyPr rtlCol="0" anchor="ctr"/>
-            <a:lstStyle/>
-            <a:p>
-              <a:pPr algn="ctr"/>
-              <a:endParaRPr lang="ru-RU"/>
-            </a:p>
-          </p:txBody>
-        </p:sp>
-        <p:sp>
-          <p:nvSpPr>
-            <p:cNvPr id="26" name="Arrow: Left-Right 25">
-              <a:extLst>
-                <a:ext uri="{FF2B5EF4-FFF2-40B4-BE49-F238E27FC236}">
-                  <a16:creationId xmlns:a16="http://schemas.microsoft.com/office/drawing/2014/main" id="{6EEF3ABD-19EF-4E60-997B-F7A1A4915AF9}"/>
-                </a:ext>
-              </a:extLst>
-            </p:cNvPr>
-            <p:cNvSpPr/>
-            <p:nvPr/>
-          </p:nvSpPr>
-          <p:spPr>
-            <a:xfrm>
-              <a:off x="5399528" y="2976986"/>
-              <a:ext cx="673215" cy="108901"/>
-            </a:xfrm>
-            <a:prstGeom prst="leftRightArrow">
-              <a:avLst/>
-            </a:prstGeom>
-          </p:spPr>
-          <p:style>
-            <a:lnRef idx="2">
-              <a:schemeClr val="accent1">
-                <a:shade val="50000"/>
-              </a:schemeClr>
-            </a:lnRef>
-            <a:fillRef idx="1">
-              <a:schemeClr val="accent1"/>
-            </a:fillRef>
-            <a:effectRef idx="0">
-              <a:schemeClr val="accent1"/>
-            </a:effectRef>
-            <a:fontRef idx="minor">
-              <a:schemeClr val="lt1"/>
-            </a:fontRef>
-          </p:style>
-          <p:txBody>
-            <a:bodyPr rtlCol="0" anchor="ctr"/>
-            <a:lstStyle/>
-            <a:p>
-              <a:pPr algn="ctr"/>
-              <a:endParaRPr lang="ru-RU"/>
-            </a:p>
-          </p:txBody>
-        </p:sp>
-        <p:sp>
-          <p:nvSpPr>
-            <p:cNvPr id="27" name="Arrow: Left-Right 26">
-              <a:extLst>
-                <a:ext uri="{FF2B5EF4-FFF2-40B4-BE49-F238E27FC236}">
-                  <a16:creationId xmlns:a16="http://schemas.microsoft.com/office/drawing/2014/main" id="{3BF5FB62-933D-4DCD-A229-A235D9F84C53}"/>
-                </a:ext>
-              </a:extLst>
-            </p:cNvPr>
-            <p:cNvSpPr/>
-            <p:nvPr/>
-          </p:nvSpPr>
-          <p:spPr>
-            <a:xfrm>
-              <a:off x="5399528" y="4094910"/>
-              <a:ext cx="673215" cy="108901"/>
-            </a:xfrm>
-            <a:prstGeom prst="leftRightArrow">
-              <a:avLst/>
-            </a:prstGeom>
-          </p:spPr>
-          <p:style>
-            <a:lnRef idx="2">
-              <a:schemeClr val="accent1">
-                <a:shade val="50000"/>
-              </a:schemeClr>
-            </a:lnRef>
-            <a:fillRef idx="1">
-              <a:schemeClr val="accent1"/>
-            </a:fillRef>
-            <a:effectRef idx="0">
-              <a:schemeClr val="accent1"/>
-            </a:effectRef>
-            <a:fontRef idx="minor">
-              <a:schemeClr val="lt1"/>
-            </a:fontRef>
-          </p:style>
-          <p:txBody>
-            <a:bodyPr rtlCol="0" anchor="ctr"/>
-            <a:lstStyle/>
-            <a:p>
-              <a:pPr algn="ctr"/>
-              <a:endParaRPr lang="ru-RU"/>
-            </a:p>
-          </p:txBody>
-        </p:sp>
-        <p:sp>
-          <p:nvSpPr>
-            <p:cNvPr id="28" name="Arrow: Left-Right 27">
-              <a:extLst>
-                <a:ext uri="{FF2B5EF4-FFF2-40B4-BE49-F238E27FC236}">
-                  <a16:creationId xmlns:a16="http://schemas.microsoft.com/office/drawing/2014/main" id="{24673765-F87A-41FD-AAA7-047886AC2EF9}"/>
-                </a:ext>
-              </a:extLst>
-            </p:cNvPr>
-            <p:cNvSpPr/>
-            <p:nvPr/>
-          </p:nvSpPr>
-          <p:spPr>
-            <a:xfrm>
-              <a:off x="5391960" y="5196248"/>
-              <a:ext cx="673215" cy="108901"/>
-            </a:xfrm>
-            <a:prstGeom prst="leftRightArrow">
-              <a:avLst/>
-            </a:prstGeom>
-          </p:spPr>
-          <p:style>
-            <a:lnRef idx="2">
-              <a:schemeClr val="accent1">
-                <a:shade val="50000"/>
-              </a:schemeClr>
-            </a:lnRef>
-            <a:fillRef idx="1">
-              <a:schemeClr val="accent1"/>
-            </a:fillRef>
-            <a:effectRef idx="0">
-              <a:schemeClr val="accent1"/>
-            </a:effectRef>
-            <a:fontRef idx="minor">
-              <a:schemeClr val="lt1"/>
-            </a:fontRef>
-          </p:style>
-          <p:txBody>
-            <a:bodyPr rtlCol="0" anchor="ctr"/>
-            <a:lstStyle/>
-            <a:p>
-              <a:pPr algn="ctr"/>
-              <a:endParaRPr lang="ru-RU"/>
-            </a:p>
-          </p:txBody>
-        </p:sp>
-        <p:grpSp>
-          <p:nvGrpSpPr>
-            <p:cNvPr id="39" name="Group 38">
-              <a:extLst>
-                <a:ext uri="{FF2B5EF4-FFF2-40B4-BE49-F238E27FC236}">
-                  <a16:creationId xmlns:a16="http://schemas.microsoft.com/office/drawing/2014/main" id="{36FA3D66-196C-4EA2-A6E9-81097D336D74}"/>
-                </a:ext>
-              </a:extLst>
-            </p:cNvPr>
-            <p:cNvGrpSpPr/>
-            <p:nvPr/>
-          </p:nvGrpSpPr>
-          <p:grpSpPr>
-            <a:xfrm>
-              <a:off x="2720613" y="2257172"/>
-              <a:ext cx="543739" cy="531592"/>
-              <a:chOff x="1224836" y="2672895"/>
-              <a:chExt cx="543739" cy="531592"/>
-            </a:xfrm>
-          </p:grpSpPr>
-          <p:sp>
-            <p:nvSpPr>
-              <p:cNvPr id="31" name="Smiley Face 30">
-                <a:extLst>
-                  <a:ext uri="{FF2B5EF4-FFF2-40B4-BE49-F238E27FC236}">
-                    <a16:creationId xmlns:a16="http://schemas.microsoft.com/office/drawing/2014/main" id="{9AB33322-F2A5-4D30-BA30-C2230184A64D}"/>
-                  </a:ext>
-                </a:extLst>
-              </p:cNvPr>
-              <p:cNvSpPr/>
-              <p:nvPr/>
-            </p:nvSpPr>
-            <p:spPr>
-              <a:xfrm>
-                <a:off x="1359018" y="2672895"/>
-                <a:ext cx="293614" cy="287695"/>
-              </a:xfrm>
-              <a:prstGeom prst="smileyFace">
-                <a:avLst/>
-              </a:prstGeom>
-              <a:solidFill>
-                <a:srgbClr val="FFFF00"/>
-              </a:solidFill>
-            </p:spPr>
-            <p:style>
-              <a:lnRef idx="2">
-                <a:schemeClr val="accent1">
-                  <a:shade val="50000"/>
-                </a:schemeClr>
-              </a:lnRef>
-              <a:fillRef idx="1">
-                <a:schemeClr val="accent1"/>
-              </a:fillRef>
-              <a:effectRef idx="0">
-                <a:schemeClr val="accent1"/>
-              </a:effectRef>
-              <a:fontRef idx="minor">
-                <a:schemeClr val="lt1"/>
-              </a:fontRef>
-            </p:style>
-            <p:txBody>
-              <a:bodyPr rtlCol="0" anchor="ctr"/>
-              <a:lstStyle/>
-              <a:p>
-                <a:pPr algn="ctr"/>
-                <a:endParaRPr lang="ru-RU" dirty="0"/>
-              </a:p>
-            </p:txBody>
-          </p:sp>
-          <p:sp>
-            <p:nvSpPr>
-              <p:cNvPr id="33" name="TextBox 32">
-                <a:extLst>
-                  <a:ext uri="{FF2B5EF4-FFF2-40B4-BE49-F238E27FC236}">
-                    <a16:creationId xmlns:a16="http://schemas.microsoft.com/office/drawing/2014/main" id="{61575CCB-F257-4AFF-BFD2-C5402BD1CE86}"/>
-                  </a:ext>
-                </a:extLst>
-              </p:cNvPr>
-              <p:cNvSpPr txBox="1"/>
-              <p:nvPr/>
-            </p:nvSpPr>
-            <p:spPr>
-              <a:xfrm>
-                <a:off x="1224836" y="2942877"/>
-                <a:ext cx="543739" cy="261610"/>
-              </a:xfrm>
-              <a:prstGeom prst="rect">
-                <a:avLst/>
-              </a:prstGeom>
-              <a:noFill/>
-            </p:spPr>
-            <p:txBody>
-              <a:bodyPr wrap="none" rtlCol="0">
-                <a:spAutoFit/>
-              </a:bodyPr>
-              <a:lstStyle/>
-              <a:p>
-                <a:r>
-                  <a:rPr lang="en-US" sz="1100" dirty="0"/>
-                  <a:t>admin</a:t>
-                </a:r>
-                <a:endParaRPr lang="ru-RU" sz="1100" dirty="0"/>
-              </a:p>
-            </p:txBody>
-          </p:sp>
-        </p:grpSp>
-        <p:grpSp>
-          <p:nvGrpSpPr>
-            <p:cNvPr id="35" name="Group 34">
-              <a:extLst>
-                <a:ext uri="{FF2B5EF4-FFF2-40B4-BE49-F238E27FC236}">
-                  <a16:creationId xmlns:a16="http://schemas.microsoft.com/office/drawing/2014/main" id="{3FA2F11C-4917-441D-BD02-E4580E6B1C0D}"/>
-                </a:ext>
-              </a:extLst>
-            </p:cNvPr>
-            <p:cNvGrpSpPr/>
-            <p:nvPr/>
-          </p:nvGrpSpPr>
-          <p:grpSpPr>
-            <a:xfrm>
-              <a:off x="2670920" y="3296315"/>
-              <a:ext cx="593432" cy="506485"/>
-              <a:chOff x="1199989" y="3411850"/>
-              <a:chExt cx="593432" cy="506485"/>
-            </a:xfrm>
-          </p:grpSpPr>
-          <p:sp>
-            <p:nvSpPr>
-              <p:cNvPr id="29" name="Smiley Face 28">
-                <a:extLst>
-                  <a:ext uri="{FF2B5EF4-FFF2-40B4-BE49-F238E27FC236}">
-                    <a16:creationId xmlns:a16="http://schemas.microsoft.com/office/drawing/2014/main" id="{E5E3BD20-A4B3-462D-A3A5-88B57B1F6B6A}"/>
-                  </a:ext>
-                </a:extLst>
-              </p:cNvPr>
-              <p:cNvSpPr/>
-              <p:nvPr/>
-            </p:nvSpPr>
-            <p:spPr>
-              <a:xfrm>
-                <a:off x="1359018" y="3411850"/>
-                <a:ext cx="293614" cy="287695"/>
-              </a:xfrm>
-              <a:prstGeom prst="smileyFace">
-                <a:avLst/>
-              </a:prstGeom>
-              <a:solidFill>
-                <a:srgbClr val="FFFF00"/>
-              </a:solidFill>
-            </p:spPr>
-            <p:style>
-              <a:lnRef idx="2">
-                <a:schemeClr val="accent1">
-                  <a:shade val="50000"/>
-                </a:schemeClr>
-              </a:lnRef>
-              <a:fillRef idx="1">
-                <a:schemeClr val="accent1"/>
-              </a:fillRef>
-              <a:effectRef idx="0">
-                <a:schemeClr val="accent1"/>
-              </a:effectRef>
-              <a:fontRef idx="minor">
-                <a:schemeClr val="lt1"/>
-              </a:fontRef>
-            </p:style>
-            <p:txBody>
-              <a:bodyPr rtlCol="0" anchor="ctr"/>
-              <a:lstStyle/>
-              <a:p>
-                <a:pPr algn="ctr"/>
-                <a:endParaRPr lang="ru-RU" dirty="0"/>
-              </a:p>
-            </p:txBody>
-          </p:sp>
-          <p:sp>
-            <p:nvSpPr>
-              <p:cNvPr id="34" name="TextBox 33">
-                <a:extLst>
-                  <a:ext uri="{FF2B5EF4-FFF2-40B4-BE49-F238E27FC236}">
-                    <a16:creationId xmlns:a16="http://schemas.microsoft.com/office/drawing/2014/main" id="{D5F420B2-0E81-4510-BC94-7FA214C19169}"/>
-                  </a:ext>
-                </a:extLst>
-              </p:cNvPr>
-              <p:cNvSpPr txBox="1"/>
-              <p:nvPr/>
-            </p:nvSpPr>
-            <p:spPr>
-              <a:xfrm>
-                <a:off x="1199989" y="3656725"/>
-                <a:ext cx="593432" cy="261610"/>
-              </a:xfrm>
-              <a:prstGeom prst="rect">
-                <a:avLst/>
-              </a:prstGeom>
-              <a:noFill/>
-            </p:spPr>
-            <p:txBody>
-              <a:bodyPr wrap="none" rtlCol="0">
-                <a:spAutoFit/>
-              </a:bodyPr>
-              <a:lstStyle/>
-              <a:p>
-                <a:r>
-                  <a:rPr lang="en-US" sz="1100" dirty="0"/>
-                  <a:t>courier</a:t>
-                </a:r>
-                <a:endParaRPr lang="ru-RU" sz="1100" dirty="0"/>
-              </a:p>
-            </p:txBody>
-          </p:sp>
-        </p:grpSp>
-        <p:grpSp>
-          <p:nvGrpSpPr>
-            <p:cNvPr id="36" name="Group 35">
-              <a:extLst>
-                <a:ext uri="{FF2B5EF4-FFF2-40B4-BE49-F238E27FC236}">
-                  <a16:creationId xmlns:a16="http://schemas.microsoft.com/office/drawing/2014/main" id="{208EAC00-F930-44D6-A637-BF7F6EFA4A3C}"/>
-                </a:ext>
-              </a:extLst>
-            </p:cNvPr>
-            <p:cNvGrpSpPr/>
-            <p:nvPr/>
-          </p:nvGrpSpPr>
-          <p:grpSpPr>
-            <a:xfrm>
-              <a:off x="2662980" y="4347496"/>
-              <a:ext cx="530915" cy="506485"/>
-              <a:chOff x="1199989" y="3411850"/>
-              <a:chExt cx="530915" cy="506485"/>
-            </a:xfrm>
-          </p:grpSpPr>
-          <p:sp>
-            <p:nvSpPr>
-              <p:cNvPr id="37" name="Smiley Face 36">
-                <a:extLst>
-                  <a:ext uri="{FF2B5EF4-FFF2-40B4-BE49-F238E27FC236}">
-                    <a16:creationId xmlns:a16="http://schemas.microsoft.com/office/drawing/2014/main" id="{29DF5B8A-FA15-444C-A868-581205AA5242}"/>
-                  </a:ext>
-                </a:extLst>
-              </p:cNvPr>
-              <p:cNvSpPr/>
-              <p:nvPr/>
-            </p:nvSpPr>
-            <p:spPr>
-              <a:xfrm>
-                <a:off x="1359018" y="3411850"/>
-                <a:ext cx="293614" cy="287695"/>
-              </a:xfrm>
-              <a:prstGeom prst="smileyFace">
-                <a:avLst/>
-              </a:prstGeom>
-              <a:solidFill>
-                <a:srgbClr val="FFFF00"/>
-              </a:solidFill>
-            </p:spPr>
-            <p:style>
-              <a:lnRef idx="2">
-                <a:schemeClr val="accent1">
-                  <a:shade val="50000"/>
-                </a:schemeClr>
-              </a:lnRef>
-              <a:fillRef idx="1">
-                <a:schemeClr val="accent1"/>
-              </a:fillRef>
-              <a:effectRef idx="0">
-                <a:schemeClr val="accent1"/>
-              </a:effectRef>
-              <a:fontRef idx="minor">
-                <a:schemeClr val="lt1"/>
-              </a:fontRef>
-            </p:style>
-            <p:txBody>
-              <a:bodyPr rtlCol="0" anchor="ctr"/>
-              <a:lstStyle/>
-              <a:p>
-                <a:pPr algn="ctr"/>
-                <a:endParaRPr lang="ru-RU" dirty="0"/>
-              </a:p>
-            </p:txBody>
-          </p:sp>
-          <p:sp>
-            <p:nvSpPr>
-              <p:cNvPr id="38" name="TextBox 37">
-                <a:extLst>
-                  <a:ext uri="{FF2B5EF4-FFF2-40B4-BE49-F238E27FC236}">
-                    <a16:creationId xmlns:a16="http://schemas.microsoft.com/office/drawing/2014/main" id="{F3BA2DC2-F3DD-419F-ABE3-85DB2691E8B0}"/>
-                  </a:ext>
-                </a:extLst>
-              </p:cNvPr>
-              <p:cNvSpPr txBox="1"/>
-              <p:nvPr/>
-            </p:nvSpPr>
-            <p:spPr>
-              <a:xfrm>
-                <a:off x="1199989" y="3656725"/>
-                <a:ext cx="530915" cy="261610"/>
-              </a:xfrm>
-              <a:prstGeom prst="rect">
-                <a:avLst/>
-              </a:prstGeom>
-              <a:noFill/>
-            </p:spPr>
-            <p:txBody>
-              <a:bodyPr wrap="none" rtlCol="0">
-                <a:spAutoFit/>
-              </a:bodyPr>
-              <a:lstStyle/>
-              <a:p>
-                <a:r>
-                  <a:rPr lang="en-US" sz="1100" dirty="0"/>
-                  <a:t> client</a:t>
-                </a:r>
-                <a:endParaRPr lang="ru-RU" sz="1100" dirty="0"/>
-              </a:p>
-            </p:txBody>
-          </p:sp>
-        </p:grpSp>
-        <p:cxnSp>
-          <p:nvCxnSpPr>
-            <p:cNvPr id="41" name="Straight Arrow Connector 40">
-              <a:extLst>
-                <a:ext uri="{FF2B5EF4-FFF2-40B4-BE49-F238E27FC236}">
-                  <a16:creationId xmlns:a16="http://schemas.microsoft.com/office/drawing/2014/main" id="{E9D3D9C3-780E-443D-8D1E-E1D40B39FF5D}"/>
-                </a:ext>
-              </a:extLst>
-            </p:cNvPr>
-            <p:cNvCxnSpPr>
-              <a:stCxn id="31" idx="6"/>
-            </p:cNvCxnSpPr>
-            <p:nvPr/>
-          </p:nvCxnSpPr>
-          <p:spPr>
-            <a:xfrm flipV="1">
-              <a:off x="3148409" y="2401019"/>
-              <a:ext cx="1820884" cy="1"/>
-            </a:xfrm>
-            <a:prstGeom prst="straightConnector1">
-              <a:avLst/>
-            </a:prstGeom>
-            <a:ln>
-              <a:headEnd type="triangle"/>
-              <a:tailEnd type="triangle"/>
-            </a:ln>
-          </p:spPr>
-          <p:style>
-            <a:lnRef idx="1">
-              <a:schemeClr val="accent1"/>
-            </a:lnRef>
-            <a:fillRef idx="0">
-              <a:schemeClr val="accent1"/>
-            </a:fillRef>
-            <a:effectRef idx="0">
-              <a:schemeClr val="accent1"/>
-            </a:effectRef>
-            <a:fontRef idx="minor">
-              <a:schemeClr val="tx1"/>
-            </a:fontRef>
-          </p:style>
-        </p:cxnSp>
-        <p:cxnSp>
-          <p:nvCxnSpPr>
-            <p:cNvPr id="43" name="Straight Arrow Connector 42">
-              <a:extLst>
-                <a:ext uri="{FF2B5EF4-FFF2-40B4-BE49-F238E27FC236}">
-                  <a16:creationId xmlns:a16="http://schemas.microsoft.com/office/drawing/2014/main" id="{6D9106F4-8E59-48FD-AFFD-0512E5ACAF9B}"/>
-                </a:ext>
-              </a:extLst>
-            </p:cNvPr>
-            <p:cNvCxnSpPr>
-              <a:stCxn id="29" idx="6"/>
-            </p:cNvCxnSpPr>
-            <p:nvPr/>
-          </p:nvCxnSpPr>
-          <p:spPr>
-            <a:xfrm flipV="1">
-              <a:off x="3123563" y="3440162"/>
-              <a:ext cx="1845730" cy="1"/>
-            </a:xfrm>
-            <a:prstGeom prst="straightConnector1">
-              <a:avLst/>
-            </a:prstGeom>
-            <a:ln>
-              <a:headEnd type="triangle"/>
-              <a:tailEnd type="triangle"/>
-            </a:ln>
-          </p:spPr>
-          <p:style>
-            <a:lnRef idx="1">
-              <a:schemeClr val="accent1"/>
-            </a:lnRef>
-            <a:fillRef idx="0">
-              <a:schemeClr val="accent1"/>
-            </a:fillRef>
-            <a:effectRef idx="0">
-              <a:schemeClr val="accent1"/>
-            </a:effectRef>
-            <a:fontRef idx="minor">
-              <a:schemeClr val="tx1"/>
-            </a:fontRef>
-          </p:style>
-        </p:cxnSp>
-        <p:cxnSp>
-          <p:nvCxnSpPr>
-            <p:cNvPr id="45" name="Straight Arrow Connector 44">
-              <a:extLst>
-                <a:ext uri="{FF2B5EF4-FFF2-40B4-BE49-F238E27FC236}">
-                  <a16:creationId xmlns:a16="http://schemas.microsoft.com/office/drawing/2014/main" id="{DC3D9B29-A5DA-49D6-80A2-486AB1507B97}"/>
-                </a:ext>
-              </a:extLst>
-            </p:cNvPr>
-            <p:cNvCxnSpPr>
-              <a:stCxn id="37" idx="6"/>
-            </p:cNvCxnSpPr>
-            <p:nvPr/>
-          </p:nvCxnSpPr>
-          <p:spPr>
-            <a:xfrm flipV="1">
-              <a:off x="3115623" y="4491343"/>
-              <a:ext cx="1853670" cy="1"/>
-            </a:xfrm>
-            <a:prstGeom prst="straightConnector1">
-              <a:avLst/>
-            </a:prstGeom>
-            <a:ln>
-              <a:headEnd type="triangle"/>
-              <a:tailEnd type="triangle"/>
-            </a:ln>
-          </p:spPr>
-          <p:style>
-            <a:lnRef idx="1">
-              <a:schemeClr val="accent1"/>
-            </a:lnRef>
-            <a:fillRef idx="0">
-              <a:schemeClr val="accent1"/>
-            </a:fillRef>
-            <a:effectRef idx="0">
-              <a:schemeClr val="accent1"/>
-            </a:effectRef>
-            <a:fontRef idx="minor">
-              <a:schemeClr val="tx1"/>
-            </a:fontRef>
-          </p:style>
-        </p:cxnSp>
-        <p:sp>
-          <p:nvSpPr>
-            <p:cNvPr id="46" name="Rectangle 45">
-              <a:extLst>
-                <a:ext uri="{FF2B5EF4-FFF2-40B4-BE49-F238E27FC236}">
-                  <a16:creationId xmlns:a16="http://schemas.microsoft.com/office/drawing/2014/main" id="{3ACE2B74-390E-4A84-A326-BD2A4B34316E}"/>
-                </a:ext>
-              </a:extLst>
-            </p:cNvPr>
-            <p:cNvSpPr/>
-            <p:nvPr/>
-          </p:nvSpPr>
-          <p:spPr>
-            <a:xfrm>
-              <a:off x="5651291" y="5784184"/>
-              <a:ext cx="1114009" cy="342354"/>
+              <a:off x="1199989" y="3656725"/>
+              <a:ext cx="530915" cy="261610"/>
             </a:xfrm>
             <a:prstGeom prst="rect">
               <a:avLst/>
             </a:prstGeom>
-            <a:solidFill>
-              <a:schemeClr val="accent1">
-                <a:lumMod val="20000"/>
-                <a:lumOff val="80000"/>
-              </a:schemeClr>
-            </a:solidFill>
-            <a:ln>
-              <a:prstDash val="dashDot"/>
-            </a:ln>
+            <a:noFill/>
           </p:spPr>
-          <p:style>
-            <a:lnRef idx="2">
-              <a:schemeClr val="accent1">
-                <a:shade val="50000"/>
-              </a:schemeClr>
-            </a:lnRef>
-            <a:fillRef idx="1">
-              <a:schemeClr val="accent1"/>
-            </a:fillRef>
-            <a:effectRef idx="0">
-              <a:schemeClr val="accent1"/>
-            </a:effectRef>
-            <a:fontRef idx="minor">
-              <a:schemeClr val="lt1"/>
-            </a:fontRef>
-          </p:style>
           <p:txBody>
-            <a:bodyPr rtlCol="0" anchor="ctr"/>
+            <a:bodyPr wrap="none" rtlCol="0">
+              <a:spAutoFit/>
+            </a:bodyPr>
             <a:lstStyle/>
             <a:p>
-              <a:pPr algn="ctr"/>
               <a:r>
-                <a:rPr lang="en-US" sz="1000" dirty="0">
-                  <a:solidFill>
-                    <a:schemeClr val="bg2">
-                      <a:lumMod val="25000"/>
-                    </a:schemeClr>
-                  </a:solidFill>
-                </a:rPr>
-                <a:t>Optional Discovery service</a:t>
+                <a:rPr lang="en-US" sz="1100" dirty="0"/>
+                <a:t> client</a:t>
               </a:r>
-              <a:endParaRPr lang="ru-RU" sz="1000" dirty="0">
+              <a:endParaRPr lang="ru-RU" sz="1100" dirty="0"/>
+            </a:p>
+          </p:txBody>
+        </p:sp>
+      </p:grpSp>
+      <p:cxnSp>
+        <p:nvCxnSpPr>
+          <p:cNvPr id="41" name="Straight Arrow Connector 40">
+            <a:extLst>
+              <a:ext uri="{FF2B5EF4-FFF2-40B4-BE49-F238E27FC236}">
+                <a16:creationId xmlns:a16="http://schemas.microsoft.com/office/drawing/2014/main" id="{E9D3D9C3-780E-443D-8D1E-E1D40B39FF5D}"/>
+              </a:ext>
+            </a:extLst>
+          </p:cNvPr>
+          <p:cNvCxnSpPr>
+            <a:stCxn id="31" idx="6"/>
+          </p:cNvCxnSpPr>
+          <p:nvPr/>
+        </p:nvCxnSpPr>
+        <p:spPr>
+          <a:xfrm flipV="1">
+            <a:off x="3148409" y="2401019"/>
+            <a:ext cx="1820884" cy="1"/>
+          </a:xfrm>
+          <a:prstGeom prst="straightConnector1">
+            <a:avLst/>
+          </a:prstGeom>
+          <a:ln>
+            <a:headEnd type="triangle"/>
+            <a:tailEnd type="triangle"/>
+          </a:ln>
+        </p:spPr>
+        <p:style>
+          <a:lnRef idx="1">
+            <a:schemeClr val="accent1"/>
+          </a:lnRef>
+          <a:fillRef idx="0">
+            <a:schemeClr val="accent1"/>
+          </a:fillRef>
+          <a:effectRef idx="0">
+            <a:schemeClr val="accent1"/>
+          </a:effectRef>
+          <a:fontRef idx="minor">
+            <a:schemeClr val="tx1"/>
+          </a:fontRef>
+        </p:style>
+      </p:cxnSp>
+      <p:cxnSp>
+        <p:nvCxnSpPr>
+          <p:cNvPr id="43" name="Straight Arrow Connector 42">
+            <a:extLst>
+              <a:ext uri="{FF2B5EF4-FFF2-40B4-BE49-F238E27FC236}">
+                <a16:creationId xmlns:a16="http://schemas.microsoft.com/office/drawing/2014/main" id="{6D9106F4-8E59-48FD-AFFD-0512E5ACAF9B}"/>
+              </a:ext>
+            </a:extLst>
+          </p:cNvPr>
+          <p:cNvCxnSpPr>
+            <a:stCxn id="29" idx="6"/>
+          </p:cNvCxnSpPr>
+          <p:nvPr/>
+        </p:nvCxnSpPr>
+        <p:spPr>
+          <a:xfrm flipV="1">
+            <a:off x="3123563" y="3440162"/>
+            <a:ext cx="1845730" cy="1"/>
+          </a:xfrm>
+          <a:prstGeom prst="straightConnector1">
+            <a:avLst/>
+          </a:prstGeom>
+          <a:ln>
+            <a:headEnd type="triangle"/>
+            <a:tailEnd type="triangle"/>
+          </a:ln>
+        </p:spPr>
+        <p:style>
+          <a:lnRef idx="1">
+            <a:schemeClr val="accent1"/>
+          </a:lnRef>
+          <a:fillRef idx="0">
+            <a:schemeClr val="accent1"/>
+          </a:fillRef>
+          <a:effectRef idx="0">
+            <a:schemeClr val="accent1"/>
+          </a:effectRef>
+          <a:fontRef idx="minor">
+            <a:schemeClr val="tx1"/>
+          </a:fontRef>
+        </p:style>
+      </p:cxnSp>
+      <p:cxnSp>
+        <p:nvCxnSpPr>
+          <p:cNvPr id="45" name="Straight Arrow Connector 44">
+            <a:extLst>
+              <a:ext uri="{FF2B5EF4-FFF2-40B4-BE49-F238E27FC236}">
+                <a16:creationId xmlns:a16="http://schemas.microsoft.com/office/drawing/2014/main" id="{DC3D9B29-A5DA-49D6-80A2-486AB1507B97}"/>
+              </a:ext>
+            </a:extLst>
+          </p:cNvPr>
+          <p:cNvCxnSpPr>
+            <a:stCxn id="37" idx="6"/>
+          </p:cNvCxnSpPr>
+          <p:nvPr/>
+        </p:nvCxnSpPr>
+        <p:spPr>
+          <a:xfrm flipV="1">
+            <a:off x="3115623" y="4491343"/>
+            <a:ext cx="1853670" cy="1"/>
+          </a:xfrm>
+          <a:prstGeom prst="straightConnector1">
+            <a:avLst/>
+          </a:prstGeom>
+          <a:ln>
+            <a:headEnd type="triangle"/>
+            <a:tailEnd type="triangle"/>
+          </a:ln>
+        </p:spPr>
+        <p:style>
+          <a:lnRef idx="1">
+            <a:schemeClr val="accent1"/>
+          </a:lnRef>
+          <a:fillRef idx="0">
+            <a:schemeClr val="accent1"/>
+          </a:fillRef>
+          <a:effectRef idx="0">
+            <a:schemeClr val="accent1"/>
+          </a:effectRef>
+          <a:fontRef idx="minor">
+            <a:schemeClr val="tx1"/>
+          </a:fontRef>
+        </p:style>
+      </p:cxnSp>
+      <p:sp>
+        <p:nvSpPr>
+          <p:cNvPr id="46" name="Rectangle 45">
+            <a:extLst>
+              <a:ext uri="{FF2B5EF4-FFF2-40B4-BE49-F238E27FC236}">
+                <a16:creationId xmlns:a16="http://schemas.microsoft.com/office/drawing/2014/main" id="{3ACE2B74-390E-4A84-A326-BD2A4B34316E}"/>
+              </a:ext>
+            </a:extLst>
+          </p:cNvPr>
+          <p:cNvSpPr/>
+          <p:nvPr/>
+        </p:nvSpPr>
+        <p:spPr>
+          <a:xfrm>
+            <a:off x="5651291" y="5784184"/>
+            <a:ext cx="1114009" cy="342354"/>
+          </a:xfrm>
+          <a:prstGeom prst="rect">
+            <a:avLst/>
+          </a:prstGeom>
+          <a:solidFill>
+            <a:schemeClr val="accent1">
+              <a:lumMod val="20000"/>
+              <a:lumOff val="80000"/>
+            </a:schemeClr>
+          </a:solidFill>
+          <a:ln>
+            <a:prstDash val="dashDot"/>
+          </a:ln>
+        </p:spPr>
+        <p:style>
+          <a:lnRef idx="2">
+            <a:schemeClr val="accent1">
+              <a:shade val="50000"/>
+            </a:schemeClr>
+          </a:lnRef>
+          <a:fillRef idx="1">
+            <a:schemeClr val="accent1"/>
+          </a:fillRef>
+          <a:effectRef idx="0">
+            <a:schemeClr val="accent1"/>
+          </a:effectRef>
+          <a:fontRef idx="minor">
+            <a:schemeClr val="lt1"/>
+          </a:fontRef>
+        </p:style>
+        <p:txBody>
+          <a:bodyPr rtlCol="0" anchor="ctr"/>
+          <a:lstStyle/>
+          <a:p>
+            <a:pPr algn="ctr"/>
+            <a:r>
+              <a:rPr lang="en-US" sz="1000" dirty="0">
                 <a:solidFill>
                   <a:schemeClr val="bg2">
                     <a:lumMod val="25000"/>
                   </a:schemeClr>
                 </a:solidFill>
-              </a:endParaRPr>
-            </a:p>
-          </p:txBody>
-        </p:sp>
-        <p:cxnSp>
-          <p:nvCxnSpPr>
-            <p:cNvPr id="48" name="Straight Arrow Connector 47">
-              <a:extLst>
-                <a:ext uri="{FF2B5EF4-FFF2-40B4-BE49-F238E27FC236}">
-                  <a16:creationId xmlns:a16="http://schemas.microsoft.com/office/drawing/2014/main" id="{1CF97E27-58A6-4341-BDB2-F385AC1D5638}"/>
-                </a:ext>
-              </a:extLst>
-            </p:cNvPr>
-            <p:cNvCxnSpPr/>
-            <p:nvPr/>
-          </p:nvCxnSpPr>
-          <p:spPr>
-            <a:xfrm>
-              <a:off x="5793162" y="2182679"/>
-              <a:ext cx="0" cy="3584457"/>
-            </a:xfrm>
-            <a:prstGeom prst="straightConnector1">
-              <a:avLst/>
-            </a:prstGeom>
-            <a:ln>
-              <a:prstDash val="lgDashDot"/>
-              <a:tailEnd type="triangle"/>
-            </a:ln>
-          </p:spPr>
-          <p:style>
-            <a:lnRef idx="1">
-              <a:schemeClr val="accent1"/>
-            </a:lnRef>
-            <a:fillRef idx="0">
-              <a:schemeClr val="accent1"/>
-            </a:fillRef>
-            <a:effectRef idx="0">
-              <a:schemeClr val="accent1"/>
-            </a:effectRef>
-            <a:fontRef idx="minor">
-              <a:schemeClr val="tx1"/>
-            </a:fontRef>
-          </p:style>
-        </p:cxnSp>
-        <p:cxnSp>
-          <p:nvCxnSpPr>
-            <p:cNvPr id="54" name="Straight Arrow Connector 53">
-              <a:extLst>
-                <a:ext uri="{FF2B5EF4-FFF2-40B4-BE49-F238E27FC236}">
-                  <a16:creationId xmlns:a16="http://schemas.microsoft.com/office/drawing/2014/main" id="{7E1C8BD6-990C-4312-9C5E-99A8F768C28C}"/>
-                </a:ext>
-              </a:extLst>
-            </p:cNvPr>
-            <p:cNvCxnSpPr/>
-            <p:nvPr/>
-          </p:nvCxnSpPr>
-          <p:spPr>
-            <a:xfrm>
-              <a:off x="5793162" y="2182679"/>
-              <a:ext cx="279581" cy="0"/>
-            </a:xfrm>
-            <a:prstGeom prst="straightConnector1">
-              <a:avLst/>
-            </a:prstGeom>
-            <a:ln>
-              <a:prstDash val="dash"/>
-              <a:headEnd type="triangle"/>
-              <a:tailEnd type="triangle"/>
-            </a:ln>
-          </p:spPr>
-          <p:style>
-            <a:lnRef idx="1">
-              <a:schemeClr val="accent1"/>
-            </a:lnRef>
-            <a:fillRef idx="0">
-              <a:schemeClr val="accent1"/>
-            </a:fillRef>
-            <a:effectRef idx="0">
-              <a:schemeClr val="accent1"/>
-            </a:effectRef>
-            <a:fontRef idx="minor">
-              <a:schemeClr val="tx1"/>
-            </a:fontRef>
-          </p:style>
-        </p:cxnSp>
-        <p:cxnSp>
-          <p:nvCxnSpPr>
-            <p:cNvPr id="56" name="Straight Arrow Connector 55">
-              <a:extLst>
-                <a:ext uri="{FF2B5EF4-FFF2-40B4-BE49-F238E27FC236}">
-                  <a16:creationId xmlns:a16="http://schemas.microsoft.com/office/drawing/2014/main" id="{AB5BF6EE-6ABA-4899-BA96-5E205E6C0409}"/>
-                </a:ext>
-              </a:extLst>
-            </p:cNvPr>
-            <p:cNvCxnSpPr/>
-            <p:nvPr/>
-          </p:nvCxnSpPr>
-          <p:spPr>
-            <a:xfrm>
-              <a:off x="5793162" y="3223985"/>
-              <a:ext cx="272013" cy="0"/>
-            </a:xfrm>
-            <a:prstGeom prst="straightConnector1">
-              <a:avLst/>
-            </a:prstGeom>
-            <a:ln>
-              <a:prstDash val="dash"/>
-              <a:headEnd type="triangle"/>
-              <a:tailEnd type="triangle"/>
-            </a:ln>
-          </p:spPr>
-          <p:style>
-            <a:lnRef idx="1">
-              <a:schemeClr val="accent1"/>
-            </a:lnRef>
-            <a:fillRef idx="0">
-              <a:schemeClr val="accent1"/>
-            </a:fillRef>
-            <a:effectRef idx="0">
-              <a:schemeClr val="accent1"/>
-            </a:effectRef>
-            <a:fontRef idx="minor">
-              <a:schemeClr val="tx1"/>
-            </a:fontRef>
-          </p:style>
-        </p:cxnSp>
-        <p:cxnSp>
-          <p:nvCxnSpPr>
-            <p:cNvPr id="58" name="Straight Arrow Connector 57">
-              <a:extLst>
-                <a:ext uri="{FF2B5EF4-FFF2-40B4-BE49-F238E27FC236}">
-                  <a16:creationId xmlns:a16="http://schemas.microsoft.com/office/drawing/2014/main" id="{E29C664D-19AA-45EC-90B3-8E21C8B741E9}"/>
-                </a:ext>
-              </a:extLst>
-            </p:cNvPr>
-            <p:cNvCxnSpPr/>
-            <p:nvPr/>
-          </p:nvCxnSpPr>
-          <p:spPr>
-            <a:xfrm>
-              <a:off x="5793162" y="4347496"/>
-              <a:ext cx="272013" cy="0"/>
-            </a:xfrm>
-            <a:prstGeom prst="straightConnector1">
-              <a:avLst/>
-            </a:prstGeom>
-            <a:ln>
-              <a:prstDash val="dash"/>
-              <a:headEnd type="triangle"/>
-              <a:tailEnd type="triangle"/>
-            </a:ln>
-          </p:spPr>
-          <p:style>
-            <a:lnRef idx="1">
-              <a:schemeClr val="accent1"/>
-            </a:lnRef>
-            <a:fillRef idx="0">
-              <a:schemeClr val="accent1"/>
-            </a:fillRef>
-            <a:effectRef idx="0">
-              <a:schemeClr val="accent1"/>
-            </a:effectRef>
-            <a:fontRef idx="minor">
-              <a:schemeClr val="tx1"/>
-            </a:fontRef>
-          </p:style>
-        </p:cxnSp>
-        <p:cxnSp>
-          <p:nvCxnSpPr>
-            <p:cNvPr id="60" name="Straight Arrow Connector 59">
-              <a:extLst>
-                <a:ext uri="{FF2B5EF4-FFF2-40B4-BE49-F238E27FC236}">
-                  <a16:creationId xmlns:a16="http://schemas.microsoft.com/office/drawing/2014/main" id="{F914C248-9CC1-462A-A2B4-15D112B1C5FC}"/>
-                </a:ext>
-              </a:extLst>
-            </p:cNvPr>
-            <p:cNvCxnSpPr/>
-            <p:nvPr/>
-          </p:nvCxnSpPr>
-          <p:spPr>
-            <a:xfrm>
-              <a:off x="5800730" y="5440403"/>
-              <a:ext cx="272013" cy="0"/>
-            </a:xfrm>
-            <a:prstGeom prst="straightConnector1">
-              <a:avLst/>
-            </a:prstGeom>
-            <a:ln>
-              <a:prstDash val="dash"/>
-              <a:headEnd type="triangle"/>
-              <a:tailEnd type="triangle"/>
-            </a:ln>
-          </p:spPr>
-          <p:style>
-            <a:lnRef idx="1">
-              <a:schemeClr val="accent1"/>
-            </a:lnRef>
-            <a:fillRef idx="0">
-              <a:schemeClr val="accent1"/>
-            </a:fillRef>
-            <a:effectRef idx="0">
-              <a:schemeClr val="accent1"/>
-            </a:effectRef>
-            <a:fontRef idx="minor">
-              <a:schemeClr val="tx1"/>
-            </a:fontRef>
-          </p:style>
-        </p:cxnSp>
-      </p:grpSp>
+              </a:rPr>
+              <a:t>Optional Discovery service</a:t>
+            </a:r>
+            <a:endParaRPr lang="ru-RU" sz="1000" dirty="0">
+              <a:solidFill>
+                <a:schemeClr val="bg2">
+                  <a:lumMod val="25000"/>
+                </a:schemeClr>
+              </a:solidFill>
+            </a:endParaRPr>
+          </a:p>
+        </p:txBody>
+      </p:sp>
+      <p:cxnSp>
+        <p:nvCxnSpPr>
+          <p:cNvPr id="48" name="Straight Arrow Connector 47">
+            <a:extLst>
+              <a:ext uri="{FF2B5EF4-FFF2-40B4-BE49-F238E27FC236}">
+                <a16:creationId xmlns:a16="http://schemas.microsoft.com/office/drawing/2014/main" id="{1CF97E27-58A6-4341-BDB2-F385AC1D5638}"/>
+              </a:ext>
+            </a:extLst>
+          </p:cNvPr>
+          <p:cNvCxnSpPr/>
+          <p:nvPr/>
+        </p:nvCxnSpPr>
+        <p:spPr>
+          <a:xfrm>
+            <a:off x="5793162" y="2182679"/>
+            <a:ext cx="0" cy="3584457"/>
+          </a:xfrm>
+          <a:prstGeom prst="straightConnector1">
+            <a:avLst/>
+          </a:prstGeom>
+          <a:ln>
+            <a:prstDash val="lgDashDot"/>
+            <a:tailEnd type="triangle"/>
+          </a:ln>
+        </p:spPr>
+        <p:style>
+          <a:lnRef idx="1">
+            <a:schemeClr val="accent1"/>
+          </a:lnRef>
+          <a:fillRef idx="0">
+            <a:schemeClr val="accent1"/>
+          </a:fillRef>
+          <a:effectRef idx="0">
+            <a:schemeClr val="accent1"/>
+          </a:effectRef>
+          <a:fontRef idx="minor">
+            <a:schemeClr val="tx1"/>
+          </a:fontRef>
+        </p:style>
+      </p:cxnSp>
+      <p:cxnSp>
+        <p:nvCxnSpPr>
+          <p:cNvPr id="54" name="Straight Arrow Connector 53">
+            <a:extLst>
+              <a:ext uri="{FF2B5EF4-FFF2-40B4-BE49-F238E27FC236}">
+                <a16:creationId xmlns:a16="http://schemas.microsoft.com/office/drawing/2014/main" id="{7E1C8BD6-990C-4312-9C5E-99A8F768C28C}"/>
+              </a:ext>
+            </a:extLst>
+          </p:cNvPr>
+          <p:cNvCxnSpPr/>
+          <p:nvPr/>
+        </p:nvCxnSpPr>
+        <p:spPr>
+          <a:xfrm>
+            <a:off x="5793162" y="2182679"/>
+            <a:ext cx="279581" cy="0"/>
+          </a:xfrm>
+          <a:prstGeom prst="straightConnector1">
+            <a:avLst/>
+          </a:prstGeom>
+          <a:ln>
+            <a:prstDash val="dash"/>
+            <a:headEnd type="triangle"/>
+            <a:tailEnd type="triangle"/>
+          </a:ln>
+        </p:spPr>
+        <p:style>
+          <a:lnRef idx="1">
+            <a:schemeClr val="accent1"/>
+          </a:lnRef>
+          <a:fillRef idx="0">
+            <a:schemeClr val="accent1"/>
+          </a:fillRef>
+          <a:effectRef idx="0">
+            <a:schemeClr val="accent1"/>
+          </a:effectRef>
+          <a:fontRef idx="minor">
+            <a:schemeClr val="tx1"/>
+          </a:fontRef>
+        </p:style>
+      </p:cxnSp>
+      <p:cxnSp>
+        <p:nvCxnSpPr>
+          <p:cNvPr id="56" name="Straight Arrow Connector 55">
+            <a:extLst>
+              <a:ext uri="{FF2B5EF4-FFF2-40B4-BE49-F238E27FC236}">
+                <a16:creationId xmlns:a16="http://schemas.microsoft.com/office/drawing/2014/main" id="{AB5BF6EE-6ABA-4899-BA96-5E205E6C0409}"/>
+              </a:ext>
+            </a:extLst>
+          </p:cNvPr>
+          <p:cNvCxnSpPr/>
+          <p:nvPr/>
+        </p:nvCxnSpPr>
+        <p:spPr>
+          <a:xfrm>
+            <a:off x="5793162" y="3223985"/>
+            <a:ext cx="272013" cy="0"/>
+          </a:xfrm>
+          <a:prstGeom prst="straightConnector1">
+            <a:avLst/>
+          </a:prstGeom>
+          <a:ln>
+            <a:prstDash val="dash"/>
+            <a:headEnd type="triangle"/>
+            <a:tailEnd type="triangle"/>
+          </a:ln>
+        </p:spPr>
+        <p:style>
+          <a:lnRef idx="1">
+            <a:schemeClr val="accent1"/>
+          </a:lnRef>
+          <a:fillRef idx="0">
+            <a:schemeClr val="accent1"/>
+          </a:fillRef>
+          <a:effectRef idx="0">
+            <a:schemeClr val="accent1"/>
+          </a:effectRef>
+          <a:fontRef idx="minor">
+            <a:schemeClr val="tx1"/>
+          </a:fontRef>
+        </p:style>
+      </p:cxnSp>
+      <p:cxnSp>
+        <p:nvCxnSpPr>
+          <p:cNvPr id="58" name="Straight Arrow Connector 57">
+            <a:extLst>
+              <a:ext uri="{FF2B5EF4-FFF2-40B4-BE49-F238E27FC236}">
+                <a16:creationId xmlns:a16="http://schemas.microsoft.com/office/drawing/2014/main" id="{E29C664D-19AA-45EC-90B3-8E21C8B741E9}"/>
+              </a:ext>
+            </a:extLst>
+          </p:cNvPr>
+          <p:cNvCxnSpPr/>
+          <p:nvPr/>
+        </p:nvCxnSpPr>
+        <p:spPr>
+          <a:xfrm>
+            <a:off x="5793162" y="4347496"/>
+            <a:ext cx="272013" cy="0"/>
+          </a:xfrm>
+          <a:prstGeom prst="straightConnector1">
+            <a:avLst/>
+          </a:prstGeom>
+          <a:ln>
+            <a:prstDash val="dash"/>
+            <a:headEnd type="triangle"/>
+            <a:tailEnd type="triangle"/>
+          </a:ln>
+        </p:spPr>
+        <p:style>
+          <a:lnRef idx="1">
+            <a:schemeClr val="accent1"/>
+          </a:lnRef>
+          <a:fillRef idx="0">
+            <a:schemeClr val="accent1"/>
+          </a:fillRef>
+          <a:effectRef idx="0">
+            <a:schemeClr val="accent1"/>
+          </a:effectRef>
+          <a:fontRef idx="minor">
+            <a:schemeClr val="tx1"/>
+          </a:fontRef>
+        </p:style>
+      </p:cxnSp>
+      <p:cxnSp>
+        <p:nvCxnSpPr>
+          <p:cNvPr id="60" name="Straight Arrow Connector 59">
+            <a:extLst>
+              <a:ext uri="{FF2B5EF4-FFF2-40B4-BE49-F238E27FC236}">
+                <a16:creationId xmlns:a16="http://schemas.microsoft.com/office/drawing/2014/main" id="{F914C248-9CC1-462A-A2B4-15D112B1C5FC}"/>
+              </a:ext>
+            </a:extLst>
+          </p:cNvPr>
+          <p:cNvCxnSpPr/>
+          <p:nvPr/>
+        </p:nvCxnSpPr>
+        <p:spPr>
+          <a:xfrm>
+            <a:off x="5800730" y="5440403"/>
+            <a:ext cx="272013" cy="0"/>
+          </a:xfrm>
+          <a:prstGeom prst="straightConnector1">
+            <a:avLst/>
+          </a:prstGeom>
+          <a:ln>
+            <a:prstDash val="dash"/>
+            <a:headEnd type="triangle"/>
+            <a:tailEnd type="triangle"/>
+          </a:ln>
+        </p:spPr>
+        <p:style>
+          <a:lnRef idx="1">
+            <a:schemeClr val="accent1"/>
+          </a:lnRef>
+          <a:fillRef idx="0">
+            <a:schemeClr val="accent1"/>
+          </a:fillRef>
+          <a:effectRef idx="0">
+            <a:schemeClr val="accent1"/>
+          </a:effectRef>
+          <a:fontRef idx="minor">
+            <a:schemeClr val="tx1"/>
+          </a:fontRef>
+        </p:style>
+      </p:cxnSp>
+      <p:sp>
+        <p:nvSpPr>
+          <p:cNvPr id="44" name="Rectangle 43">
+            <a:extLst>
+              <a:ext uri="{FF2B5EF4-FFF2-40B4-BE49-F238E27FC236}">
+                <a16:creationId xmlns:a16="http://schemas.microsoft.com/office/drawing/2014/main" id="{309CF89C-C7EF-43A9-86B9-EC3642B3778F}"/>
+              </a:ext>
+            </a:extLst>
+          </p:cNvPr>
+          <p:cNvSpPr/>
+          <p:nvPr/>
+        </p:nvSpPr>
+        <p:spPr>
+          <a:xfrm>
+            <a:off x="6126302" y="1809326"/>
+            <a:ext cx="1048624" cy="557147"/>
+          </a:xfrm>
+          <a:prstGeom prst="rect">
+            <a:avLst/>
+          </a:prstGeom>
+        </p:spPr>
+        <p:style>
+          <a:lnRef idx="2">
+            <a:schemeClr val="accent1">
+              <a:shade val="50000"/>
+            </a:schemeClr>
+          </a:lnRef>
+          <a:fillRef idx="1">
+            <a:schemeClr val="accent1"/>
+          </a:fillRef>
+          <a:effectRef idx="0">
+            <a:schemeClr val="accent1"/>
+          </a:effectRef>
+          <a:fontRef idx="minor">
+            <a:schemeClr val="lt1"/>
+          </a:fontRef>
+        </p:style>
+        <p:txBody>
+          <a:bodyPr rtlCol="0" anchor="ctr"/>
+          <a:lstStyle/>
+          <a:p>
+            <a:pPr algn="ctr"/>
+            <a:r>
+              <a:rPr lang="en-US" dirty="0"/>
+              <a:t>User Service</a:t>
+            </a:r>
+          </a:p>
+        </p:txBody>
+      </p:sp>
+      <p:sp>
+        <p:nvSpPr>
+          <p:cNvPr id="47" name="Rectangle 46">
+            <a:extLst>
+              <a:ext uri="{FF2B5EF4-FFF2-40B4-BE49-F238E27FC236}">
+                <a16:creationId xmlns:a16="http://schemas.microsoft.com/office/drawing/2014/main" id="{29223604-B549-4D27-BA71-5E8449600756}"/>
+              </a:ext>
+            </a:extLst>
+          </p:cNvPr>
+          <p:cNvSpPr/>
+          <p:nvPr/>
+        </p:nvSpPr>
+        <p:spPr>
+          <a:xfrm>
+            <a:off x="6185696" y="1901549"/>
+            <a:ext cx="1048624" cy="557147"/>
+          </a:xfrm>
+          <a:prstGeom prst="rect">
+            <a:avLst/>
+          </a:prstGeom>
+        </p:spPr>
+        <p:style>
+          <a:lnRef idx="2">
+            <a:schemeClr val="accent1">
+              <a:shade val="50000"/>
+            </a:schemeClr>
+          </a:lnRef>
+          <a:fillRef idx="1">
+            <a:schemeClr val="accent1"/>
+          </a:fillRef>
+          <a:effectRef idx="0">
+            <a:schemeClr val="accent1"/>
+          </a:effectRef>
+          <a:fontRef idx="minor">
+            <a:schemeClr val="lt1"/>
+          </a:fontRef>
+        </p:style>
+        <p:txBody>
+          <a:bodyPr rtlCol="0" anchor="ctr"/>
+          <a:lstStyle/>
+          <a:p>
+            <a:pPr algn="ctr"/>
+            <a:r>
+              <a:rPr lang="en-US" dirty="0"/>
+              <a:t>User Service</a:t>
+            </a:r>
+          </a:p>
+        </p:txBody>
+      </p:sp>
+      <p:sp>
+        <p:nvSpPr>
+          <p:cNvPr id="12" name="Cylinder 11">
+            <a:extLst>
+              <a:ext uri="{FF2B5EF4-FFF2-40B4-BE49-F238E27FC236}">
+                <a16:creationId xmlns:a16="http://schemas.microsoft.com/office/drawing/2014/main" id="{FD826414-1850-41E8-8E5F-862D193DFB8F}"/>
+              </a:ext>
+            </a:extLst>
+          </p:cNvPr>
+          <p:cNvSpPr/>
+          <p:nvPr/>
+        </p:nvSpPr>
+        <p:spPr>
+          <a:xfrm>
+            <a:off x="7027549" y="2116714"/>
+            <a:ext cx="298579" cy="342354"/>
+          </a:xfrm>
+          <a:prstGeom prst="can">
+            <a:avLst/>
+          </a:prstGeom>
+          <a:solidFill>
+            <a:schemeClr val="accent2">
+              <a:lumMod val="75000"/>
+            </a:schemeClr>
+          </a:solidFill>
+        </p:spPr>
+        <p:style>
+          <a:lnRef idx="2">
+            <a:schemeClr val="accent1">
+              <a:shade val="50000"/>
+            </a:schemeClr>
+          </a:lnRef>
+          <a:fillRef idx="1">
+            <a:schemeClr val="accent1"/>
+          </a:fillRef>
+          <a:effectRef idx="0">
+            <a:schemeClr val="accent1"/>
+          </a:effectRef>
+          <a:fontRef idx="minor">
+            <a:schemeClr val="lt1"/>
+          </a:fontRef>
+        </p:style>
+        <p:txBody>
+          <a:bodyPr rtlCol="0" anchor="ctr"/>
+          <a:lstStyle/>
+          <a:p>
+            <a:pPr algn="ctr"/>
+            <a:endParaRPr lang="ru-RU"/>
+          </a:p>
+        </p:txBody>
+      </p:sp>
+      <p:sp>
+        <p:nvSpPr>
+          <p:cNvPr id="49" name="Rectangle 48">
+            <a:extLst>
+              <a:ext uri="{FF2B5EF4-FFF2-40B4-BE49-F238E27FC236}">
+                <a16:creationId xmlns:a16="http://schemas.microsoft.com/office/drawing/2014/main" id="{0BC4C11F-DF3A-4D74-A591-B65026140026}"/>
+              </a:ext>
+            </a:extLst>
+          </p:cNvPr>
+          <p:cNvSpPr/>
+          <p:nvPr/>
+        </p:nvSpPr>
+        <p:spPr>
+          <a:xfrm>
+            <a:off x="6117729" y="2818298"/>
+            <a:ext cx="1048624" cy="557147"/>
+          </a:xfrm>
+          <a:prstGeom prst="rect">
+            <a:avLst/>
+          </a:prstGeom>
+        </p:spPr>
+        <p:style>
+          <a:lnRef idx="2">
+            <a:schemeClr val="accent1">
+              <a:shade val="50000"/>
+            </a:schemeClr>
+          </a:lnRef>
+          <a:fillRef idx="1">
+            <a:schemeClr val="accent1"/>
+          </a:fillRef>
+          <a:effectRef idx="0">
+            <a:schemeClr val="accent1"/>
+          </a:effectRef>
+          <a:fontRef idx="minor">
+            <a:schemeClr val="lt1"/>
+          </a:fontRef>
+        </p:style>
+        <p:txBody>
+          <a:bodyPr rtlCol="0" anchor="ctr"/>
+          <a:lstStyle/>
+          <a:p>
+            <a:pPr algn="ctr"/>
+            <a:r>
+              <a:rPr lang="en-US" dirty="0"/>
+              <a:t>Admin Service</a:t>
+            </a:r>
+          </a:p>
+        </p:txBody>
+      </p:sp>
+      <p:sp>
+        <p:nvSpPr>
+          <p:cNvPr id="50" name="Rectangle 49">
+            <a:extLst>
+              <a:ext uri="{FF2B5EF4-FFF2-40B4-BE49-F238E27FC236}">
+                <a16:creationId xmlns:a16="http://schemas.microsoft.com/office/drawing/2014/main" id="{5E67D8FE-2D6A-4B68-A84B-902CBD6A1BBC}"/>
+              </a:ext>
+            </a:extLst>
+          </p:cNvPr>
+          <p:cNvSpPr/>
+          <p:nvPr/>
+        </p:nvSpPr>
+        <p:spPr>
+          <a:xfrm>
+            <a:off x="6159771" y="2869035"/>
+            <a:ext cx="1048624" cy="557147"/>
+          </a:xfrm>
+          <a:prstGeom prst="rect">
+            <a:avLst/>
+          </a:prstGeom>
+        </p:spPr>
+        <p:style>
+          <a:lnRef idx="2">
+            <a:schemeClr val="accent1">
+              <a:shade val="50000"/>
+            </a:schemeClr>
+          </a:lnRef>
+          <a:fillRef idx="1">
+            <a:schemeClr val="accent1"/>
+          </a:fillRef>
+          <a:effectRef idx="0">
+            <a:schemeClr val="accent1"/>
+          </a:effectRef>
+          <a:fontRef idx="minor">
+            <a:schemeClr val="lt1"/>
+          </a:fontRef>
+        </p:style>
+        <p:txBody>
+          <a:bodyPr rtlCol="0" anchor="ctr"/>
+          <a:lstStyle/>
+          <a:p>
+            <a:pPr algn="ctr"/>
+            <a:r>
+              <a:rPr lang="en-US" dirty="0"/>
+              <a:t>Admin Service</a:t>
+            </a:r>
+          </a:p>
+        </p:txBody>
+      </p:sp>
+      <p:sp>
+        <p:nvSpPr>
+          <p:cNvPr id="16" name="Cylinder 15">
+            <a:extLst>
+              <a:ext uri="{FF2B5EF4-FFF2-40B4-BE49-F238E27FC236}">
+                <a16:creationId xmlns:a16="http://schemas.microsoft.com/office/drawing/2014/main" id="{3EB51B1F-23FD-45E0-A6CB-13275B762522}"/>
+              </a:ext>
+            </a:extLst>
+          </p:cNvPr>
+          <p:cNvSpPr/>
+          <p:nvPr/>
+        </p:nvSpPr>
+        <p:spPr>
+          <a:xfrm>
+            <a:off x="7027992" y="3147609"/>
+            <a:ext cx="298579" cy="342354"/>
+          </a:xfrm>
+          <a:prstGeom prst="can">
+            <a:avLst/>
+          </a:prstGeom>
+          <a:solidFill>
+            <a:schemeClr val="accent2">
+              <a:lumMod val="75000"/>
+            </a:schemeClr>
+          </a:solidFill>
+        </p:spPr>
+        <p:style>
+          <a:lnRef idx="2">
+            <a:schemeClr val="accent1">
+              <a:shade val="50000"/>
+            </a:schemeClr>
+          </a:lnRef>
+          <a:fillRef idx="1">
+            <a:schemeClr val="accent1"/>
+          </a:fillRef>
+          <a:effectRef idx="0">
+            <a:schemeClr val="accent1"/>
+          </a:effectRef>
+          <a:fontRef idx="minor">
+            <a:schemeClr val="lt1"/>
+          </a:fontRef>
+        </p:style>
+        <p:txBody>
+          <a:bodyPr rtlCol="0" anchor="ctr"/>
+          <a:lstStyle/>
+          <a:p>
+            <a:pPr algn="ctr"/>
+            <a:endParaRPr lang="ru-RU"/>
+          </a:p>
+        </p:txBody>
+      </p:sp>
+      <p:sp>
+        <p:nvSpPr>
+          <p:cNvPr id="51" name="Rectangle 50">
+            <a:extLst>
+              <a:ext uri="{FF2B5EF4-FFF2-40B4-BE49-F238E27FC236}">
+                <a16:creationId xmlns:a16="http://schemas.microsoft.com/office/drawing/2014/main" id="{7CC4CB58-F964-4F74-914A-3D679B2332B2}"/>
+              </a:ext>
+            </a:extLst>
+          </p:cNvPr>
+          <p:cNvSpPr/>
+          <p:nvPr/>
+        </p:nvSpPr>
+        <p:spPr>
+          <a:xfrm>
+            <a:off x="6125453" y="3918654"/>
+            <a:ext cx="1048624" cy="557147"/>
+          </a:xfrm>
+          <a:prstGeom prst="rect">
+            <a:avLst/>
+          </a:prstGeom>
+        </p:spPr>
+        <p:style>
+          <a:lnRef idx="2">
+            <a:schemeClr val="accent1">
+              <a:shade val="50000"/>
+            </a:schemeClr>
+          </a:lnRef>
+          <a:fillRef idx="1">
+            <a:schemeClr val="accent1"/>
+          </a:fillRef>
+          <a:effectRef idx="0">
+            <a:schemeClr val="accent1"/>
+          </a:effectRef>
+          <a:fontRef idx="minor">
+            <a:schemeClr val="lt1"/>
+          </a:fontRef>
+        </p:style>
+        <p:txBody>
+          <a:bodyPr rtlCol="0" anchor="ctr"/>
+          <a:lstStyle/>
+          <a:p>
+            <a:pPr algn="ctr"/>
+            <a:r>
+              <a:rPr lang="en-US" dirty="0"/>
+              <a:t>Courier Service</a:t>
+            </a:r>
+          </a:p>
+        </p:txBody>
+      </p:sp>
+      <p:sp>
+        <p:nvSpPr>
+          <p:cNvPr id="52" name="Rectangle 51">
+            <a:extLst>
+              <a:ext uri="{FF2B5EF4-FFF2-40B4-BE49-F238E27FC236}">
+                <a16:creationId xmlns:a16="http://schemas.microsoft.com/office/drawing/2014/main" id="{FC10E71A-E74A-4702-B3EB-807213AA4561}"/>
+              </a:ext>
+            </a:extLst>
+          </p:cNvPr>
+          <p:cNvSpPr/>
+          <p:nvPr/>
+        </p:nvSpPr>
+        <p:spPr>
+          <a:xfrm>
+            <a:off x="6177207" y="3968998"/>
+            <a:ext cx="1048624" cy="557147"/>
+          </a:xfrm>
+          <a:prstGeom prst="rect">
+            <a:avLst/>
+          </a:prstGeom>
+        </p:spPr>
+        <p:style>
+          <a:lnRef idx="2">
+            <a:schemeClr val="accent1">
+              <a:shade val="50000"/>
+            </a:schemeClr>
+          </a:lnRef>
+          <a:fillRef idx="1">
+            <a:schemeClr val="accent1"/>
+          </a:fillRef>
+          <a:effectRef idx="0">
+            <a:schemeClr val="accent1"/>
+          </a:effectRef>
+          <a:fontRef idx="minor">
+            <a:schemeClr val="lt1"/>
+          </a:fontRef>
+        </p:style>
+        <p:txBody>
+          <a:bodyPr rtlCol="0" anchor="ctr"/>
+          <a:lstStyle/>
+          <a:p>
+            <a:pPr algn="ctr"/>
+            <a:r>
+              <a:rPr lang="en-US" dirty="0"/>
+              <a:t>Courier Service</a:t>
+            </a:r>
+          </a:p>
+        </p:txBody>
+      </p:sp>
+      <p:sp>
+        <p:nvSpPr>
+          <p:cNvPr id="17" name="Cylinder 16">
+            <a:extLst>
+              <a:ext uri="{FF2B5EF4-FFF2-40B4-BE49-F238E27FC236}">
+                <a16:creationId xmlns:a16="http://schemas.microsoft.com/office/drawing/2014/main" id="{920F3F06-CBA2-4CA5-9B24-C662382A45A5}"/>
+              </a:ext>
+            </a:extLst>
+          </p:cNvPr>
+          <p:cNvSpPr/>
+          <p:nvPr/>
+        </p:nvSpPr>
+        <p:spPr>
+          <a:xfrm>
+            <a:off x="7017064" y="4258385"/>
+            <a:ext cx="298579" cy="342354"/>
+          </a:xfrm>
+          <a:prstGeom prst="can">
+            <a:avLst/>
+          </a:prstGeom>
+          <a:solidFill>
+            <a:schemeClr val="accent2">
+              <a:lumMod val="75000"/>
+            </a:schemeClr>
+          </a:solidFill>
+        </p:spPr>
+        <p:style>
+          <a:lnRef idx="2">
+            <a:schemeClr val="accent1">
+              <a:shade val="50000"/>
+            </a:schemeClr>
+          </a:lnRef>
+          <a:fillRef idx="1">
+            <a:schemeClr val="accent1"/>
+          </a:fillRef>
+          <a:effectRef idx="0">
+            <a:schemeClr val="accent1"/>
+          </a:effectRef>
+          <a:fontRef idx="minor">
+            <a:schemeClr val="lt1"/>
+          </a:fontRef>
+        </p:style>
+        <p:txBody>
+          <a:bodyPr rtlCol="0" anchor="ctr"/>
+          <a:lstStyle/>
+          <a:p>
+            <a:pPr algn="ctr"/>
+            <a:endParaRPr lang="ru-RU"/>
+          </a:p>
+        </p:txBody>
+      </p:sp>
+      <p:sp>
+        <p:nvSpPr>
+          <p:cNvPr id="53" name="Rectangle 52">
+            <a:extLst>
+              <a:ext uri="{FF2B5EF4-FFF2-40B4-BE49-F238E27FC236}">
+                <a16:creationId xmlns:a16="http://schemas.microsoft.com/office/drawing/2014/main" id="{F199647D-419C-4D5D-8350-8FC0878C2A18}"/>
+              </a:ext>
+            </a:extLst>
+          </p:cNvPr>
+          <p:cNvSpPr/>
+          <p:nvPr/>
+        </p:nvSpPr>
+        <p:spPr>
+          <a:xfrm>
+            <a:off x="6133697" y="5013351"/>
+            <a:ext cx="1048624" cy="557147"/>
+          </a:xfrm>
+          <a:prstGeom prst="rect">
+            <a:avLst/>
+          </a:prstGeom>
+        </p:spPr>
+        <p:style>
+          <a:lnRef idx="2">
+            <a:schemeClr val="accent1">
+              <a:shade val="50000"/>
+            </a:schemeClr>
+          </a:lnRef>
+          <a:fillRef idx="1">
+            <a:schemeClr val="accent1"/>
+          </a:fillRef>
+          <a:effectRef idx="0">
+            <a:schemeClr val="accent1"/>
+          </a:effectRef>
+          <a:fontRef idx="minor">
+            <a:schemeClr val="lt1"/>
+          </a:fontRef>
+        </p:style>
+        <p:txBody>
+          <a:bodyPr rtlCol="0" anchor="ctr"/>
+          <a:lstStyle/>
+          <a:p>
+            <a:pPr algn="ctr"/>
+            <a:r>
+              <a:rPr lang="en-US" dirty="0"/>
+              <a:t>Client Service</a:t>
+            </a:r>
+          </a:p>
+        </p:txBody>
+      </p:sp>
+      <p:sp>
+        <p:nvSpPr>
+          <p:cNvPr id="55" name="Rectangle 54">
+            <a:extLst>
+              <a:ext uri="{FF2B5EF4-FFF2-40B4-BE49-F238E27FC236}">
+                <a16:creationId xmlns:a16="http://schemas.microsoft.com/office/drawing/2014/main" id="{51C55A44-02B5-444D-B48A-5FD268FEE5EA}"/>
+              </a:ext>
+            </a:extLst>
+          </p:cNvPr>
+          <p:cNvSpPr/>
+          <p:nvPr/>
+        </p:nvSpPr>
+        <p:spPr>
+          <a:xfrm>
+            <a:off x="6185696" y="5067945"/>
+            <a:ext cx="1048624" cy="557147"/>
+          </a:xfrm>
+          <a:prstGeom prst="rect">
+            <a:avLst/>
+          </a:prstGeom>
+        </p:spPr>
+        <p:style>
+          <a:lnRef idx="2">
+            <a:schemeClr val="accent1">
+              <a:shade val="50000"/>
+            </a:schemeClr>
+          </a:lnRef>
+          <a:fillRef idx="1">
+            <a:schemeClr val="accent1"/>
+          </a:fillRef>
+          <a:effectRef idx="0">
+            <a:schemeClr val="accent1"/>
+          </a:effectRef>
+          <a:fontRef idx="minor">
+            <a:schemeClr val="lt1"/>
+          </a:fontRef>
+        </p:style>
+        <p:txBody>
+          <a:bodyPr rtlCol="0" anchor="ctr"/>
+          <a:lstStyle/>
+          <a:p>
+            <a:pPr algn="ctr"/>
+            <a:r>
+              <a:rPr lang="en-US" dirty="0"/>
+              <a:t>Client Service</a:t>
+            </a:r>
+          </a:p>
+        </p:txBody>
+      </p:sp>
+      <p:sp>
+        <p:nvSpPr>
+          <p:cNvPr id="18" name="Cylinder 17">
+            <a:extLst>
+              <a:ext uri="{FF2B5EF4-FFF2-40B4-BE49-F238E27FC236}">
+                <a16:creationId xmlns:a16="http://schemas.microsoft.com/office/drawing/2014/main" id="{C4C76896-2F99-4F5B-B4F2-B0ACCEAC8A5C}"/>
+              </a:ext>
+            </a:extLst>
+          </p:cNvPr>
+          <p:cNvSpPr/>
+          <p:nvPr/>
+        </p:nvSpPr>
+        <p:spPr>
+          <a:xfrm>
+            <a:off x="7059106" y="5369161"/>
+            <a:ext cx="298579" cy="342354"/>
+          </a:xfrm>
+          <a:prstGeom prst="can">
+            <a:avLst/>
+          </a:prstGeom>
+          <a:solidFill>
+            <a:schemeClr val="accent2">
+              <a:lumMod val="75000"/>
+            </a:schemeClr>
+          </a:solidFill>
+        </p:spPr>
+        <p:style>
+          <a:lnRef idx="2">
+            <a:schemeClr val="accent1">
+              <a:shade val="50000"/>
+            </a:schemeClr>
+          </a:lnRef>
+          <a:fillRef idx="1">
+            <a:schemeClr val="accent1"/>
+          </a:fillRef>
+          <a:effectRef idx="0">
+            <a:schemeClr val="accent1"/>
+          </a:effectRef>
+          <a:fontRef idx="minor">
+            <a:schemeClr val="lt1"/>
+          </a:fontRef>
+        </p:style>
+        <p:txBody>
+          <a:bodyPr rtlCol="0" anchor="ctr"/>
+          <a:lstStyle/>
+          <a:p>
+            <a:pPr algn="ctr"/>
+            <a:endParaRPr lang="ru-RU"/>
+          </a:p>
+        </p:txBody>
+      </p:sp>
     </p:spTree>
     <p:extLst>
       <p:ext uri="{BB962C8B-B14F-4D97-AF65-F5344CB8AC3E}">

</xml_diff>

<commit_message>
readme grooming in progress
</commit_message>
<xml_diff>
--- a/doc/Solution architecture.pptx
+++ b/doc/Solution architecture.pptx
@@ -261,7 +261,7 @@
           <a:p>
             <a:fld id="{A21C695A-9BC1-497F-9CE7-EC4209D5B22F}" type="datetimeFigureOut">
               <a:rPr lang="ru-RU" smtClean="0"/>
-              <a:t>28.04.2022</a:t>
+              <a:t>02.05.2022</a:t>
             </a:fld>
             <a:endParaRPr lang="ru-RU"/>
           </a:p>
@@ -461,7 +461,7 @@
           <a:p>
             <a:fld id="{A21C695A-9BC1-497F-9CE7-EC4209D5B22F}" type="datetimeFigureOut">
               <a:rPr lang="ru-RU" smtClean="0"/>
-              <a:t>28.04.2022</a:t>
+              <a:t>02.05.2022</a:t>
             </a:fld>
             <a:endParaRPr lang="ru-RU"/>
           </a:p>
@@ -671,7 +671,7 @@
           <a:p>
             <a:fld id="{A21C695A-9BC1-497F-9CE7-EC4209D5B22F}" type="datetimeFigureOut">
               <a:rPr lang="ru-RU" smtClean="0"/>
-              <a:t>28.04.2022</a:t>
+              <a:t>02.05.2022</a:t>
             </a:fld>
             <a:endParaRPr lang="ru-RU"/>
           </a:p>
@@ -871,7 +871,7 @@
           <a:p>
             <a:fld id="{A21C695A-9BC1-497F-9CE7-EC4209D5B22F}" type="datetimeFigureOut">
               <a:rPr lang="ru-RU" smtClean="0"/>
-              <a:t>28.04.2022</a:t>
+              <a:t>02.05.2022</a:t>
             </a:fld>
             <a:endParaRPr lang="ru-RU"/>
           </a:p>
@@ -1147,7 +1147,7 @@
           <a:p>
             <a:fld id="{A21C695A-9BC1-497F-9CE7-EC4209D5B22F}" type="datetimeFigureOut">
               <a:rPr lang="ru-RU" smtClean="0"/>
-              <a:t>28.04.2022</a:t>
+              <a:t>02.05.2022</a:t>
             </a:fld>
             <a:endParaRPr lang="ru-RU"/>
           </a:p>
@@ -1415,7 +1415,7 @@
           <a:p>
             <a:fld id="{A21C695A-9BC1-497F-9CE7-EC4209D5B22F}" type="datetimeFigureOut">
               <a:rPr lang="ru-RU" smtClean="0"/>
-              <a:t>28.04.2022</a:t>
+              <a:t>02.05.2022</a:t>
             </a:fld>
             <a:endParaRPr lang="ru-RU"/>
           </a:p>
@@ -1830,7 +1830,7 @@
           <a:p>
             <a:fld id="{A21C695A-9BC1-497F-9CE7-EC4209D5B22F}" type="datetimeFigureOut">
               <a:rPr lang="ru-RU" smtClean="0"/>
-              <a:t>28.04.2022</a:t>
+              <a:t>02.05.2022</a:t>
             </a:fld>
             <a:endParaRPr lang="ru-RU"/>
           </a:p>
@@ -1972,7 +1972,7 @@
           <a:p>
             <a:fld id="{A21C695A-9BC1-497F-9CE7-EC4209D5B22F}" type="datetimeFigureOut">
               <a:rPr lang="ru-RU" smtClean="0"/>
-              <a:t>28.04.2022</a:t>
+              <a:t>02.05.2022</a:t>
             </a:fld>
             <a:endParaRPr lang="ru-RU"/>
           </a:p>
@@ -2085,7 +2085,7 @@
           <a:p>
             <a:fld id="{A21C695A-9BC1-497F-9CE7-EC4209D5B22F}" type="datetimeFigureOut">
               <a:rPr lang="ru-RU" smtClean="0"/>
-              <a:t>28.04.2022</a:t>
+              <a:t>02.05.2022</a:t>
             </a:fld>
             <a:endParaRPr lang="ru-RU"/>
           </a:p>
@@ -2398,7 +2398,7 @@
           <a:p>
             <a:fld id="{A21C695A-9BC1-497F-9CE7-EC4209D5B22F}" type="datetimeFigureOut">
               <a:rPr lang="ru-RU" smtClean="0"/>
-              <a:t>28.04.2022</a:t>
+              <a:t>02.05.2022</a:t>
             </a:fld>
             <a:endParaRPr lang="ru-RU"/>
           </a:p>
@@ -2687,7 +2687,7 @@
           <a:p>
             <a:fld id="{A21C695A-9BC1-497F-9CE7-EC4209D5B22F}" type="datetimeFigureOut">
               <a:rPr lang="ru-RU" smtClean="0"/>
-              <a:t>28.04.2022</a:t>
+              <a:t>02.05.2022</a:t>
             </a:fld>
             <a:endParaRPr lang="ru-RU"/>
           </a:p>
@@ -2930,7 +2930,7 @@
           <a:p>
             <a:fld id="{A21C695A-9BC1-497F-9CE7-EC4209D5B22F}" type="datetimeFigureOut">
               <a:rPr lang="ru-RU" smtClean="0"/>
-              <a:t>28.04.2022</a:t>
+              <a:t>02.05.2022</a:t>
             </a:fld>
             <a:endParaRPr lang="ru-RU"/>
           </a:p>
@@ -3398,7 +3398,7 @@
         <p:spPr>
           <a:xfrm>
             <a:off x="2122414" y="1007706"/>
-            <a:ext cx="3113244" cy="5317593"/>
+            <a:ext cx="2184909" cy="5317593"/>
           </a:xfrm>
           <a:prstGeom prst="rect">
             <a:avLst/>
@@ -3456,8 +3456,8 @@
         </p:nvSpPr>
         <p:spPr>
           <a:xfrm>
-            <a:off x="5232732" y="1007707"/>
-            <a:ext cx="4640768" cy="5317593"/>
+            <a:off x="4307323" y="1007706"/>
+            <a:ext cx="5566177" cy="5317595"/>
           </a:xfrm>
           <a:prstGeom prst="rect">
             <a:avLst/>
@@ -3503,55 +3503,6 @@
       </p:sp>
       <p:sp>
         <p:nvSpPr>
-          <p:cNvPr id="4" name="Rectangle 3">
-            <a:extLst>
-              <a:ext uri="{FF2B5EF4-FFF2-40B4-BE49-F238E27FC236}">
-                <a16:creationId xmlns:a16="http://schemas.microsoft.com/office/drawing/2014/main" id="{2414CB02-95C6-44AA-9AED-06C0A6E570B1}"/>
-              </a:ext>
-            </a:extLst>
-          </p:cNvPr>
-          <p:cNvSpPr/>
-          <p:nvPr/>
-        </p:nvSpPr>
-        <p:spPr>
-          <a:xfrm>
-            <a:off x="4969293" y="1486671"/>
-            <a:ext cx="430235" cy="4437776"/>
-          </a:xfrm>
-          <a:prstGeom prst="rect">
-            <a:avLst/>
-          </a:prstGeom>
-        </p:spPr>
-        <p:style>
-          <a:lnRef idx="2">
-            <a:schemeClr val="accent1">
-              <a:shade val="50000"/>
-            </a:schemeClr>
-          </a:lnRef>
-          <a:fillRef idx="1">
-            <a:schemeClr val="accent1"/>
-          </a:fillRef>
-          <a:effectRef idx="0">
-            <a:schemeClr val="accent1"/>
-          </a:effectRef>
-          <a:fontRef idx="minor">
-            <a:schemeClr val="lt1"/>
-          </a:fontRef>
-        </p:style>
-        <p:txBody>
-          <a:bodyPr vert="vert270" rtlCol="0" anchor="ctr"/>
-          <a:lstStyle/>
-          <a:p>
-            <a:pPr algn="ctr"/>
-            <a:r>
-              <a:rPr lang="en-US" dirty="0"/>
-              <a:t>Public API, Auth service</a:t>
-            </a:r>
-          </a:p>
-        </p:txBody>
-      </p:sp>
-      <p:sp>
-        <p:nvSpPr>
           <p:cNvPr id="5" name="Rectangle 4">
             <a:extLst>
               <a:ext uri="{FF2B5EF4-FFF2-40B4-BE49-F238E27FC236}">
@@ -4246,12 +4197,1357 @@
           </a:p>
         </p:txBody>
       </p:sp>
+      <p:sp>
+        <p:nvSpPr>
+          <p:cNvPr id="31" name="Smiley Face 30">
+            <a:extLst>
+              <a:ext uri="{FF2B5EF4-FFF2-40B4-BE49-F238E27FC236}">
+                <a16:creationId xmlns:a16="http://schemas.microsoft.com/office/drawing/2014/main" id="{9AB33322-F2A5-4D30-BA30-C2230184A64D}"/>
+              </a:ext>
+            </a:extLst>
+          </p:cNvPr>
+          <p:cNvSpPr/>
+          <p:nvPr/>
+        </p:nvSpPr>
+        <p:spPr>
+          <a:xfrm>
+            <a:off x="2854795" y="2257172"/>
+            <a:ext cx="293614" cy="287695"/>
+          </a:xfrm>
+          <a:prstGeom prst="smileyFace">
+            <a:avLst/>
+          </a:prstGeom>
+          <a:solidFill>
+            <a:srgbClr val="FFFF00"/>
+          </a:solidFill>
+        </p:spPr>
+        <p:style>
+          <a:lnRef idx="2">
+            <a:schemeClr val="accent1">
+              <a:shade val="50000"/>
+            </a:schemeClr>
+          </a:lnRef>
+          <a:fillRef idx="1">
+            <a:schemeClr val="accent1"/>
+          </a:fillRef>
+          <a:effectRef idx="0">
+            <a:schemeClr val="accent1"/>
+          </a:effectRef>
+          <a:fontRef idx="minor">
+            <a:schemeClr val="lt1"/>
+          </a:fontRef>
+        </p:style>
+        <p:txBody>
+          <a:bodyPr rtlCol="0" anchor="ctr"/>
+          <a:lstStyle/>
+          <a:p>
+            <a:pPr algn="ctr"/>
+            <a:endParaRPr lang="ru-RU" dirty="0"/>
+          </a:p>
+        </p:txBody>
+      </p:sp>
+      <p:sp>
+        <p:nvSpPr>
+          <p:cNvPr id="33" name="TextBox 32">
+            <a:extLst>
+              <a:ext uri="{FF2B5EF4-FFF2-40B4-BE49-F238E27FC236}">
+                <a16:creationId xmlns:a16="http://schemas.microsoft.com/office/drawing/2014/main" id="{61575CCB-F257-4AFF-BFD2-C5402BD1CE86}"/>
+              </a:ext>
+            </a:extLst>
+          </p:cNvPr>
+          <p:cNvSpPr txBox="1"/>
+          <p:nvPr/>
+        </p:nvSpPr>
+        <p:spPr>
+          <a:xfrm>
+            <a:off x="2720613" y="2527154"/>
+            <a:ext cx="543739" cy="261610"/>
+          </a:xfrm>
+          <a:prstGeom prst="rect">
+            <a:avLst/>
+          </a:prstGeom>
+          <a:noFill/>
+        </p:spPr>
+        <p:txBody>
+          <a:bodyPr wrap="none" rtlCol="0">
+            <a:spAutoFit/>
+          </a:bodyPr>
+          <a:lstStyle/>
+          <a:p>
+            <a:r>
+              <a:rPr lang="en-US" sz="1100" dirty="0"/>
+              <a:t>admin</a:t>
+            </a:r>
+            <a:endParaRPr lang="ru-RU" sz="1100" dirty="0"/>
+          </a:p>
+        </p:txBody>
+      </p:sp>
+      <p:sp>
+        <p:nvSpPr>
+          <p:cNvPr id="29" name="Smiley Face 28">
+            <a:extLst>
+              <a:ext uri="{FF2B5EF4-FFF2-40B4-BE49-F238E27FC236}">
+                <a16:creationId xmlns:a16="http://schemas.microsoft.com/office/drawing/2014/main" id="{E5E3BD20-A4B3-462D-A3A5-88B57B1F6B6A}"/>
+              </a:ext>
+            </a:extLst>
+          </p:cNvPr>
+          <p:cNvSpPr/>
+          <p:nvPr/>
+        </p:nvSpPr>
+        <p:spPr>
+          <a:xfrm>
+            <a:off x="2829949" y="3296315"/>
+            <a:ext cx="293614" cy="287695"/>
+          </a:xfrm>
+          <a:prstGeom prst="smileyFace">
+            <a:avLst/>
+          </a:prstGeom>
+          <a:solidFill>
+            <a:srgbClr val="FFFF00"/>
+          </a:solidFill>
+        </p:spPr>
+        <p:style>
+          <a:lnRef idx="2">
+            <a:schemeClr val="accent1">
+              <a:shade val="50000"/>
+            </a:schemeClr>
+          </a:lnRef>
+          <a:fillRef idx="1">
+            <a:schemeClr val="accent1"/>
+          </a:fillRef>
+          <a:effectRef idx="0">
+            <a:schemeClr val="accent1"/>
+          </a:effectRef>
+          <a:fontRef idx="minor">
+            <a:schemeClr val="lt1"/>
+          </a:fontRef>
+        </p:style>
+        <p:txBody>
+          <a:bodyPr rtlCol="0" anchor="ctr"/>
+          <a:lstStyle/>
+          <a:p>
+            <a:pPr algn="ctr"/>
+            <a:endParaRPr lang="ru-RU" dirty="0"/>
+          </a:p>
+        </p:txBody>
+      </p:sp>
+      <p:sp>
+        <p:nvSpPr>
+          <p:cNvPr id="34" name="TextBox 33">
+            <a:extLst>
+              <a:ext uri="{FF2B5EF4-FFF2-40B4-BE49-F238E27FC236}">
+                <a16:creationId xmlns:a16="http://schemas.microsoft.com/office/drawing/2014/main" id="{D5F420B2-0E81-4510-BC94-7FA214C19169}"/>
+              </a:ext>
+            </a:extLst>
+          </p:cNvPr>
+          <p:cNvSpPr txBox="1"/>
+          <p:nvPr/>
+        </p:nvSpPr>
+        <p:spPr>
+          <a:xfrm>
+            <a:off x="2670920" y="3541190"/>
+            <a:ext cx="593432" cy="261610"/>
+          </a:xfrm>
+          <a:prstGeom prst="rect">
+            <a:avLst/>
+          </a:prstGeom>
+          <a:noFill/>
+        </p:spPr>
+        <p:txBody>
+          <a:bodyPr wrap="none" rtlCol="0">
+            <a:spAutoFit/>
+          </a:bodyPr>
+          <a:lstStyle/>
+          <a:p>
+            <a:r>
+              <a:rPr lang="en-US" sz="1100" dirty="0"/>
+              <a:t>courier</a:t>
+            </a:r>
+            <a:endParaRPr lang="ru-RU" sz="1100" dirty="0"/>
+          </a:p>
+        </p:txBody>
+      </p:sp>
+      <p:sp>
+        <p:nvSpPr>
+          <p:cNvPr id="37" name="Smiley Face 36">
+            <a:extLst>
+              <a:ext uri="{FF2B5EF4-FFF2-40B4-BE49-F238E27FC236}">
+                <a16:creationId xmlns:a16="http://schemas.microsoft.com/office/drawing/2014/main" id="{29DF5B8A-FA15-444C-A868-581205AA5242}"/>
+              </a:ext>
+            </a:extLst>
+          </p:cNvPr>
+          <p:cNvSpPr/>
+          <p:nvPr/>
+        </p:nvSpPr>
+        <p:spPr>
+          <a:xfrm>
+            <a:off x="2822009" y="4347496"/>
+            <a:ext cx="293614" cy="287695"/>
+          </a:xfrm>
+          <a:prstGeom prst="smileyFace">
+            <a:avLst/>
+          </a:prstGeom>
+          <a:solidFill>
+            <a:srgbClr val="FFFF00"/>
+          </a:solidFill>
+        </p:spPr>
+        <p:style>
+          <a:lnRef idx="2">
+            <a:schemeClr val="accent1">
+              <a:shade val="50000"/>
+            </a:schemeClr>
+          </a:lnRef>
+          <a:fillRef idx="1">
+            <a:schemeClr val="accent1"/>
+          </a:fillRef>
+          <a:effectRef idx="0">
+            <a:schemeClr val="accent1"/>
+          </a:effectRef>
+          <a:fontRef idx="minor">
+            <a:schemeClr val="lt1"/>
+          </a:fontRef>
+        </p:style>
+        <p:txBody>
+          <a:bodyPr rtlCol="0" anchor="ctr"/>
+          <a:lstStyle/>
+          <a:p>
+            <a:pPr algn="ctr"/>
+            <a:endParaRPr lang="ru-RU" dirty="0"/>
+          </a:p>
+        </p:txBody>
+      </p:sp>
+      <p:sp>
+        <p:nvSpPr>
+          <p:cNvPr id="38" name="TextBox 37">
+            <a:extLst>
+              <a:ext uri="{FF2B5EF4-FFF2-40B4-BE49-F238E27FC236}">
+                <a16:creationId xmlns:a16="http://schemas.microsoft.com/office/drawing/2014/main" id="{F3BA2DC2-F3DD-419F-ABE3-85DB2691E8B0}"/>
+              </a:ext>
+            </a:extLst>
+          </p:cNvPr>
+          <p:cNvSpPr txBox="1"/>
+          <p:nvPr/>
+        </p:nvSpPr>
+        <p:spPr>
+          <a:xfrm>
+            <a:off x="2662980" y="4592371"/>
+            <a:ext cx="530915" cy="261610"/>
+          </a:xfrm>
+          <a:prstGeom prst="rect">
+            <a:avLst/>
+          </a:prstGeom>
+          <a:noFill/>
+        </p:spPr>
+        <p:txBody>
+          <a:bodyPr wrap="none" rtlCol="0">
+            <a:spAutoFit/>
+          </a:bodyPr>
+          <a:lstStyle/>
+          <a:p>
+            <a:r>
+              <a:rPr lang="en-US" sz="1100" dirty="0"/>
+              <a:t> client</a:t>
+            </a:r>
+            <a:endParaRPr lang="ru-RU" sz="1100" dirty="0"/>
+          </a:p>
+        </p:txBody>
+      </p:sp>
+      <p:sp>
+        <p:nvSpPr>
+          <p:cNvPr id="46" name="Rectangle 45">
+            <a:extLst>
+              <a:ext uri="{FF2B5EF4-FFF2-40B4-BE49-F238E27FC236}">
+                <a16:creationId xmlns:a16="http://schemas.microsoft.com/office/drawing/2014/main" id="{3ACE2B74-390E-4A84-A326-BD2A4B34316E}"/>
+              </a:ext>
+            </a:extLst>
+          </p:cNvPr>
+          <p:cNvSpPr/>
+          <p:nvPr/>
+        </p:nvSpPr>
+        <p:spPr>
+          <a:xfrm>
+            <a:off x="5651291" y="5784184"/>
+            <a:ext cx="1114009" cy="342354"/>
+          </a:xfrm>
+          <a:prstGeom prst="rect">
+            <a:avLst/>
+          </a:prstGeom>
+          <a:solidFill>
+            <a:schemeClr val="accent1">
+              <a:lumMod val="20000"/>
+              <a:lumOff val="80000"/>
+            </a:schemeClr>
+          </a:solidFill>
+          <a:ln>
+            <a:prstDash val="dashDot"/>
+          </a:ln>
+        </p:spPr>
+        <p:style>
+          <a:lnRef idx="2">
+            <a:schemeClr val="accent1">
+              <a:shade val="50000"/>
+            </a:schemeClr>
+          </a:lnRef>
+          <a:fillRef idx="1">
+            <a:schemeClr val="accent1"/>
+          </a:fillRef>
+          <a:effectRef idx="0">
+            <a:schemeClr val="accent1"/>
+          </a:effectRef>
+          <a:fontRef idx="minor">
+            <a:schemeClr val="lt1"/>
+          </a:fontRef>
+        </p:style>
+        <p:txBody>
+          <a:bodyPr rtlCol="0" anchor="ctr"/>
+          <a:lstStyle/>
+          <a:p>
+            <a:pPr algn="ctr"/>
+            <a:r>
+              <a:rPr lang="en-US" sz="1000" dirty="0">
+                <a:solidFill>
+                  <a:schemeClr val="bg2">
+                    <a:lumMod val="25000"/>
+                  </a:schemeClr>
+                </a:solidFill>
+              </a:rPr>
+              <a:t>Optional Discovery service</a:t>
+            </a:r>
+            <a:endParaRPr lang="ru-RU" sz="1000" dirty="0">
+              <a:solidFill>
+                <a:schemeClr val="bg2">
+                  <a:lumMod val="25000"/>
+                </a:schemeClr>
+              </a:solidFill>
+            </a:endParaRPr>
+          </a:p>
+        </p:txBody>
+      </p:sp>
+      <p:cxnSp>
+        <p:nvCxnSpPr>
+          <p:cNvPr id="48" name="Straight Arrow Connector 47">
+            <a:extLst>
+              <a:ext uri="{FF2B5EF4-FFF2-40B4-BE49-F238E27FC236}">
+                <a16:creationId xmlns:a16="http://schemas.microsoft.com/office/drawing/2014/main" id="{1CF97E27-58A6-4341-BDB2-F385AC1D5638}"/>
+              </a:ext>
+            </a:extLst>
+          </p:cNvPr>
+          <p:cNvCxnSpPr/>
+          <p:nvPr/>
+        </p:nvCxnSpPr>
+        <p:spPr>
+          <a:xfrm>
+            <a:off x="5793162" y="2182679"/>
+            <a:ext cx="0" cy="3584457"/>
+          </a:xfrm>
+          <a:prstGeom prst="straightConnector1">
+            <a:avLst/>
+          </a:prstGeom>
+          <a:ln>
+            <a:prstDash val="lgDashDot"/>
+            <a:tailEnd type="triangle"/>
+          </a:ln>
+        </p:spPr>
+        <p:style>
+          <a:lnRef idx="1">
+            <a:schemeClr val="accent1"/>
+          </a:lnRef>
+          <a:fillRef idx="0">
+            <a:schemeClr val="accent1"/>
+          </a:fillRef>
+          <a:effectRef idx="0">
+            <a:schemeClr val="accent1"/>
+          </a:effectRef>
+          <a:fontRef idx="minor">
+            <a:schemeClr val="tx1"/>
+          </a:fontRef>
+        </p:style>
+      </p:cxnSp>
+      <p:cxnSp>
+        <p:nvCxnSpPr>
+          <p:cNvPr id="54" name="Straight Arrow Connector 53">
+            <a:extLst>
+              <a:ext uri="{FF2B5EF4-FFF2-40B4-BE49-F238E27FC236}">
+                <a16:creationId xmlns:a16="http://schemas.microsoft.com/office/drawing/2014/main" id="{7E1C8BD6-990C-4312-9C5E-99A8F768C28C}"/>
+              </a:ext>
+            </a:extLst>
+          </p:cNvPr>
+          <p:cNvCxnSpPr/>
+          <p:nvPr/>
+        </p:nvCxnSpPr>
+        <p:spPr>
+          <a:xfrm>
+            <a:off x="5793162" y="2182679"/>
+            <a:ext cx="279581" cy="0"/>
+          </a:xfrm>
+          <a:prstGeom prst="straightConnector1">
+            <a:avLst/>
+          </a:prstGeom>
+          <a:ln>
+            <a:prstDash val="dash"/>
+            <a:headEnd type="triangle"/>
+            <a:tailEnd type="triangle"/>
+          </a:ln>
+        </p:spPr>
+        <p:style>
+          <a:lnRef idx="1">
+            <a:schemeClr val="accent1"/>
+          </a:lnRef>
+          <a:fillRef idx="0">
+            <a:schemeClr val="accent1"/>
+          </a:fillRef>
+          <a:effectRef idx="0">
+            <a:schemeClr val="accent1"/>
+          </a:effectRef>
+          <a:fontRef idx="minor">
+            <a:schemeClr val="tx1"/>
+          </a:fontRef>
+        </p:style>
+      </p:cxnSp>
+      <p:cxnSp>
+        <p:nvCxnSpPr>
+          <p:cNvPr id="56" name="Straight Arrow Connector 55">
+            <a:extLst>
+              <a:ext uri="{FF2B5EF4-FFF2-40B4-BE49-F238E27FC236}">
+                <a16:creationId xmlns:a16="http://schemas.microsoft.com/office/drawing/2014/main" id="{AB5BF6EE-6ABA-4899-BA96-5E205E6C0409}"/>
+              </a:ext>
+            </a:extLst>
+          </p:cNvPr>
+          <p:cNvCxnSpPr/>
+          <p:nvPr/>
+        </p:nvCxnSpPr>
+        <p:spPr>
+          <a:xfrm>
+            <a:off x="5793162" y="3223985"/>
+            <a:ext cx="272013" cy="0"/>
+          </a:xfrm>
+          <a:prstGeom prst="straightConnector1">
+            <a:avLst/>
+          </a:prstGeom>
+          <a:ln>
+            <a:prstDash val="dash"/>
+            <a:headEnd type="triangle"/>
+            <a:tailEnd type="triangle"/>
+          </a:ln>
+        </p:spPr>
+        <p:style>
+          <a:lnRef idx="1">
+            <a:schemeClr val="accent1"/>
+          </a:lnRef>
+          <a:fillRef idx="0">
+            <a:schemeClr val="accent1"/>
+          </a:fillRef>
+          <a:effectRef idx="0">
+            <a:schemeClr val="accent1"/>
+          </a:effectRef>
+          <a:fontRef idx="minor">
+            <a:schemeClr val="tx1"/>
+          </a:fontRef>
+        </p:style>
+      </p:cxnSp>
+      <p:cxnSp>
+        <p:nvCxnSpPr>
+          <p:cNvPr id="58" name="Straight Arrow Connector 57">
+            <a:extLst>
+              <a:ext uri="{FF2B5EF4-FFF2-40B4-BE49-F238E27FC236}">
+                <a16:creationId xmlns:a16="http://schemas.microsoft.com/office/drawing/2014/main" id="{E29C664D-19AA-45EC-90B3-8E21C8B741E9}"/>
+              </a:ext>
+            </a:extLst>
+          </p:cNvPr>
+          <p:cNvCxnSpPr/>
+          <p:nvPr/>
+        </p:nvCxnSpPr>
+        <p:spPr>
+          <a:xfrm>
+            <a:off x="5793162" y="4347496"/>
+            <a:ext cx="272013" cy="0"/>
+          </a:xfrm>
+          <a:prstGeom prst="straightConnector1">
+            <a:avLst/>
+          </a:prstGeom>
+          <a:ln>
+            <a:prstDash val="dash"/>
+            <a:headEnd type="triangle"/>
+            <a:tailEnd type="triangle"/>
+          </a:ln>
+        </p:spPr>
+        <p:style>
+          <a:lnRef idx="1">
+            <a:schemeClr val="accent1"/>
+          </a:lnRef>
+          <a:fillRef idx="0">
+            <a:schemeClr val="accent1"/>
+          </a:fillRef>
+          <a:effectRef idx="0">
+            <a:schemeClr val="accent1"/>
+          </a:effectRef>
+          <a:fontRef idx="minor">
+            <a:schemeClr val="tx1"/>
+          </a:fontRef>
+        </p:style>
+      </p:cxnSp>
+      <p:cxnSp>
+        <p:nvCxnSpPr>
+          <p:cNvPr id="60" name="Straight Arrow Connector 59">
+            <a:extLst>
+              <a:ext uri="{FF2B5EF4-FFF2-40B4-BE49-F238E27FC236}">
+                <a16:creationId xmlns:a16="http://schemas.microsoft.com/office/drawing/2014/main" id="{F914C248-9CC1-462A-A2B4-15D112B1C5FC}"/>
+              </a:ext>
+            </a:extLst>
+          </p:cNvPr>
+          <p:cNvCxnSpPr/>
+          <p:nvPr/>
+        </p:nvCxnSpPr>
+        <p:spPr>
+          <a:xfrm>
+            <a:off x="5800730" y="5440403"/>
+            <a:ext cx="272013" cy="0"/>
+          </a:xfrm>
+          <a:prstGeom prst="straightConnector1">
+            <a:avLst/>
+          </a:prstGeom>
+          <a:ln>
+            <a:prstDash val="dash"/>
+            <a:headEnd type="triangle"/>
+            <a:tailEnd type="triangle"/>
+          </a:ln>
+        </p:spPr>
+        <p:style>
+          <a:lnRef idx="1">
+            <a:schemeClr val="accent1"/>
+          </a:lnRef>
+          <a:fillRef idx="0">
+            <a:schemeClr val="accent1"/>
+          </a:fillRef>
+          <a:effectRef idx="0">
+            <a:schemeClr val="accent1"/>
+          </a:effectRef>
+          <a:fontRef idx="minor">
+            <a:schemeClr val="tx1"/>
+          </a:fontRef>
+        </p:style>
+      </p:cxnSp>
+      <p:sp>
+        <p:nvSpPr>
+          <p:cNvPr id="44" name="Rectangle 43">
+            <a:extLst>
+              <a:ext uri="{FF2B5EF4-FFF2-40B4-BE49-F238E27FC236}">
+                <a16:creationId xmlns:a16="http://schemas.microsoft.com/office/drawing/2014/main" id="{309CF89C-C7EF-43A9-86B9-EC3642B3778F}"/>
+              </a:ext>
+            </a:extLst>
+          </p:cNvPr>
+          <p:cNvSpPr/>
+          <p:nvPr/>
+        </p:nvSpPr>
+        <p:spPr>
+          <a:xfrm>
+            <a:off x="6126302" y="1809326"/>
+            <a:ext cx="1048624" cy="557147"/>
+          </a:xfrm>
+          <a:prstGeom prst="rect">
+            <a:avLst/>
+          </a:prstGeom>
+        </p:spPr>
+        <p:style>
+          <a:lnRef idx="2">
+            <a:schemeClr val="accent1">
+              <a:shade val="50000"/>
+            </a:schemeClr>
+          </a:lnRef>
+          <a:fillRef idx="1">
+            <a:schemeClr val="accent1"/>
+          </a:fillRef>
+          <a:effectRef idx="0">
+            <a:schemeClr val="accent1"/>
+          </a:effectRef>
+          <a:fontRef idx="minor">
+            <a:schemeClr val="lt1"/>
+          </a:fontRef>
+        </p:style>
+        <p:txBody>
+          <a:bodyPr rtlCol="0" anchor="ctr"/>
+          <a:lstStyle/>
+          <a:p>
+            <a:pPr algn="ctr"/>
+            <a:r>
+              <a:rPr lang="en-US" dirty="0"/>
+              <a:t>User Service</a:t>
+            </a:r>
+          </a:p>
+        </p:txBody>
+      </p:sp>
+      <p:sp>
+        <p:nvSpPr>
+          <p:cNvPr id="47" name="Rectangle 46">
+            <a:extLst>
+              <a:ext uri="{FF2B5EF4-FFF2-40B4-BE49-F238E27FC236}">
+                <a16:creationId xmlns:a16="http://schemas.microsoft.com/office/drawing/2014/main" id="{29223604-B549-4D27-BA71-5E8449600756}"/>
+              </a:ext>
+            </a:extLst>
+          </p:cNvPr>
+          <p:cNvSpPr/>
+          <p:nvPr/>
+        </p:nvSpPr>
+        <p:spPr>
+          <a:xfrm>
+            <a:off x="6185696" y="1901549"/>
+            <a:ext cx="1048624" cy="557147"/>
+          </a:xfrm>
+          <a:prstGeom prst="rect">
+            <a:avLst/>
+          </a:prstGeom>
+        </p:spPr>
+        <p:style>
+          <a:lnRef idx="2">
+            <a:schemeClr val="accent1">
+              <a:shade val="50000"/>
+            </a:schemeClr>
+          </a:lnRef>
+          <a:fillRef idx="1">
+            <a:schemeClr val="accent1"/>
+          </a:fillRef>
+          <a:effectRef idx="0">
+            <a:schemeClr val="accent1"/>
+          </a:effectRef>
+          <a:fontRef idx="minor">
+            <a:schemeClr val="lt1"/>
+          </a:fontRef>
+        </p:style>
+        <p:txBody>
+          <a:bodyPr rtlCol="0" anchor="ctr"/>
+          <a:lstStyle/>
+          <a:p>
+            <a:pPr algn="ctr"/>
+            <a:r>
+              <a:rPr lang="en-US" dirty="0"/>
+              <a:t>User Service</a:t>
+            </a:r>
+          </a:p>
+        </p:txBody>
+      </p:sp>
+      <p:sp>
+        <p:nvSpPr>
+          <p:cNvPr id="12" name="Cylinder 11">
+            <a:extLst>
+              <a:ext uri="{FF2B5EF4-FFF2-40B4-BE49-F238E27FC236}">
+                <a16:creationId xmlns:a16="http://schemas.microsoft.com/office/drawing/2014/main" id="{FD826414-1850-41E8-8E5F-862D193DFB8F}"/>
+              </a:ext>
+            </a:extLst>
+          </p:cNvPr>
+          <p:cNvSpPr/>
+          <p:nvPr/>
+        </p:nvSpPr>
+        <p:spPr>
+          <a:xfrm>
+            <a:off x="7027549" y="2116714"/>
+            <a:ext cx="298579" cy="342354"/>
+          </a:xfrm>
+          <a:prstGeom prst="can">
+            <a:avLst/>
+          </a:prstGeom>
+          <a:solidFill>
+            <a:schemeClr val="accent2">
+              <a:lumMod val="75000"/>
+            </a:schemeClr>
+          </a:solidFill>
+        </p:spPr>
+        <p:style>
+          <a:lnRef idx="2">
+            <a:schemeClr val="accent1">
+              <a:shade val="50000"/>
+            </a:schemeClr>
+          </a:lnRef>
+          <a:fillRef idx="1">
+            <a:schemeClr val="accent1"/>
+          </a:fillRef>
+          <a:effectRef idx="0">
+            <a:schemeClr val="accent1"/>
+          </a:effectRef>
+          <a:fontRef idx="minor">
+            <a:schemeClr val="lt1"/>
+          </a:fontRef>
+        </p:style>
+        <p:txBody>
+          <a:bodyPr rtlCol="0" anchor="ctr"/>
+          <a:lstStyle/>
+          <a:p>
+            <a:pPr algn="ctr"/>
+            <a:endParaRPr lang="ru-RU"/>
+          </a:p>
+        </p:txBody>
+      </p:sp>
+      <p:sp>
+        <p:nvSpPr>
+          <p:cNvPr id="49" name="Rectangle 48">
+            <a:extLst>
+              <a:ext uri="{FF2B5EF4-FFF2-40B4-BE49-F238E27FC236}">
+                <a16:creationId xmlns:a16="http://schemas.microsoft.com/office/drawing/2014/main" id="{0BC4C11F-DF3A-4D74-A591-B65026140026}"/>
+              </a:ext>
+            </a:extLst>
+          </p:cNvPr>
+          <p:cNvSpPr/>
+          <p:nvPr/>
+        </p:nvSpPr>
+        <p:spPr>
+          <a:xfrm>
+            <a:off x="6117729" y="2818298"/>
+            <a:ext cx="1048624" cy="557147"/>
+          </a:xfrm>
+          <a:prstGeom prst="rect">
+            <a:avLst/>
+          </a:prstGeom>
+        </p:spPr>
+        <p:style>
+          <a:lnRef idx="2">
+            <a:schemeClr val="accent1">
+              <a:shade val="50000"/>
+            </a:schemeClr>
+          </a:lnRef>
+          <a:fillRef idx="1">
+            <a:schemeClr val="accent1"/>
+          </a:fillRef>
+          <a:effectRef idx="0">
+            <a:schemeClr val="accent1"/>
+          </a:effectRef>
+          <a:fontRef idx="minor">
+            <a:schemeClr val="lt1"/>
+          </a:fontRef>
+        </p:style>
+        <p:txBody>
+          <a:bodyPr rtlCol="0" anchor="ctr"/>
+          <a:lstStyle/>
+          <a:p>
+            <a:pPr algn="ctr"/>
+            <a:r>
+              <a:rPr lang="en-US" dirty="0"/>
+              <a:t>Admin Service</a:t>
+            </a:r>
+          </a:p>
+        </p:txBody>
+      </p:sp>
+      <p:sp>
+        <p:nvSpPr>
+          <p:cNvPr id="50" name="Rectangle 49">
+            <a:extLst>
+              <a:ext uri="{FF2B5EF4-FFF2-40B4-BE49-F238E27FC236}">
+                <a16:creationId xmlns:a16="http://schemas.microsoft.com/office/drawing/2014/main" id="{5E67D8FE-2D6A-4B68-A84B-902CBD6A1BBC}"/>
+              </a:ext>
+            </a:extLst>
+          </p:cNvPr>
+          <p:cNvSpPr/>
+          <p:nvPr/>
+        </p:nvSpPr>
+        <p:spPr>
+          <a:xfrm>
+            <a:off x="6159771" y="2869035"/>
+            <a:ext cx="1048624" cy="557147"/>
+          </a:xfrm>
+          <a:prstGeom prst="rect">
+            <a:avLst/>
+          </a:prstGeom>
+        </p:spPr>
+        <p:style>
+          <a:lnRef idx="2">
+            <a:schemeClr val="accent1">
+              <a:shade val="50000"/>
+            </a:schemeClr>
+          </a:lnRef>
+          <a:fillRef idx="1">
+            <a:schemeClr val="accent1"/>
+          </a:fillRef>
+          <a:effectRef idx="0">
+            <a:schemeClr val="accent1"/>
+          </a:effectRef>
+          <a:fontRef idx="minor">
+            <a:schemeClr val="lt1"/>
+          </a:fontRef>
+        </p:style>
+        <p:txBody>
+          <a:bodyPr rtlCol="0" anchor="ctr"/>
+          <a:lstStyle/>
+          <a:p>
+            <a:pPr algn="ctr"/>
+            <a:r>
+              <a:rPr lang="en-US" dirty="0"/>
+              <a:t>Admin Service</a:t>
+            </a:r>
+          </a:p>
+        </p:txBody>
+      </p:sp>
+      <p:sp>
+        <p:nvSpPr>
+          <p:cNvPr id="16" name="Cylinder 15">
+            <a:extLst>
+              <a:ext uri="{FF2B5EF4-FFF2-40B4-BE49-F238E27FC236}">
+                <a16:creationId xmlns:a16="http://schemas.microsoft.com/office/drawing/2014/main" id="{3EB51B1F-23FD-45E0-A6CB-13275B762522}"/>
+              </a:ext>
+            </a:extLst>
+          </p:cNvPr>
+          <p:cNvSpPr/>
+          <p:nvPr/>
+        </p:nvSpPr>
+        <p:spPr>
+          <a:xfrm>
+            <a:off x="7027992" y="3147609"/>
+            <a:ext cx="298579" cy="342354"/>
+          </a:xfrm>
+          <a:prstGeom prst="can">
+            <a:avLst/>
+          </a:prstGeom>
+          <a:solidFill>
+            <a:schemeClr val="accent2">
+              <a:lumMod val="75000"/>
+            </a:schemeClr>
+          </a:solidFill>
+        </p:spPr>
+        <p:style>
+          <a:lnRef idx="2">
+            <a:schemeClr val="accent1">
+              <a:shade val="50000"/>
+            </a:schemeClr>
+          </a:lnRef>
+          <a:fillRef idx="1">
+            <a:schemeClr val="accent1"/>
+          </a:fillRef>
+          <a:effectRef idx="0">
+            <a:schemeClr val="accent1"/>
+          </a:effectRef>
+          <a:fontRef idx="minor">
+            <a:schemeClr val="lt1"/>
+          </a:fontRef>
+        </p:style>
+        <p:txBody>
+          <a:bodyPr rtlCol="0" anchor="ctr"/>
+          <a:lstStyle/>
+          <a:p>
+            <a:pPr algn="ctr"/>
+            <a:endParaRPr lang="ru-RU"/>
+          </a:p>
+        </p:txBody>
+      </p:sp>
+      <p:sp>
+        <p:nvSpPr>
+          <p:cNvPr id="51" name="Rectangle 50">
+            <a:extLst>
+              <a:ext uri="{FF2B5EF4-FFF2-40B4-BE49-F238E27FC236}">
+                <a16:creationId xmlns:a16="http://schemas.microsoft.com/office/drawing/2014/main" id="{7CC4CB58-F964-4F74-914A-3D679B2332B2}"/>
+              </a:ext>
+            </a:extLst>
+          </p:cNvPr>
+          <p:cNvSpPr/>
+          <p:nvPr/>
+        </p:nvSpPr>
+        <p:spPr>
+          <a:xfrm>
+            <a:off x="6125453" y="3918654"/>
+            <a:ext cx="1048624" cy="557147"/>
+          </a:xfrm>
+          <a:prstGeom prst="rect">
+            <a:avLst/>
+          </a:prstGeom>
+        </p:spPr>
+        <p:style>
+          <a:lnRef idx="2">
+            <a:schemeClr val="accent1">
+              <a:shade val="50000"/>
+            </a:schemeClr>
+          </a:lnRef>
+          <a:fillRef idx="1">
+            <a:schemeClr val="accent1"/>
+          </a:fillRef>
+          <a:effectRef idx="0">
+            <a:schemeClr val="accent1"/>
+          </a:effectRef>
+          <a:fontRef idx="minor">
+            <a:schemeClr val="lt1"/>
+          </a:fontRef>
+        </p:style>
+        <p:txBody>
+          <a:bodyPr rtlCol="0" anchor="ctr"/>
+          <a:lstStyle/>
+          <a:p>
+            <a:pPr algn="ctr"/>
+            <a:r>
+              <a:rPr lang="en-US" dirty="0"/>
+              <a:t>Courier Service</a:t>
+            </a:r>
+          </a:p>
+        </p:txBody>
+      </p:sp>
+      <p:sp>
+        <p:nvSpPr>
+          <p:cNvPr id="52" name="Rectangle 51">
+            <a:extLst>
+              <a:ext uri="{FF2B5EF4-FFF2-40B4-BE49-F238E27FC236}">
+                <a16:creationId xmlns:a16="http://schemas.microsoft.com/office/drawing/2014/main" id="{FC10E71A-E74A-4702-B3EB-807213AA4561}"/>
+              </a:ext>
+            </a:extLst>
+          </p:cNvPr>
+          <p:cNvSpPr/>
+          <p:nvPr/>
+        </p:nvSpPr>
+        <p:spPr>
+          <a:xfrm>
+            <a:off x="6177207" y="3968998"/>
+            <a:ext cx="1048624" cy="557147"/>
+          </a:xfrm>
+          <a:prstGeom prst="rect">
+            <a:avLst/>
+          </a:prstGeom>
+        </p:spPr>
+        <p:style>
+          <a:lnRef idx="2">
+            <a:schemeClr val="accent1">
+              <a:shade val="50000"/>
+            </a:schemeClr>
+          </a:lnRef>
+          <a:fillRef idx="1">
+            <a:schemeClr val="accent1"/>
+          </a:fillRef>
+          <a:effectRef idx="0">
+            <a:schemeClr val="accent1"/>
+          </a:effectRef>
+          <a:fontRef idx="minor">
+            <a:schemeClr val="lt1"/>
+          </a:fontRef>
+        </p:style>
+        <p:txBody>
+          <a:bodyPr rtlCol="0" anchor="ctr"/>
+          <a:lstStyle/>
+          <a:p>
+            <a:pPr algn="ctr"/>
+            <a:r>
+              <a:rPr lang="en-US" dirty="0"/>
+              <a:t>Courier Service</a:t>
+            </a:r>
+          </a:p>
+        </p:txBody>
+      </p:sp>
+      <p:sp>
+        <p:nvSpPr>
+          <p:cNvPr id="17" name="Cylinder 16">
+            <a:extLst>
+              <a:ext uri="{FF2B5EF4-FFF2-40B4-BE49-F238E27FC236}">
+                <a16:creationId xmlns:a16="http://schemas.microsoft.com/office/drawing/2014/main" id="{920F3F06-CBA2-4CA5-9B24-C662382A45A5}"/>
+              </a:ext>
+            </a:extLst>
+          </p:cNvPr>
+          <p:cNvSpPr/>
+          <p:nvPr/>
+        </p:nvSpPr>
+        <p:spPr>
+          <a:xfrm>
+            <a:off x="7017064" y="4258385"/>
+            <a:ext cx="298579" cy="342354"/>
+          </a:xfrm>
+          <a:prstGeom prst="can">
+            <a:avLst/>
+          </a:prstGeom>
+          <a:solidFill>
+            <a:schemeClr val="accent2">
+              <a:lumMod val="75000"/>
+            </a:schemeClr>
+          </a:solidFill>
+        </p:spPr>
+        <p:style>
+          <a:lnRef idx="2">
+            <a:schemeClr val="accent1">
+              <a:shade val="50000"/>
+            </a:schemeClr>
+          </a:lnRef>
+          <a:fillRef idx="1">
+            <a:schemeClr val="accent1"/>
+          </a:fillRef>
+          <a:effectRef idx="0">
+            <a:schemeClr val="accent1"/>
+          </a:effectRef>
+          <a:fontRef idx="minor">
+            <a:schemeClr val="lt1"/>
+          </a:fontRef>
+        </p:style>
+        <p:txBody>
+          <a:bodyPr rtlCol="0" anchor="ctr"/>
+          <a:lstStyle/>
+          <a:p>
+            <a:pPr algn="ctr"/>
+            <a:endParaRPr lang="ru-RU"/>
+          </a:p>
+        </p:txBody>
+      </p:sp>
+      <p:sp>
+        <p:nvSpPr>
+          <p:cNvPr id="53" name="Rectangle 52">
+            <a:extLst>
+              <a:ext uri="{FF2B5EF4-FFF2-40B4-BE49-F238E27FC236}">
+                <a16:creationId xmlns:a16="http://schemas.microsoft.com/office/drawing/2014/main" id="{F199647D-419C-4D5D-8350-8FC0878C2A18}"/>
+              </a:ext>
+            </a:extLst>
+          </p:cNvPr>
+          <p:cNvSpPr/>
+          <p:nvPr/>
+        </p:nvSpPr>
+        <p:spPr>
+          <a:xfrm>
+            <a:off x="6133697" y="5013351"/>
+            <a:ext cx="1048624" cy="557147"/>
+          </a:xfrm>
+          <a:prstGeom prst="rect">
+            <a:avLst/>
+          </a:prstGeom>
+        </p:spPr>
+        <p:style>
+          <a:lnRef idx="2">
+            <a:schemeClr val="accent1">
+              <a:shade val="50000"/>
+            </a:schemeClr>
+          </a:lnRef>
+          <a:fillRef idx="1">
+            <a:schemeClr val="accent1"/>
+          </a:fillRef>
+          <a:effectRef idx="0">
+            <a:schemeClr val="accent1"/>
+          </a:effectRef>
+          <a:fontRef idx="minor">
+            <a:schemeClr val="lt1"/>
+          </a:fontRef>
+        </p:style>
+        <p:txBody>
+          <a:bodyPr rtlCol="0" anchor="ctr"/>
+          <a:lstStyle/>
+          <a:p>
+            <a:pPr algn="ctr"/>
+            <a:r>
+              <a:rPr lang="en-US" dirty="0"/>
+              <a:t>Client Service</a:t>
+            </a:r>
+          </a:p>
+        </p:txBody>
+      </p:sp>
+      <p:sp>
+        <p:nvSpPr>
+          <p:cNvPr id="55" name="Rectangle 54">
+            <a:extLst>
+              <a:ext uri="{FF2B5EF4-FFF2-40B4-BE49-F238E27FC236}">
+                <a16:creationId xmlns:a16="http://schemas.microsoft.com/office/drawing/2014/main" id="{51C55A44-02B5-444D-B48A-5FD268FEE5EA}"/>
+              </a:ext>
+            </a:extLst>
+          </p:cNvPr>
+          <p:cNvSpPr/>
+          <p:nvPr/>
+        </p:nvSpPr>
+        <p:spPr>
+          <a:xfrm>
+            <a:off x="6185696" y="5067945"/>
+            <a:ext cx="1048624" cy="557147"/>
+          </a:xfrm>
+          <a:prstGeom prst="rect">
+            <a:avLst/>
+          </a:prstGeom>
+        </p:spPr>
+        <p:style>
+          <a:lnRef idx="2">
+            <a:schemeClr val="accent1">
+              <a:shade val="50000"/>
+            </a:schemeClr>
+          </a:lnRef>
+          <a:fillRef idx="1">
+            <a:schemeClr val="accent1"/>
+          </a:fillRef>
+          <a:effectRef idx="0">
+            <a:schemeClr val="accent1"/>
+          </a:effectRef>
+          <a:fontRef idx="minor">
+            <a:schemeClr val="lt1"/>
+          </a:fontRef>
+        </p:style>
+        <p:txBody>
+          <a:bodyPr rtlCol="0" anchor="ctr"/>
+          <a:lstStyle/>
+          <a:p>
+            <a:pPr algn="ctr"/>
+            <a:r>
+              <a:rPr lang="en-US" dirty="0"/>
+              <a:t>Client Service</a:t>
+            </a:r>
+          </a:p>
+        </p:txBody>
+      </p:sp>
+      <p:sp>
+        <p:nvSpPr>
+          <p:cNvPr id="18" name="Cylinder 17">
+            <a:extLst>
+              <a:ext uri="{FF2B5EF4-FFF2-40B4-BE49-F238E27FC236}">
+                <a16:creationId xmlns:a16="http://schemas.microsoft.com/office/drawing/2014/main" id="{C4C76896-2F99-4F5B-B4F2-B0ACCEAC8A5C}"/>
+              </a:ext>
+            </a:extLst>
+          </p:cNvPr>
+          <p:cNvSpPr/>
+          <p:nvPr/>
+        </p:nvSpPr>
+        <p:spPr>
+          <a:xfrm>
+            <a:off x="7059106" y="5369161"/>
+            <a:ext cx="298579" cy="342354"/>
+          </a:xfrm>
+          <a:prstGeom prst="can">
+            <a:avLst/>
+          </a:prstGeom>
+          <a:solidFill>
+            <a:schemeClr val="accent2">
+              <a:lumMod val="75000"/>
+            </a:schemeClr>
+          </a:solidFill>
+        </p:spPr>
+        <p:style>
+          <a:lnRef idx="2">
+            <a:schemeClr val="accent1">
+              <a:shade val="50000"/>
+            </a:schemeClr>
+          </a:lnRef>
+          <a:fillRef idx="1">
+            <a:schemeClr val="accent1"/>
+          </a:fillRef>
+          <a:effectRef idx="0">
+            <a:schemeClr val="accent1"/>
+          </a:effectRef>
+          <a:fontRef idx="minor">
+            <a:schemeClr val="lt1"/>
+          </a:fontRef>
+        </p:style>
+        <p:txBody>
+          <a:bodyPr rtlCol="0" anchor="ctr"/>
+          <a:lstStyle/>
+          <a:p>
+            <a:pPr algn="ctr"/>
+            <a:endParaRPr lang="ru-RU"/>
+          </a:p>
+        </p:txBody>
+      </p:sp>
+      <p:sp>
+        <p:nvSpPr>
+          <p:cNvPr id="57" name="Rectangle 56">
+            <a:extLst>
+              <a:ext uri="{FF2B5EF4-FFF2-40B4-BE49-F238E27FC236}">
+                <a16:creationId xmlns:a16="http://schemas.microsoft.com/office/drawing/2014/main" id="{81E173F6-367E-4E5B-9A37-E6B7E9817986}"/>
+              </a:ext>
+            </a:extLst>
+          </p:cNvPr>
+          <p:cNvSpPr/>
+          <p:nvPr/>
+        </p:nvSpPr>
+        <p:spPr>
+          <a:xfrm>
+            <a:off x="4099177" y="1447616"/>
+            <a:ext cx="430235" cy="4437776"/>
+          </a:xfrm>
+          <a:prstGeom prst="rect">
+            <a:avLst/>
+          </a:prstGeom>
+        </p:spPr>
+        <p:style>
+          <a:lnRef idx="2">
+            <a:schemeClr val="accent1">
+              <a:shade val="50000"/>
+            </a:schemeClr>
+          </a:lnRef>
+          <a:fillRef idx="1">
+            <a:schemeClr val="accent1"/>
+          </a:fillRef>
+          <a:effectRef idx="0">
+            <a:schemeClr val="accent1"/>
+          </a:effectRef>
+          <a:fontRef idx="minor">
+            <a:schemeClr val="lt1"/>
+          </a:fontRef>
+        </p:style>
+        <p:txBody>
+          <a:bodyPr vert="vert270" rtlCol="0" anchor="ctr"/>
+          <a:lstStyle/>
+          <a:p>
+            <a:pPr algn="ctr"/>
+            <a:r>
+              <a:rPr lang="en-US" dirty="0"/>
+              <a:t>Load Balancer </a:t>
+            </a:r>
+          </a:p>
+        </p:txBody>
+      </p:sp>
+      <p:cxnSp>
+        <p:nvCxnSpPr>
+          <p:cNvPr id="9" name="Straight Arrow Connector 8">
+            <a:extLst>
+              <a:ext uri="{FF2B5EF4-FFF2-40B4-BE49-F238E27FC236}">
+                <a16:creationId xmlns:a16="http://schemas.microsoft.com/office/drawing/2014/main" id="{E7D3A265-3DBC-4836-91A3-D12131B02DBB}"/>
+              </a:ext>
+            </a:extLst>
+          </p:cNvPr>
+          <p:cNvCxnSpPr>
+            <a:stCxn id="31" idx="6"/>
+          </p:cNvCxnSpPr>
+          <p:nvPr/>
+        </p:nvCxnSpPr>
+        <p:spPr>
+          <a:xfrm flipV="1">
+            <a:off x="3148409" y="2401019"/>
+            <a:ext cx="950768" cy="1"/>
+          </a:xfrm>
+          <a:prstGeom prst="straightConnector1">
+            <a:avLst/>
+          </a:prstGeom>
+          <a:ln>
+            <a:headEnd type="triangle"/>
+            <a:tailEnd type="triangle"/>
+          </a:ln>
+        </p:spPr>
+        <p:style>
+          <a:lnRef idx="1">
+            <a:schemeClr val="accent1"/>
+          </a:lnRef>
+          <a:fillRef idx="0">
+            <a:schemeClr val="accent1"/>
+          </a:fillRef>
+          <a:effectRef idx="0">
+            <a:schemeClr val="accent1"/>
+          </a:effectRef>
+          <a:fontRef idx="minor">
+            <a:schemeClr val="tx1"/>
+          </a:fontRef>
+        </p:style>
+      </p:cxnSp>
+      <p:cxnSp>
+        <p:nvCxnSpPr>
+          <p:cNvPr id="30" name="Straight Arrow Connector 29">
+            <a:extLst>
+              <a:ext uri="{FF2B5EF4-FFF2-40B4-BE49-F238E27FC236}">
+                <a16:creationId xmlns:a16="http://schemas.microsoft.com/office/drawing/2014/main" id="{B0306F13-C65B-4DA1-A57B-31CE32AD59A1}"/>
+              </a:ext>
+            </a:extLst>
+          </p:cNvPr>
+          <p:cNvCxnSpPr/>
+          <p:nvPr/>
+        </p:nvCxnSpPr>
+        <p:spPr>
+          <a:xfrm flipV="1">
+            <a:off x="3123563" y="3426182"/>
+            <a:ext cx="975614" cy="13980"/>
+          </a:xfrm>
+          <a:prstGeom prst="straightConnector1">
+            <a:avLst/>
+          </a:prstGeom>
+          <a:ln>
+            <a:headEnd type="triangle"/>
+            <a:tailEnd type="triangle"/>
+          </a:ln>
+        </p:spPr>
+        <p:style>
+          <a:lnRef idx="1">
+            <a:schemeClr val="accent1"/>
+          </a:lnRef>
+          <a:fillRef idx="0">
+            <a:schemeClr val="accent1"/>
+          </a:fillRef>
+          <a:effectRef idx="0">
+            <a:schemeClr val="accent1"/>
+          </a:effectRef>
+          <a:fontRef idx="minor">
+            <a:schemeClr val="tx1"/>
+          </a:fontRef>
+        </p:style>
+      </p:cxnSp>
+      <p:cxnSp>
+        <p:nvCxnSpPr>
+          <p:cNvPr id="40" name="Straight Arrow Connector 39">
+            <a:extLst>
+              <a:ext uri="{FF2B5EF4-FFF2-40B4-BE49-F238E27FC236}">
+                <a16:creationId xmlns:a16="http://schemas.microsoft.com/office/drawing/2014/main" id="{34D8CDB2-4205-4CCB-886D-D9C3973AE24F}"/>
+              </a:ext>
+            </a:extLst>
+          </p:cNvPr>
+          <p:cNvCxnSpPr>
+            <a:stCxn id="37" idx="6"/>
+          </p:cNvCxnSpPr>
+          <p:nvPr/>
+        </p:nvCxnSpPr>
+        <p:spPr>
+          <a:xfrm flipV="1">
+            <a:off x="3115623" y="4491343"/>
+            <a:ext cx="983554" cy="1"/>
+          </a:xfrm>
+          <a:prstGeom prst="straightConnector1">
+            <a:avLst/>
+          </a:prstGeom>
+          <a:ln>
+            <a:headEnd type="triangle"/>
+            <a:tailEnd type="triangle"/>
+          </a:ln>
+        </p:spPr>
+        <p:style>
+          <a:lnRef idx="1">
+            <a:schemeClr val="accent1"/>
+          </a:lnRef>
+          <a:fillRef idx="0">
+            <a:schemeClr val="accent1"/>
+          </a:fillRef>
+          <a:effectRef idx="0">
+            <a:schemeClr val="accent1"/>
+          </a:effectRef>
+          <a:fontRef idx="minor">
+            <a:schemeClr val="tx1"/>
+          </a:fontRef>
+        </p:style>
+      </p:cxnSp>
+      <p:sp>
+        <p:nvSpPr>
+          <p:cNvPr id="42" name="Arrow: Left-Right 41">
+            <a:extLst>
+              <a:ext uri="{FF2B5EF4-FFF2-40B4-BE49-F238E27FC236}">
+                <a16:creationId xmlns:a16="http://schemas.microsoft.com/office/drawing/2014/main" id="{846838D6-C5F9-45D8-8A9B-0FF09C3F12BE}"/>
+              </a:ext>
+            </a:extLst>
+          </p:cNvPr>
+          <p:cNvSpPr/>
+          <p:nvPr/>
+        </p:nvSpPr>
+        <p:spPr>
+          <a:xfrm>
+            <a:off x="4537715" y="3315192"/>
+            <a:ext cx="283972" cy="211213"/>
+          </a:xfrm>
+          <a:prstGeom prst="leftRightArrow">
+            <a:avLst/>
+          </a:prstGeom>
+        </p:spPr>
+        <p:style>
+          <a:lnRef idx="2">
+            <a:schemeClr val="accent1">
+              <a:shade val="50000"/>
+            </a:schemeClr>
+          </a:lnRef>
+          <a:fillRef idx="1">
+            <a:schemeClr val="accent1"/>
+          </a:fillRef>
+          <a:effectRef idx="0">
+            <a:schemeClr val="accent1"/>
+          </a:effectRef>
+          <a:fontRef idx="minor">
+            <a:schemeClr val="lt1"/>
+          </a:fontRef>
+        </p:style>
+        <p:txBody>
+          <a:bodyPr rtlCol="0" anchor="ctr"/>
+          <a:lstStyle/>
+          <a:p>
+            <a:pPr algn="ctr"/>
+            <a:endParaRPr lang="ru-RU"/>
+          </a:p>
+        </p:txBody>
+      </p:sp>
       <p:grpSp>
         <p:nvGrpSpPr>
-          <p:cNvPr id="39" name="Group 38">
-            <a:extLst>
-              <a:ext uri="{FF2B5EF4-FFF2-40B4-BE49-F238E27FC236}">
-                <a16:creationId xmlns:a16="http://schemas.microsoft.com/office/drawing/2014/main" id="{36FA3D66-196C-4EA2-A6E9-81097D336D74}"/>
+          <p:cNvPr id="59" name="Group 58">
+            <a:extLst>
+              <a:ext uri="{FF2B5EF4-FFF2-40B4-BE49-F238E27FC236}">
+                <a16:creationId xmlns:a16="http://schemas.microsoft.com/office/drawing/2014/main" id="{10177356-275F-4FAC-BD70-A6DF5EC0D47E}"/>
               </a:ext>
             </a:extLst>
           </p:cNvPr>
@@ -4260,18 +5556,18 @@
         </p:nvGrpSpPr>
         <p:grpSpPr>
           <a:xfrm>
-            <a:off x="2720613" y="2257172"/>
-            <a:ext cx="543739" cy="531592"/>
-            <a:chOff x="1224836" y="2672895"/>
-            <a:chExt cx="543739" cy="531592"/>
+            <a:off x="4843993" y="1447616"/>
+            <a:ext cx="533229" cy="4533830"/>
+            <a:chOff x="4969293" y="1486671"/>
+            <a:chExt cx="533229" cy="4533830"/>
           </a:xfrm>
         </p:grpSpPr>
         <p:sp>
           <p:nvSpPr>
-            <p:cNvPr id="31" name="Smiley Face 30">
+            <p:cNvPr id="4" name="Rectangle 3">
               <a:extLst>
                 <a:ext uri="{FF2B5EF4-FFF2-40B4-BE49-F238E27FC236}">
-                  <a16:creationId xmlns:a16="http://schemas.microsoft.com/office/drawing/2014/main" id="{9AB33322-F2A5-4D30-BA30-C2230184A64D}"/>
+                  <a16:creationId xmlns:a16="http://schemas.microsoft.com/office/drawing/2014/main" id="{2414CB02-95C6-44AA-9AED-06C0A6E570B1}"/>
                 </a:ext>
               </a:extLst>
             </p:cNvPr>
@@ -4280,15 +5576,12 @@
           </p:nvSpPr>
           <p:spPr>
             <a:xfrm>
-              <a:off x="1359018" y="2672895"/>
-              <a:ext cx="293614" cy="287695"/>
+              <a:off x="4969293" y="1486671"/>
+              <a:ext cx="430235" cy="4437776"/>
             </a:xfrm>
-            <a:prstGeom prst="smileyFace">
+            <a:prstGeom prst="rect">
               <a:avLst/>
             </a:prstGeom>
-            <a:solidFill>
-              <a:srgbClr val="FFFF00"/>
-            </a:solidFill>
           </p:spPr>
           <p:style>
             <a:lnRef idx="2">
@@ -4307,77 +5600,23 @@
             </a:fontRef>
           </p:style>
           <p:txBody>
-            <a:bodyPr rtlCol="0" anchor="ctr"/>
+            <a:bodyPr vert="vert270" rtlCol="0" anchor="ctr"/>
             <a:lstStyle/>
             <a:p>
               <a:pPr algn="ctr"/>
-              <a:endParaRPr lang="ru-RU" dirty="0"/>
+              <a:r>
+                <a:rPr lang="en-US" dirty="0"/>
+                <a:t>Public API, Auth service</a:t>
+              </a:r>
             </a:p>
           </p:txBody>
         </p:sp>
         <p:sp>
           <p:nvSpPr>
-            <p:cNvPr id="33" name="TextBox 32">
+            <p:cNvPr id="61" name="Rectangle 60">
               <a:extLst>
                 <a:ext uri="{FF2B5EF4-FFF2-40B4-BE49-F238E27FC236}">
-                  <a16:creationId xmlns:a16="http://schemas.microsoft.com/office/drawing/2014/main" id="{61575CCB-F257-4AFF-BFD2-C5402BD1CE86}"/>
-                </a:ext>
-              </a:extLst>
-            </p:cNvPr>
-            <p:cNvSpPr txBox="1"/>
-            <p:nvPr/>
-          </p:nvSpPr>
-          <p:spPr>
-            <a:xfrm>
-              <a:off x="1224836" y="2942877"/>
-              <a:ext cx="543739" cy="261610"/>
-            </a:xfrm>
-            <a:prstGeom prst="rect">
-              <a:avLst/>
-            </a:prstGeom>
-            <a:noFill/>
-          </p:spPr>
-          <p:txBody>
-            <a:bodyPr wrap="none" rtlCol="0">
-              <a:spAutoFit/>
-            </a:bodyPr>
-            <a:lstStyle/>
-            <a:p>
-              <a:r>
-                <a:rPr lang="en-US" sz="1100" dirty="0"/>
-                <a:t>admin</a:t>
-              </a:r>
-              <a:endParaRPr lang="ru-RU" sz="1100" dirty="0"/>
-            </a:p>
-          </p:txBody>
-        </p:sp>
-      </p:grpSp>
-      <p:grpSp>
-        <p:nvGrpSpPr>
-          <p:cNvPr id="35" name="Group 34">
-            <a:extLst>
-              <a:ext uri="{FF2B5EF4-FFF2-40B4-BE49-F238E27FC236}">
-                <a16:creationId xmlns:a16="http://schemas.microsoft.com/office/drawing/2014/main" id="{3FA2F11C-4917-441D-BD02-E4580E6B1C0D}"/>
-              </a:ext>
-            </a:extLst>
-          </p:cNvPr>
-          <p:cNvGrpSpPr/>
-          <p:nvPr/>
-        </p:nvGrpSpPr>
-        <p:grpSpPr>
-          <a:xfrm>
-            <a:off x="2670920" y="3296315"/>
-            <a:ext cx="593432" cy="506485"/>
-            <a:chOff x="1199989" y="3411850"/>
-            <a:chExt cx="593432" cy="506485"/>
-          </a:xfrm>
-        </p:grpSpPr>
-        <p:sp>
-          <p:nvSpPr>
-            <p:cNvPr id="29" name="Smiley Face 28">
-              <a:extLst>
-                <a:ext uri="{FF2B5EF4-FFF2-40B4-BE49-F238E27FC236}">
-                  <a16:creationId xmlns:a16="http://schemas.microsoft.com/office/drawing/2014/main" id="{E5E3BD20-A4B3-462D-A3A5-88B57B1F6B6A}"/>
+                  <a16:creationId xmlns:a16="http://schemas.microsoft.com/office/drawing/2014/main" id="{2DB66F5E-A14E-4231-9DD4-5DFBB31ED52D}"/>
                 </a:ext>
               </a:extLst>
             </p:cNvPr>
@@ -4386,15 +5625,12 @@
           </p:nvSpPr>
           <p:spPr>
             <a:xfrm>
-              <a:off x="1359018" y="3411850"/>
-              <a:ext cx="293614" cy="287695"/>
+              <a:off x="5013710" y="1534698"/>
+              <a:ext cx="430235" cy="4437776"/>
             </a:xfrm>
-            <a:prstGeom prst="smileyFace">
+            <a:prstGeom prst="rect">
               <a:avLst/>
             </a:prstGeom>
-            <a:solidFill>
-              <a:srgbClr val="FFFF00"/>
-            </a:solidFill>
           </p:spPr>
           <p:style>
             <a:lnRef idx="2">
@@ -4413,77 +5649,23 @@
             </a:fontRef>
           </p:style>
           <p:txBody>
-            <a:bodyPr rtlCol="0" anchor="ctr"/>
+            <a:bodyPr vert="vert270" rtlCol="0" anchor="ctr"/>
             <a:lstStyle/>
             <a:p>
               <a:pPr algn="ctr"/>
-              <a:endParaRPr lang="ru-RU" dirty="0"/>
+              <a:r>
+                <a:rPr lang="en-US" dirty="0"/>
+                <a:t>Public API, Auth service</a:t>
+              </a:r>
             </a:p>
           </p:txBody>
         </p:sp>
         <p:sp>
           <p:nvSpPr>
-            <p:cNvPr id="34" name="TextBox 33">
+            <p:cNvPr id="62" name="Rectangle 61">
               <a:extLst>
                 <a:ext uri="{FF2B5EF4-FFF2-40B4-BE49-F238E27FC236}">
-                  <a16:creationId xmlns:a16="http://schemas.microsoft.com/office/drawing/2014/main" id="{D5F420B2-0E81-4510-BC94-7FA214C19169}"/>
-                </a:ext>
-              </a:extLst>
-            </p:cNvPr>
-            <p:cNvSpPr txBox="1"/>
-            <p:nvPr/>
-          </p:nvSpPr>
-          <p:spPr>
-            <a:xfrm>
-              <a:off x="1199989" y="3656725"/>
-              <a:ext cx="593432" cy="261610"/>
-            </a:xfrm>
-            <a:prstGeom prst="rect">
-              <a:avLst/>
-            </a:prstGeom>
-            <a:noFill/>
-          </p:spPr>
-          <p:txBody>
-            <a:bodyPr wrap="none" rtlCol="0">
-              <a:spAutoFit/>
-            </a:bodyPr>
-            <a:lstStyle/>
-            <a:p>
-              <a:r>
-                <a:rPr lang="en-US" sz="1100" dirty="0"/>
-                <a:t>courier</a:t>
-              </a:r>
-              <a:endParaRPr lang="ru-RU" sz="1100" dirty="0"/>
-            </a:p>
-          </p:txBody>
-        </p:sp>
-      </p:grpSp>
-      <p:grpSp>
-        <p:nvGrpSpPr>
-          <p:cNvPr id="36" name="Group 35">
-            <a:extLst>
-              <a:ext uri="{FF2B5EF4-FFF2-40B4-BE49-F238E27FC236}">
-                <a16:creationId xmlns:a16="http://schemas.microsoft.com/office/drawing/2014/main" id="{208EAC00-F930-44D6-A637-BF7F6EFA4A3C}"/>
-              </a:ext>
-            </a:extLst>
-          </p:cNvPr>
-          <p:cNvGrpSpPr/>
-          <p:nvPr/>
-        </p:nvGrpSpPr>
-        <p:grpSpPr>
-          <a:xfrm>
-            <a:off x="2662980" y="4347496"/>
-            <a:ext cx="530915" cy="506485"/>
-            <a:chOff x="1199989" y="3411850"/>
-            <a:chExt cx="530915" cy="506485"/>
-          </a:xfrm>
-        </p:grpSpPr>
-        <p:sp>
-          <p:nvSpPr>
-            <p:cNvPr id="37" name="Smiley Face 36">
-              <a:extLst>
-                <a:ext uri="{FF2B5EF4-FFF2-40B4-BE49-F238E27FC236}">
-                  <a16:creationId xmlns:a16="http://schemas.microsoft.com/office/drawing/2014/main" id="{29DF5B8A-FA15-444C-A868-581205AA5242}"/>
+                  <a16:creationId xmlns:a16="http://schemas.microsoft.com/office/drawing/2014/main" id="{A4EE9D8D-F4E4-4376-B5EA-0077F7BF4BB8}"/>
                 </a:ext>
               </a:extLst>
             </p:cNvPr>
@@ -4492,15 +5674,12 @@
           </p:nvSpPr>
           <p:spPr>
             <a:xfrm>
-              <a:off x="1359018" y="3411850"/>
-              <a:ext cx="293614" cy="287695"/>
+              <a:off x="5072287" y="1582725"/>
+              <a:ext cx="430235" cy="4437776"/>
             </a:xfrm>
-            <a:prstGeom prst="smileyFace">
+            <a:prstGeom prst="rect">
               <a:avLst/>
             </a:prstGeom>
-            <a:solidFill>
-              <a:srgbClr val="FFFF00"/>
-            </a:solidFill>
           </p:spPr>
           <p:style>
             <a:lnRef idx="2">
@@ -4519,1048 +5698,18 @@
             </a:fontRef>
           </p:style>
           <p:txBody>
-            <a:bodyPr rtlCol="0" anchor="ctr"/>
+            <a:bodyPr vert="vert270" rtlCol="0" anchor="ctr"/>
             <a:lstStyle/>
             <a:p>
               <a:pPr algn="ctr"/>
-              <a:endParaRPr lang="ru-RU" dirty="0"/>
-            </a:p>
-          </p:txBody>
-        </p:sp>
-        <p:sp>
-          <p:nvSpPr>
-            <p:cNvPr id="38" name="TextBox 37">
-              <a:extLst>
-                <a:ext uri="{FF2B5EF4-FFF2-40B4-BE49-F238E27FC236}">
-                  <a16:creationId xmlns:a16="http://schemas.microsoft.com/office/drawing/2014/main" id="{F3BA2DC2-F3DD-419F-ABE3-85DB2691E8B0}"/>
-                </a:ext>
-              </a:extLst>
-            </p:cNvPr>
-            <p:cNvSpPr txBox="1"/>
-            <p:nvPr/>
-          </p:nvSpPr>
-          <p:spPr>
-            <a:xfrm>
-              <a:off x="1199989" y="3656725"/>
-              <a:ext cx="530915" cy="261610"/>
-            </a:xfrm>
-            <a:prstGeom prst="rect">
-              <a:avLst/>
-            </a:prstGeom>
-            <a:noFill/>
-          </p:spPr>
-          <p:txBody>
-            <a:bodyPr wrap="none" rtlCol="0">
-              <a:spAutoFit/>
-            </a:bodyPr>
-            <a:lstStyle/>
-            <a:p>
               <a:r>
-                <a:rPr lang="en-US" sz="1100" dirty="0"/>
-                <a:t> client</a:t>
+                <a:rPr lang="en-US" dirty="0"/>
+                <a:t>Public API, Auth service</a:t>
               </a:r>
-              <a:endParaRPr lang="ru-RU" sz="1100" dirty="0"/>
             </a:p>
           </p:txBody>
         </p:sp>
       </p:grpSp>
-      <p:cxnSp>
-        <p:nvCxnSpPr>
-          <p:cNvPr id="41" name="Straight Arrow Connector 40">
-            <a:extLst>
-              <a:ext uri="{FF2B5EF4-FFF2-40B4-BE49-F238E27FC236}">
-                <a16:creationId xmlns:a16="http://schemas.microsoft.com/office/drawing/2014/main" id="{E9D3D9C3-780E-443D-8D1E-E1D40B39FF5D}"/>
-              </a:ext>
-            </a:extLst>
-          </p:cNvPr>
-          <p:cNvCxnSpPr>
-            <a:stCxn id="31" idx="6"/>
-          </p:cNvCxnSpPr>
-          <p:nvPr/>
-        </p:nvCxnSpPr>
-        <p:spPr>
-          <a:xfrm flipV="1">
-            <a:off x="3148409" y="2401019"/>
-            <a:ext cx="1820884" cy="1"/>
-          </a:xfrm>
-          <a:prstGeom prst="straightConnector1">
-            <a:avLst/>
-          </a:prstGeom>
-          <a:ln>
-            <a:headEnd type="triangle"/>
-            <a:tailEnd type="triangle"/>
-          </a:ln>
-        </p:spPr>
-        <p:style>
-          <a:lnRef idx="1">
-            <a:schemeClr val="accent1"/>
-          </a:lnRef>
-          <a:fillRef idx="0">
-            <a:schemeClr val="accent1"/>
-          </a:fillRef>
-          <a:effectRef idx="0">
-            <a:schemeClr val="accent1"/>
-          </a:effectRef>
-          <a:fontRef idx="minor">
-            <a:schemeClr val="tx1"/>
-          </a:fontRef>
-        </p:style>
-      </p:cxnSp>
-      <p:cxnSp>
-        <p:nvCxnSpPr>
-          <p:cNvPr id="43" name="Straight Arrow Connector 42">
-            <a:extLst>
-              <a:ext uri="{FF2B5EF4-FFF2-40B4-BE49-F238E27FC236}">
-                <a16:creationId xmlns:a16="http://schemas.microsoft.com/office/drawing/2014/main" id="{6D9106F4-8E59-48FD-AFFD-0512E5ACAF9B}"/>
-              </a:ext>
-            </a:extLst>
-          </p:cNvPr>
-          <p:cNvCxnSpPr>
-            <a:stCxn id="29" idx="6"/>
-          </p:cNvCxnSpPr>
-          <p:nvPr/>
-        </p:nvCxnSpPr>
-        <p:spPr>
-          <a:xfrm flipV="1">
-            <a:off x="3123563" y="3440162"/>
-            <a:ext cx="1845730" cy="1"/>
-          </a:xfrm>
-          <a:prstGeom prst="straightConnector1">
-            <a:avLst/>
-          </a:prstGeom>
-          <a:ln>
-            <a:headEnd type="triangle"/>
-            <a:tailEnd type="triangle"/>
-          </a:ln>
-        </p:spPr>
-        <p:style>
-          <a:lnRef idx="1">
-            <a:schemeClr val="accent1"/>
-          </a:lnRef>
-          <a:fillRef idx="0">
-            <a:schemeClr val="accent1"/>
-          </a:fillRef>
-          <a:effectRef idx="0">
-            <a:schemeClr val="accent1"/>
-          </a:effectRef>
-          <a:fontRef idx="minor">
-            <a:schemeClr val="tx1"/>
-          </a:fontRef>
-        </p:style>
-      </p:cxnSp>
-      <p:cxnSp>
-        <p:nvCxnSpPr>
-          <p:cNvPr id="45" name="Straight Arrow Connector 44">
-            <a:extLst>
-              <a:ext uri="{FF2B5EF4-FFF2-40B4-BE49-F238E27FC236}">
-                <a16:creationId xmlns:a16="http://schemas.microsoft.com/office/drawing/2014/main" id="{DC3D9B29-A5DA-49D6-80A2-486AB1507B97}"/>
-              </a:ext>
-            </a:extLst>
-          </p:cNvPr>
-          <p:cNvCxnSpPr>
-            <a:stCxn id="37" idx="6"/>
-          </p:cNvCxnSpPr>
-          <p:nvPr/>
-        </p:nvCxnSpPr>
-        <p:spPr>
-          <a:xfrm flipV="1">
-            <a:off x="3115623" y="4491343"/>
-            <a:ext cx="1853670" cy="1"/>
-          </a:xfrm>
-          <a:prstGeom prst="straightConnector1">
-            <a:avLst/>
-          </a:prstGeom>
-          <a:ln>
-            <a:headEnd type="triangle"/>
-            <a:tailEnd type="triangle"/>
-          </a:ln>
-        </p:spPr>
-        <p:style>
-          <a:lnRef idx="1">
-            <a:schemeClr val="accent1"/>
-          </a:lnRef>
-          <a:fillRef idx="0">
-            <a:schemeClr val="accent1"/>
-          </a:fillRef>
-          <a:effectRef idx="0">
-            <a:schemeClr val="accent1"/>
-          </a:effectRef>
-          <a:fontRef idx="minor">
-            <a:schemeClr val="tx1"/>
-          </a:fontRef>
-        </p:style>
-      </p:cxnSp>
-      <p:sp>
-        <p:nvSpPr>
-          <p:cNvPr id="46" name="Rectangle 45">
-            <a:extLst>
-              <a:ext uri="{FF2B5EF4-FFF2-40B4-BE49-F238E27FC236}">
-                <a16:creationId xmlns:a16="http://schemas.microsoft.com/office/drawing/2014/main" id="{3ACE2B74-390E-4A84-A326-BD2A4B34316E}"/>
-              </a:ext>
-            </a:extLst>
-          </p:cNvPr>
-          <p:cNvSpPr/>
-          <p:nvPr/>
-        </p:nvSpPr>
-        <p:spPr>
-          <a:xfrm>
-            <a:off x="5651291" y="5784184"/>
-            <a:ext cx="1114009" cy="342354"/>
-          </a:xfrm>
-          <a:prstGeom prst="rect">
-            <a:avLst/>
-          </a:prstGeom>
-          <a:solidFill>
-            <a:schemeClr val="accent1">
-              <a:lumMod val="20000"/>
-              <a:lumOff val="80000"/>
-            </a:schemeClr>
-          </a:solidFill>
-          <a:ln>
-            <a:prstDash val="dashDot"/>
-          </a:ln>
-        </p:spPr>
-        <p:style>
-          <a:lnRef idx="2">
-            <a:schemeClr val="accent1">
-              <a:shade val="50000"/>
-            </a:schemeClr>
-          </a:lnRef>
-          <a:fillRef idx="1">
-            <a:schemeClr val="accent1"/>
-          </a:fillRef>
-          <a:effectRef idx="0">
-            <a:schemeClr val="accent1"/>
-          </a:effectRef>
-          <a:fontRef idx="minor">
-            <a:schemeClr val="lt1"/>
-          </a:fontRef>
-        </p:style>
-        <p:txBody>
-          <a:bodyPr rtlCol="0" anchor="ctr"/>
-          <a:lstStyle/>
-          <a:p>
-            <a:pPr algn="ctr"/>
-            <a:r>
-              <a:rPr lang="en-US" sz="1000" dirty="0">
-                <a:solidFill>
-                  <a:schemeClr val="bg2">
-                    <a:lumMod val="25000"/>
-                  </a:schemeClr>
-                </a:solidFill>
-              </a:rPr>
-              <a:t>Optional Discovery service</a:t>
-            </a:r>
-            <a:endParaRPr lang="ru-RU" sz="1000" dirty="0">
-              <a:solidFill>
-                <a:schemeClr val="bg2">
-                  <a:lumMod val="25000"/>
-                </a:schemeClr>
-              </a:solidFill>
-            </a:endParaRPr>
-          </a:p>
-        </p:txBody>
-      </p:sp>
-      <p:cxnSp>
-        <p:nvCxnSpPr>
-          <p:cNvPr id="48" name="Straight Arrow Connector 47">
-            <a:extLst>
-              <a:ext uri="{FF2B5EF4-FFF2-40B4-BE49-F238E27FC236}">
-                <a16:creationId xmlns:a16="http://schemas.microsoft.com/office/drawing/2014/main" id="{1CF97E27-58A6-4341-BDB2-F385AC1D5638}"/>
-              </a:ext>
-            </a:extLst>
-          </p:cNvPr>
-          <p:cNvCxnSpPr/>
-          <p:nvPr/>
-        </p:nvCxnSpPr>
-        <p:spPr>
-          <a:xfrm>
-            <a:off x="5793162" y="2182679"/>
-            <a:ext cx="0" cy="3584457"/>
-          </a:xfrm>
-          <a:prstGeom prst="straightConnector1">
-            <a:avLst/>
-          </a:prstGeom>
-          <a:ln>
-            <a:prstDash val="lgDashDot"/>
-            <a:tailEnd type="triangle"/>
-          </a:ln>
-        </p:spPr>
-        <p:style>
-          <a:lnRef idx="1">
-            <a:schemeClr val="accent1"/>
-          </a:lnRef>
-          <a:fillRef idx="0">
-            <a:schemeClr val="accent1"/>
-          </a:fillRef>
-          <a:effectRef idx="0">
-            <a:schemeClr val="accent1"/>
-          </a:effectRef>
-          <a:fontRef idx="minor">
-            <a:schemeClr val="tx1"/>
-          </a:fontRef>
-        </p:style>
-      </p:cxnSp>
-      <p:cxnSp>
-        <p:nvCxnSpPr>
-          <p:cNvPr id="54" name="Straight Arrow Connector 53">
-            <a:extLst>
-              <a:ext uri="{FF2B5EF4-FFF2-40B4-BE49-F238E27FC236}">
-                <a16:creationId xmlns:a16="http://schemas.microsoft.com/office/drawing/2014/main" id="{7E1C8BD6-990C-4312-9C5E-99A8F768C28C}"/>
-              </a:ext>
-            </a:extLst>
-          </p:cNvPr>
-          <p:cNvCxnSpPr/>
-          <p:nvPr/>
-        </p:nvCxnSpPr>
-        <p:spPr>
-          <a:xfrm>
-            <a:off x="5793162" y="2182679"/>
-            <a:ext cx="279581" cy="0"/>
-          </a:xfrm>
-          <a:prstGeom prst="straightConnector1">
-            <a:avLst/>
-          </a:prstGeom>
-          <a:ln>
-            <a:prstDash val="dash"/>
-            <a:headEnd type="triangle"/>
-            <a:tailEnd type="triangle"/>
-          </a:ln>
-        </p:spPr>
-        <p:style>
-          <a:lnRef idx="1">
-            <a:schemeClr val="accent1"/>
-          </a:lnRef>
-          <a:fillRef idx="0">
-            <a:schemeClr val="accent1"/>
-          </a:fillRef>
-          <a:effectRef idx="0">
-            <a:schemeClr val="accent1"/>
-          </a:effectRef>
-          <a:fontRef idx="minor">
-            <a:schemeClr val="tx1"/>
-          </a:fontRef>
-        </p:style>
-      </p:cxnSp>
-      <p:cxnSp>
-        <p:nvCxnSpPr>
-          <p:cNvPr id="56" name="Straight Arrow Connector 55">
-            <a:extLst>
-              <a:ext uri="{FF2B5EF4-FFF2-40B4-BE49-F238E27FC236}">
-                <a16:creationId xmlns:a16="http://schemas.microsoft.com/office/drawing/2014/main" id="{AB5BF6EE-6ABA-4899-BA96-5E205E6C0409}"/>
-              </a:ext>
-            </a:extLst>
-          </p:cNvPr>
-          <p:cNvCxnSpPr/>
-          <p:nvPr/>
-        </p:nvCxnSpPr>
-        <p:spPr>
-          <a:xfrm>
-            <a:off x="5793162" y="3223985"/>
-            <a:ext cx="272013" cy="0"/>
-          </a:xfrm>
-          <a:prstGeom prst="straightConnector1">
-            <a:avLst/>
-          </a:prstGeom>
-          <a:ln>
-            <a:prstDash val="dash"/>
-            <a:headEnd type="triangle"/>
-            <a:tailEnd type="triangle"/>
-          </a:ln>
-        </p:spPr>
-        <p:style>
-          <a:lnRef idx="1">
-            <a:schemeClr val="accent1"/>
-          </a:lnRef>
-          <a:fillRef idx="0">
-            <a:schemeClr val="accent1"/>
-          </a:fillRef>
-          <a:effectRef idx="0">
-            <a:schemeClr val="accent1"/>
-          </a:effectRef>
-          <a:fontRef idx="minor">
-            <a:schemeClr val="tx1"/>
-          </a:fontRef>
-        </p:style>
-      </p:cxnSp>
-      <p:cxnSp>
-        <p:nvCxnSpPr>
-          <p:cNvPr id="58" name="Straight Arrow Connector 57">
-            <a:extLst>
-              <a:ext uri="{FF2B5EF4-FFF2-40B4-BE49-F238E27FC236}">
-                <a16:creationId xmlns:a16="http://schemas.microsoft.com/office/drawing/2014/main" id="{E29C664D-19AA-45EC-90B3-8E21C8B741E9}"/>
-              </a:ext>
-            </a:extLst>
-          </p:cNvPr>
-          <p:cNvCxnSpPr/>
-          <p:nvPr/>
-        </p:nvCxnSpPr>
-        <p:spPr>
-          <a:xfrm>
-            <a:off x="5793162" y="4347496"/>
-            <a:ext cx="272013" cy="0"/>
-          </a:xfrm>
-          <a:prstGeom prst="straightConnector1">
-            <a:avLst/>
-          </a:prstGeom>
-          <a:ln>
-            <a:prstDash val="dash"/>
-            <a:headEnd type="triangle"/>
-            <a:tailEnd type="triangle"/>
-          </a:ln>
-        </p:spPr>
-        <p:style>
-          <a:lnRef idx="1">
-            <a:schemeClr val="accent1"/>
-          </a:lnRef>
-          <a:fillRef idx="0">
-            <a:schemeClr val="accent1"/>
-          </a:fillRef>
-          <a:effectRef idx="0">
-            <a:schemeClr val="accent1"/>
-          </a:effectRef>
-          <a:fontRef idx="minor">
-            <a:schemeClr val="tx1"/>
-          </a:fontRef>
-        </p:style>
-      </p:cxnSp>
-      <p:cxnSp>
-        <p:nvCxnSpPr>
-          <p:cNvPr id="60" name="Straight Arrow Connector 59">
-            <a:extLst>
-              <a:ext uri="{FF2B5EF4-FFF2-40B4-BE49-F238E27FC236}">
-                <a16:creationId xmlns:a16="http://schemas.microsoft.com/office/drawing/2014/main" id="{F914C248-9CC1-462A-A2B4-15D112B1C5FC}"/>
-              </a:ext>
-            </a:extLst>
-          </p:cNvPr>
-          <p:cNvCxnSpPr/>
-          <p:nvPr/>
-        </p:nvCxnSpPr>
-        <p:spPr>
-          <a:xfrm>
-            <a:off x="5800730" y="5440403"/>
-            <a:ext cx="272013" cy="0"/>
-          </a:xfrm>
-          <a:prstGeom prst="straightConnector1">
-            <a:avLst/>
-          </a:prstGeom>
-          <a:ln>
-            <a:prstDash val="dash"/>
-            <a:headEnd type="triangle"/>
-            <a:tailEnd type="triangle"/>
-          </a:ln>
-        </p:spPr>
-        <p:style>
-          <a:lnRef idx="1">
-            <a:schemeClr val="accent1"/>
-          </a:lnRef>
-          <a:fillRef idx="0">
-            <a:schemeClr val="accent1"/>
-          </a:fillRef>
-          <a:effectRef idx="0">
-            <a:schemeClr val="accent1"/>
-          </a:effectRef>
-          <a:fontRef idx="minor">
-            <a:schemeClr val="tx1"/>
-          </a:fontRef>
-        </p:style>
-      </p:cxnSp>
-      <p:sp>
-        <p:nvSpPr>
-          <p:cNvPr id="44" name="Rectangle 43">
-            <a:extLst>
-              <a:ext uri="{FF2B5EF4-FFF2-40B4-BE49-F238E27FC236}">
-                <a16:creationId xmlns:a16="http://schemas.microsoft.com/office/drawing/2014/main" id="{309CF89C-C7EF-43A9-86B9-EC3642B3778F}"/>
-              </a:ext>
-            </a:extLst>
-          </p:cNvPr>
-          <p:cNvSpPr/>
-          <p:nvPr/>
-        </p:nvSpPr>
-        <p:spPr>
-          <a:xfrm>
-            <a:off x="6126302" y="1809326"/>
-            <a:ext cx="1048624" cy="557147"/>
-          </a:xfrm>
-          <a:prstGeom prst="rect">
-            <a:avLst/>
-          </a:prstGeom>
-        </p:spPr>
-        <p:style>
-          <a:lnRef idx="2">
-            <a:schemeClr val="accent1">
-              <a:shade val="50000"/>
-            </a:schemeClr>
-          </a:lnRef>
-          <a:fillRef idx="1">
-            <a:schemeClr val="accent1"/>
-          </a:fillRef>
-          <a:effectRef idx="0">
-            <a:schemeClr val="accent1"/>
-          </a:effectRef>
-          <a:fontRef idx="minor">
-            <a:schemeClr val="lt1"/>
-          </a:fontRef>
-        </p:style>
-        <p:txBody>
-          <a:bodyPr rtlCol="0" anchor="ctr"/>
-          <a:lstStyle/>
-          <a:p>
-            <a:pPr algn="ctr"/>
-            <a:r>
-              <a:rPr lang="en-US" dirty="0"/>
-              <a:t>User Service</a:t>
-            </a:r>
-          </a:p>
-        </p:txBody>
-      </p:sp>
-      <p:sp>
-        <p:nvSpPr>
-          <p:cNvPr id="47" name="Rectangle 46">
-            <a:extLst>
-              <a:ext uri="{FF2B5EF4-FFF2-40B4-BE49-F238E27FC236}">
-                <a16:creationId xmlns:a16="http://schemas.microsoft.com/office/drawing/2014/main" id="{29223604-B549-4D27-BA71-5E8449600756}"/>
-              </a:ext>
-            </a:extLst>
-          </p:cNvPr>
-          <p:cNvSpPr/>
-          <p:nvPr/>
-        </p:nvSpPr>
-        <p:spPr>
-          <a:xfrm>
-            <a:off x="6185696" y="1901549"/>
-            <a:ext cx="1048624" cy="557147"/>
-          </a:xfrm>
-          <a:prstGeom prst="rect">
-            <a:avLst/>
-          </a:prstGeom>
-        </p:spPr>
-        <p:style>
-          <a:lnRef idx="2">
-            <a:schemeClr val="accent1">
-              <a:shade val="50000"/>
-            </a:schemeClr>
-          </a:lnRef>
-          <a:fillRef idx="1">
-            <a:schemeClr val="accent1"/>
-          </a:fillRef>
-          <a:effectRef idx="0">
-            <a:schemeClr val="accent1"/>
-          </a:effectRef>
-          <a:fontRef idx="minor">
-            <a:schemeClr val="lt1"/>
-          </a:fontRef>
-        </p:style>
-        <p:txBody>
-          <a:bodyPr rtlCol="0" anchor="ctr"/>
-          <a:lstStyle/>
-          <a:p>
-            <a:pPr algn="ctr"/>
-            <a:r>
-              <a:rPr lang="en-US" dirty="0"/>
-              <a:t>User Service</a:t>
-            </a:r>
-          </a:p>
-        </p:txBody>
-      </p:sp>
-      <p:sp>
-        <p:nvSpPr>
-          <p:cNvPr id="12" name="Cylinder 11">
-            <a:extLst>
-              <a:ext uri="{FF2B5EF4-FFF2-40B4-BE49-F238E27FC236}">
-                <a16:creationId xmlns:a16="http://schemas.microsoft.com/office/drawing/2014/main" id="{FD826414-1850-41E8-8E5F-862D193DFB8F}"/>
-              </a:ext>
-            </a:extLst>
-          </p:cNvPr>
-          <p:cNvSpPr/>
-          <p:nvPr/>
-        </p:nvSpPr>
-        <p:spPr>
-          <a:xfrm>
-            <a:off x="7027549" y="2116714"/>
-            <a:ext cx="298579" cy="342354"/>
-          </a:xfrm>
-          <a:prstGeom prst="can">
-            <a:avLst/>
-          </a:prstGeom>
-          <a:solidFill>
-            <a:schemeClr val="accent2">
-              <a:lumMod val="75000"/>
-            </a:schemeClr>
-          </a:solidFill>
-        </p:spPr>
-        <p:style>
-          <a:lnRef idx="2">
-            <a:schemeClr val="accent1">
-              <a:shade val="50000"/>
-            </a:schemeClr>
-          </a:lnRef>
-          <a:fillRef idx="1">
-            <a:schemeClr val="accent1"/>
-          </a:fillRef>
-          <a:effectRef idx="0">
-            <a:schemeClr val="accent1"/>
-          </a:effectRef>
-          <a:fontRef idx="minor">
-            <a:schemeClr val="lt1"/>
-          </a:fontRef>
-        </p:style>
-        <p:txBody>
-          <a:bodyPr rtlCol="0" anchor="ctr"/>
-          <a:lstStyle/>
-          <a:p>
-            <a:pPr algn="ctr"/>
-            <a:endParaRPr lang="ru-RU"/>
-          </a:p>
-        </p:txBody>
-      </p:sp>
-      <p:sp>
-        <p:nvSpPr>
-          <p:cNvPr id="49" name="Rectangle 48">
-            <a:extLst>
-              <a:ext uri="{FF2B5EF4-FFF2-40B4-BE49-F238E27FC236}">
-                <a16:creationId xmlns:a16="http://schemas.microsoft.com/office/drawing/2014/main" id="{0BC4C11F-DF3A-4D74-A591-B65026140026}"/>
-              </a:ext>
-            </a:extLst>
-          </p:cNvPr>
-          <p:cNvSpPr/>
-          <p:nvPr/>
-        </p:nvSpPr>
-        <p:spPr>
-          <a:xfrm>
-            <a:off x="6117729" y="2818298"/>
-            <a:ext cx="1048624" cy="557147"/>
-          </a:xfrm>
-          <a:prstGeom prst="rect">
-            <a:avLst/>
-          </a:prstGeom>
-        </p:spPr>
-        <p:style>
-          <a:lnRef idx="2">
-            <a:schemeClr val="accent1">
-              <a:shade val="50000"/>
-            </a:schemeClr>
-          </a:lnRef>
-          <a:fillRef idx="1">
-            <a:schemeClr val="accent1"/>
-          </a:fillRef>
-          <a:effectRef idx="0">
-            <a:schemeClr val="accent1"/>
-          </a:effectRef>
-          <a:fontRef idx="minor">
-            <a:schemeClr val="lt1"/>
-          </a:fontRef>
-        </p:style>
-        <p:txBody>
-          <a:bodyPr rtlCol="0" anchor="ctr"/>
-          <a:lstStyle/>
-          <a:p>
-            <a:pPr algn="ctr"/>
-            <a:r>
-              <a:rPr lang="en-US" dirty="0"/>
-              <a:t>Admin Service</a:t>
-            </a:r>
-          </a:p>
-        </p:txBody>
-      </p:sp>
-      <p:sp>
-        <p:nvSpPr>
-          <p:cNvPr id="50" name="Rectangle 49">
-            <a:extLst>
-              <a:ext uri="{FF2B5EF4-FFF2-40B4-BE49-F238E27FC236}">
-                <a16:creationId xmlns:a16="http://schemas.microsoft.com/office/drawing/2014/main" id="{5E67D8FE-2D6A-4B68-A84B-902CBD6A1BBC}"/>
-              </a:ext>
-            </a:extLst>
-          </p:cNvPr>
-          <p:cNvSpPr/>
-          <p:nvPr/>
-        </p:nvSpPr>
-        <p:spPr>
-          <a:xfrm>
-            <a:off x="6159771" y="2869035"/>
-            <a:ext cx="1048624" cy="557147"/>
-          </a:xfrm>
-          <a:prstGeom prst="rect">
-            <a:avLst/>
-          </a:prstGeom>
-        </p:spPr>
-        <p:style>
-          <a:lnRef idx="2">
-            <a:schemeClr val="accent1">
-              <a:shade val="50000"/>
-            </a:schemeClr>
-          </a:lnRef>
-          <a:fillRef idx="1">
-            <a:schemeClr val="accent1"/>
-          </a:fillRef>
-          <a:effectRef idx="0">
-            <a:schemeClr val="accent1"/>
-          </a:effectRef>
-          <a:fontRef idx="minor">
-            <a:schemeClr val="lt1"/>
-          </a:fontRef>
-        </p:style>
-        <p:txBody>
-          <a:bodyPr rtlCol="0" anchor="ctr"/>
-          <a:lstStyle/>
-          <a:p>
-            <a:pPr algn="ctr"/>
-            <a:r>
-              <a:rPr lang="en-US" dirty="0"/>
-              <a:t>Admin Service</a:t>
-            </a:r>
-          </a:p>
-        </p:txBody>
-      </p:sp>
-      <p:sp>
-        <p:nvSpPr>
-          <p:cNvPr id="16" name="Cylinder 15">
-            <a:extLst>
-              <a:ext uri="{FF2B5EF4-FFF2-40B4-BE49-F238E27FC236}">
-                <a16:creationId xmlns:a16="http://schemas.microsoft.com/office/drawing/2014/main" id="{3EB51B1F-23FD-45E0-A6CB-13275B762522}"/>
-              </a:ext>
-            </a:extLst>
-          </p:cNvPr>
-          <p:cNvSpPr/>
-          <p:nvPr/>
-        </p:nvSpPr>
-        <p:spPr>
-          <a:xfrm>
-            <a:off x="7027992" y="3147609"/>
-            <a:ext cx="298579" cy="342354"/>
-          </a:xfrm>
-          <a:prstGeom prst="can">
-            <a:avLst/>
-          </a:prstGeom>
-          <a:solidFill>
-            <a:schemeClr val="accent2">
-              <a:lumMod val="75000"/>
-            </a:schemeClr>
-          </a:solidFill>
-        </p:spPr>
-        <p:style>
-          <a:lnRef idx="2">
-            <a:schemeClr val="accent1">
-              <a:shade val="50000"/>
-            </a:schemeClr>
-          </a:lnRef>
-          <a:fillRef idx="1">
-            <a:schemeClr val="accent1"/>
-          </a:fillRef>
-          <a:effectRef idx="0">
-            <a:schemeClr val="accent1"/>
-          </a:effectRef>
-          <a:fontRef idx="minor">
-            <a:schemeClr val="lt1"/>
-          </a:fontRef>
-        </p:style>
-        <p:txBody>
-          <a:bodyPr rtlCol="0" anchor="ctr"/>
-          <a:lstStyle/>
-          <a:p>
-            <a:pPr algn="ctr"/>
-            <a:endParaRPr lang="ru-RU"/>
-          </a:p>
-        </p:txBody>
-      </p:sp>
-      <p:sp>
-        <p:nvSpPr>
-          <p:cNvPr id="51" name="Rectangle 50">
-            <a:extLst>
-              <a:ext uri="{FF2B5EF4-FFF2-40B4-BE49-F238E27FC236}">
-                <a16:creationId xmlns:a16="http://schemas.microsoft.com/office/drawing/2014/main" id="{7CC4CB58-F964-4F74-914A-3D679B2332B2}"/>
-              </a:ext>
-            </a:extLst>
-          </p:cNvPr>
-          <p:cNvSpPr/>
-          <p:nvPr/>
-        </p:nvSpPr>
-        <p:spPr>
-          <a:xfrm>
-            <a:off x="6125453" y="3918654"/>
-            <a:ext cx="1048624" cy="557147"/>
-          </a:xfrm>
-          <a:prstGeom prst="rect">
-            <a:avLst/>
-          </a:prstGeom>
-        </p:spPr>
-        <p:style>
-          <a:lnRef idx="2">
-            <a:schemeClr val="accent1">
-              <a:shade val="50000"/>
-            </a:schemeClr>
-          </a:lnRef>
-          <a:fillRef idx="1">
-            <a:schemeClr val="accent1"/>
-          </a:fillRef>
-          <a:effectRef idx="0">
-            <a:schemeClr val="accent1"/>
-          </a:effectRef>
-          <a:fontRef idx="minor">
-            <a:schemeClr val="lt1"/>
-          </a:fontRef>
-        </p:style>
-        <p:txBody>
-          <a:bodyPr rtlCol="0" anchor="ctr"/>
-          <a:lstStyle/>
-          <a:p>
-            <a:pPr algn="ctr"/>
-            <a:r>
-              <a:rPr lang="en-US" dirty="0"/>
-              <a:t>Courier Service</a:t>
-            </a:r>
-          </a:p>
-        </p:txBody>
-      </p:sp>
-      <p:sp>
-        <p:nvSpPr>
-          <p:cNvPr id="52" name="Rectangle 51">
-            <a:extLst>
-              <a:ext uri="{FF2B5EF4-FFF2-40B4-BE49-F238E27FC236}">
-                <a16:creationId xmlns:a16="http://schemas.microsoft.com/office/drawing/2014/main" id="{FC10E71A-E74A-4702-B3EB-807213AA4561}"/>
-              </a:ext>
-            </a:extLst>
-          </p:cNvPr>
-          <p:cNvSpPr/>
-          <p:nvPr/>
-        </p:nvSpPr>
-        <p:spPr>
-          <a:xfrm>
-            <a:off x="6177207" y="3968998"/>
-            <a:ext cx="1048624" cy="557147"/>
-          </a:xfrm>
-          <a:prstGeom prst="rect">
-            <a:avLst/>
-          </a:prstGeom>
-        </p:spPr>
-        <p:style>
-          <a:lnRef idx="2">
-            <a:schemeClr val="accent1">
-              <a:shade val="50000"/>
-            </a:schemeClr>
-          </a:lnRef>
-          <a:fillRef idx="1">
-            <a:schemeClr val="accent1"/>
-          </a:fillRef>
-          <a:effectRef idx="0">
-            <a:schemeClr val="accent1"/>
-          </a:effectRef>
-          <a:fontRef idx="minor">
-            <a:schemeClr val="lt1"/>
-          </a:fontRef>
-        </p:style>
-        <p:txBody>
-          <a:bodyPr rtlCol="0" anchor="ctr"/>
-          <a:lstStyle/>
-          <a:p>
-            <a:pPr algn="ctr"/>
-            <a:r>
-              <a:rPr lang="en-US" dirty="0"/>
-              <a:t>Courier Service</a:t>
-            </a:r>
-          </a:p>
-        </p:txBody>
-      </p:sp>
-      <p:sp>
-        <p:nvSpPr>
-          <p:cNvPr id="17" name="Cylinder 16">
-            <a:extLst>
-              <a:ext uri="{FF2B5EF4-FFF2-40B4-BE49-F238E27FC236}">
-                <a16:creationId xmlns:a16="http://schemas.microsoft.com/office/drawing/2014/main" id="{920F3F06-CBA2-4CA5-9B24-C662382A45A5}"/>
-              </a:ext>
-            </a:extLst>
-          </p:cNvPr>
-          <p:cNvSpPr/>
-          <p:nvPr/>
-        </p:nvSpPr>
-        <p:spPr>
-          <a:xfrm>
-            <a:off x="7017064" y="4258385"/>
-            <a:ext cx="298579" cy="342354"/>
-          </a:xfrm>
-          <a:prstGeom prst="can">
-            <a:avLst/>
-          </a:prstGeom>
-          <a:solidFill>
-            <a:schemeClr val="accent2">
-              <a:lumMod val="75000"/>
-            </a:schemeClr>
-          </a:solidFill>
-        </p:spPr>
-        <p:style>
-          <a:lnRef idx="2">
-            <a:schemeClr val="accent1">
-              <a:shade val="50000"/>
-            </a:schemeClr>
-          </a:lnRef>
-          <a:fillRef idx="1">
-            <a:schemeClr val="accent1"/>
-          </a:fillRef>
-          <a:effectRef idx="0">
-            <a:schemeClr val="accent1"/>
-          </a:effectRef>
-          <a:fontRef idx="minor">
-            <a:schemeClr val="lt1"/>
-          </a:fontRef>
-        </p:style>
-        <p:txBody>
-          <a:bodyPr rtlCol="0" anchor="ctr"/>
-          <a:lstStyle/>
-          <a:p>
-            <a:pPr algn="ctr"/>
-            <a:endParaRPr lang="ru-RU"/>
-          </a:p>
-        </p:txBody>
-      </p:sp>
-      <p:sp>
-        <p:nvSpPr>
-          <p:cNvPr id="53" name="Rectangle 52">
-            <a:extLst>
-              <a:ext uri="{FF2B5EF4-FFF2-40B4-BE49-F238E27FC236}">
-                <a16:creationId xmlns:a16="http://schemas.microsoft.com/office/drawing/2014/main" id="{F199647D-419C-4D5D-8350-8FC0878C2A18}"/>
-              </a:ext>
-            </a:extLst>
-          </p:cNvPr>
-          <p:cNvSpPr/>
-          <p:nvPr/>
-        </p:nvSpPr>
-        <p:spPr>
-          <a:xfrm>
-            <a:off x="6133697" y="5013351"/>
-            <a:ext cx="1048624" cy="557147"/>
-          </a:xfrm>
-          <a:prstGeom prst="rect">
-            <a:avLst/>
-          </a:prstGeom>
-        </p:spPr>
-        <p:style>
-          <a:lnRef idx="2">
-            <a:schemeClr val="accent1">
-              <a:shade val="50000"/>
-            </a:schemeClr>
-          </a:lnRef>
-          <a:fillRef idx="1">
-            <a:schemeClr val="accent1"/>
-          </a:fillRef>
-          <a:effectRef idx="0">
-            <a:schemeClr val="accent1"/>
-          </a:effectRef>
-          <a:fontRef idx="minor">
-            <a:schemeClr val="lt1"/>
-          </a:fontRef>
-        </p:style>
-        <p:txBody>
-          <a:bodyPr rtlCol="0" anchor="ctr"/>
-          <a:lstStyle/>
-          <a:p>
-            <a:pPr algn="ctr"/>
-            <a:r>
-              <a:rPr lang="en-US" dirty="0"/>
-              <a:t>Client Service</a:t>
-            </a:r>
-          </a:p>
-        </p:txBody>
-      </p:sp>
-      <p:sp>
-        <p:nvSpPr>
-          <p:cNvPr id="55" name="Rectangle 54">
-            <a:extLst>
-              <a:ext uri="{FF2B5EF4-FFF2-40B4-BE49-F238E27FC236}">
-                <a16:creationId xmlns:a16="http://schemas.microsoft.com/office/drawing/2014/main" id="{51C55A44-02B5-444D-B48A-5FD268FEE5EA}"/>
-              </a:ext>
-            </a:extLst>
-          </p:cNvPr>
-          <p:cNvSpPr/>
-          <p:nvPr/>
-        </p:nvSpPr>
-        <p:spPr>
-          <a:xfrm>
-            <a:off x="6185696" y="5067945"/>
-            <a:ext cx="1048624" cy="557147"/>
-          </a:xfrm>
-          <a:prstGeom prst="rect">
-            <a:avLst/>
-          </a:prstGeom>
-        </p:spPr>
-        <p:style>
-          <a:lnRef idx="2">
-            <a:schemeClr val="accent1">
-              <a:shade val="50000"/>
-            </a:schemeClr>
-          </a:lnRef>
-          <a:fillRef idx="1">
-            <a:schemeClr val="accent1"/>
-          </a:fillRef>
-          <a:effectRef idx="0">
-            <a:schemeClr val="accent1"/>
-          </a:effectRef>
-          <a:fontRef idx="minor">
-            <a:schemeClr val="lt1"/>
-          </a:fontRef>
-        </p:style>
-        <p:txBody>
-          <a:bodyPr rtlCol="0" anchor="ctr"/>
-          <a:lstStyle/>
-          <a:p>
-            <a:pPr algn="ctr"/>
-            <a:r>
-              <a:rPr lang="en-US" dirty="0"/>
-              <a:t>Client Service</a:t>
-            </a:r>
-          </a:p>
-        </p:txBody>
-      </p:sp>
-      <p:sp>
-        <p:nvSpPr>
-          <p:cNvPr id="18" name="Cylinder 17">
-            <a:extLst>
-              <a:ext uri="{FF2B5EF4-FFF2-40B4-BE49-F238E27FC236}">
-                <a16:creationId xmlns:a16="http://schemas.microsoft.com/office/drawing/2014/main" id="{C4C76896-2F99-4F5B-B4F2-B0ACCEAC8A5C}"/>
-              </a:ext>
-            </a:extLst>
-          </p:cNvPr>
-          <p:cNvSpPr/>
-          <p:nvPr/>
-        </p:nvSpPr>
-        <p:spPr>
-          <a:xfrm>
-            <a:off x="7059106" y="5369161"/>
-            <a:ext cx="298579" cy="342354"/>
-          </a:xfrm>
-          <a:prstGeom prst="can">
-            <a:avLst/>
-          </a:prstGeom>
-          <a:solidFill>
-            <a:schemeClr val="accent2">
-              <a:lumMod val="75000"/>
-            </a:schemeClr>
-          </a:solidFill>
-        </p:spPr>
-        <p:style>
-          <a:lnRef idx="2">
-            <a:schemeClr val="accent1">
-              <a:shade val="50000"/>
-            </a:schemeClr>
-          </a:lnRef>
-          <a:fillRef idx="1">
-            <a:schemeClr val="accent1"/>
-          </a:fillRef>
-          <a:effectRef idx="0">
-            <a:schemeClr val="accent1"/>
-          </a:effectRef>
-          <a:fontRef idx="minor">
-            <a:schemeClr val="lt1"/>
-          </a:fontRef>
-        </p:style>
-        <p:txBody>
-          <a:bodyPr rtlCol="0" anchor="ctr"/>
-          <a:lstStyle/>
-          <a:p>
-            <a:pPr algn="ctr"/>
-            <a:endParaRPr lang="ru-RU"/>
-          </a:p>
-        </p:txBody>
-      </p:sp>
     </p:spTree>
     <p:extLst>
       <p:ext uri="{BB962C8B-B14F-4D97-AF65-F5344CB8AC3E}">

</xml_diff>